<commit_message>
feat(simplifying-git): fear not the cli
</commit_message>
<xml_diff>
--- a/simplifying-git/fear-the-cli-no-more/simplifying-git-fear-the-cli-no-more.slides.es.pptx
+++ b/simplifying-git/fear-the-cli-no-more/simplifying-git-fear-the-cli-no-more.slides.es.pptx
@@ -6,10 +6,20 @@
   </p:sldMasterIdLst>
   <p:sldIdLst>
     <p:sldId id="256" r:id="rId2"/>
-    <p:sldId id="257" r:id="rId3"/>
-    <p:sldId id="259" r:id="rId4"/>
-    <p:sldId id="258" r:id="rId5"/>
-    <p:sldId id="260" r:id="rId6"/>
+    <p:sldId id="263" r:id="rId3"/>
+    <p:sldId id="268" r:id="rId4"/>
+    <p:sldId id="264" r:id="rId5"/>
+    <p:sldId id="262" r:id="rId6"/>
+    <p:sldId id="265" r:id="rId7"/>
+    <p:sldId id="257" r:id="rId8"/>
+    <p:sldId id="259" r:id="rId9"/>
+    <p:sldId id="258" r:id="rId10"/>
+    <p:sldId id="260" r:id="rId11"/>
+    <p:sldId id="269" r:id="rId12"/>
+    <p:sldId id="270" r:id="rId13"/>
+    <p:sldId id="267" r:id="rId14"/>
+    <p:sldId id="261" r:id="rId15"/>
+    <p:sldId id="266" r:id="rId16"/>
   </p:sldIdLst>
   <p:sldSz cx="12192000" cy="6858000"/>
   <p:notesSz cx="6858000" cy="9144000"/>
@@ -114,17 +124,47 @@
         <p14:section name="Introducción" id="{67BFFE7F-5D5B-450E-B063-DEDD56028DC4}">
           <p14:sldIdLst>
             <p14:sldId id="256"/>
+            <p14:sldId id="263"/>
+            <p14:sldId id="268"/>
+            <p14:sldId id="264"/>
+            <p14:sldId id="262"/>
           </p14:sldIdLst>
         </p14:section>
         <p14:section name="Conceptos (Modelo mental)" id="{2E200D25-3479-488F-8095-05C650D48EB5}">
           <p14:sldIdLst>
+            <p14:sldId id="265"/>
             <p14:sldId id="257"/>
             <p14:sldId id="259"/>
             <p14:sldId id="258"/>
             <p14:sldId id="260"/>
+            <p14:sldId id="269"/>
+            <p14:sldId id="270"/>
           </p14:sldIdLst>
         </p14:section>
+        <p14:section name="Fin de la primera sesión" id="{4F47F7D3-8F7B-43EE-ACDB-C75BC471F8FC}">
+          <p14:sldIdLst/>
+        </p14:section>
+        <p14:section name="Inicio de la segunda sesión" id="{FAA6513A-AE55-4422-8C4F-203D9C30D1F3}">
+          <p14:sldIdLst>
+            <p14:sldId id="267"/>
+            <p14:sldId id="261"/>
+          </p14:sldIdLst>
+        </p14:section>
+        <p14:section name="Fin de la segunda sesión" id="{7259622E-334C-43B5-8DB2-425DB5978CA9}">
+          <p14:sldIdLst/>
+        </p14:section>
+        <p14:section name="Inicio de la tercera sesión" id="{8C7ED144-54EB-4D19-A618-B6EF8DF0CA4F}">
+          <p14:sldIdLst>
+            <p14:sldId id="266"/>
+          </p14:sldIdLst>
+        </p14:section>
+        <p14:section name="Fin de la tercera sesión" id="{11398076-7C0E-4AE9-92BA-312E512DB9B8}">
+          <p14:sldIdLst/>
+        </p14:section>
       </p14:sectionLst>
+    </p:ext>
+    <p:ext uri="{EFAFB233-063F-42B5-8137-9DF3F51BA10A}">
+      <p15:sldGuideLst xmlns:p15="http://schemas.microsoft.com/office/powerpoint/2012/main"/>
     </p:ext>
   </p:extLst>
 </p:presentation>
@@ -277,7 +317,7 @@
           <a:p>
             <a:fld id="{7C8BB0C9-757F-4D7A-8A7C-BC915ADF917F}" type="datetimeFigureOut">
               <a:rPr lang="es-ES" smtClean="0"/>
-              <a:t>06/06/2023</a:t>
+              <a:t>09/06/2023</a:t>
             </a:fld>
             <a:endParaRPr lang="es-ES"/>
           </a:p>
@@ -475,7 +515,7 @@
           <a:p>
             <a:fld id="{7C8BB0C9-757F-4D7A-8A7C-BC915ADF917F}" type="datetimeFigureOut">
               <a:rPr lang="es-ES" smtClean="0"/>
-              <a:t>06/06/2023</a:t>
+              <a:t>09/06/2023</a:t>
             </a:fld>
             <a:endParaRPr lang="es-ES"/>
           </a:p>
@@ -683,7 +723,7 @@
           <a:p>
             <a:fld id="{7C8BB0C9-757F-4D7A-8A7C-BC915ADF917F}" type="datetimeFigureOut">
               <a:rPr lang="es-ES" smtClean="0"/>
-              <a:t>06/06/2023</a:t>
+              <a:t>09/06/2023</a:t>
             </a:fld>
             <a:endParaRPr lang="es-ES"/>
           </a:p>
@@ -881,7 +921,7 @@
           <a:p>
             <a:fld id="{7C8BB0C9-757F-4D7A-8A7C-BC915ADF917F}" type="datetimeFigureOut">
               <a:rPr lang="es-ES" smtClean="0"/>
-              <a:t>06/06/2023</a:t>
+              <a:t>09/06/2023</a:t>
             </a:fld>
             <a:endParaRPr lang="es-ES"/>
           </a:p>
@@ -1156,7 +1196,7 @@
           <a:p>
             <a:fld id="{7C8BB0C9-757F-4D7A-8A7C-BC915ADF917F}" type="datetimeFigureOut">
               <a:rPr lang="es-ES" smtClean="0"/>
-              <a:t>06/06/2023</a:t>
+              <a:t>09/06/2023</a:t>
             </a:fld>
             <a:endParaRPr lang="es-ES"/>
           </a:p>
@@ -1421,7 +1461,7 @@
           <a:p>
             <a:fld id="{7C8BB0C9-757F-4D7A-8A7C-BC915ADF917F}" type="datetimeFigureOut">
               <a:rPr lang="es-ES" smtClean="0"/>
-              <a:t>06/06/2023</a:t>
+              <a:t>09/06/2023</a:t>
             </a:fld>
             <a:endParaRPr lang="es-ES"/>
           </a:p>
@@ -1833,7 +1873,7 @@
           <a:p>
             <a:fld id="{7C8BB0C9-757F-4D7A-8A7C-BC915ADF917F}" type="datetimeFigureOut">
               <a:rPr lang="es-ES" smtClean="0"/>
-              <a:t>06/06/2023</a:t>
+              <a:t>09/06/2023</a:t>
             </a:fld>
             <a:endParaRPr lang="es-ES"/>
           </a:p>
@@ -1974,7 +2014,7 @@
           <a:p>
             <a:fld id="{7C8BB0C9-757F-4D7A-8A7C-BC915ADF917F}" type="datetimeFigureOut">
               <a:rPr lang="es-ES" smtClean="0"/>
-              <a:t>06/06/2023</a:t>
+              <a:t>09/06/2023</a:t>
             </a:fld>
             <a:endParaRPr lang="es-ES"/>
           </a:p>
@@ -2087,7 +2127,7 @@
           <a:p>
             <a:fld id="{7C8BB0C9-757F-4D7A-8A7C-BC915ADF917F}" type="datetimeFigureOut">
               <a:rPr lang="es-ES" smtClean="0"/>
-              <a:t>06/06/2023</a:t>
+              <a:t>09/06/2023</a:t>
             </a:fld>
             <a:endParaRPr lang="es-ES"/>
           </a:p>
@@ -2398,7 +2438,7 @@
           <a:p>
             <a:fld id="{7C8BB0C9-757F-4D7A-8A7C-BC915ADF917F}" type="datetimeFigureOut">
               <a:rPr lang="es-ES" smtClean="0"/>
-              <a:t>06/06/2023</a:t>
+              <a:t>09/06/2023</a:t>
             </a:fld>
             <a:endParaRPr lang="es-ES"/>
           </a:p>
@@ -2686,7 +2726,7 @@
           <a:p>
             <a:fld id="{7C8BB0C9-757F-4D7A-8A7C-BC915ADF917F}" type="datetimeFigureOut">
               <a:rPr lang="es-ES" smtClean="0"/>
-              <a:t>06/06/2023</a:t>
+              <a:t>09/06/2023</a:t>
             </a:fld>
             <a:endParaRPr lang="es-ES"/>
           </a:p>
@@ -2927,7 +2967,7 @@
           <a:p>
             <a:fld id="{7C8BB0C9-757F-4D7A-8A7C-BC915ADF917F}" type="datetimeFigureOut">
               <a:rPr lang="es-ES" smtClean="0"/>
-              <a:t>06/06/2023</a:t>
+              <a:t>09/06/2023</a:t>
             </a:fld>
             <a:endParaRPr lang="es-ES"/>
           </a:p>
@@ -3372,63 +3412,21 @@
                 <a:gradFill flip="none" rotWithShape="1">
                   <a:gsLst>
                     <a:gs pos="0">
-                      <a:schemeClr val="accent2">
-                        <a:lumMod val="67000"/>
-                      </a:schemeClr>
-                    </a:gs>
-                    <a:gs pos="48000">
-                      <a:schemeClr val="accent2">
-                        <a:lumMod val="97000"/>
-                        <a:lumOff val="3000"/>
-                      </a:schemeClr>
+                      <a:srgbClr val="36D1DC"/>
                     </a:gs>
                     <a:gs pos="100000">
-                      <a:schemeClr val="accent2">
-                        <a:lumMod val="60000"/>
-                        <a:lumOff val="40000"/>
-                      </a:schemeClr>
+                      <a:srgbClr val="5B86E5"/>
                     </a:gs>
                   </a:gsLst>
-                  <a:lin ang="16200000" scaled="1"/>
+                  <a:lin ang="3600000" scaled="0"/>
                   <a:tileRect/>
                 </a:gradFill>
+                <a:effectLst>
+                  <a:reflection blurRad="101600" stA="18000" endPos="65000" dist="50800" dir="5400000" sy="-100000" algn="bl" rotWithShape="0"/>
+                </a:effectLst>
                 <a:latin typeface="Montserrat" panose="00000500000000000000" pitchFamily="50" charset="0"/>
               </a:rPr>
-              <a:t>SIMPLIFICANDO</a:t>
-            </a:r>
-            <a:r>
-              <a:rPr lang="es-ES" b="1" dirty="0">
-                <a:gradFill flip="none" rotWithShape="1">
-                  <a:gsLst>
-                    <a:gs pos="0">
-                      <a:schemeClr val="accent2">
-                        <a:lumMod val="89000"/>
-                      </a:schemeClr>
-                    </a:gs>
-                    <a:gs pos="23000">
-                      <a:schemeClr val="accent2">
-                        <a:lumMod val="89000"/>
-                      </a:schemeClr>
-                    </a:gs>
-                    <a:gs pos="69000">
-                      <a:schemeClr val="accent2">
-                        <a:lumMod val="75000"/>
-                      </a:schemeClr>
-                    </a:gs>
-                    <a:gs pos="97000">
-                      <a:schemeClr val="accent2">
-                        <a:lumMod val="70000"/>
-                      </a:schemeClr>
-                    </a:gs>
-                  </a:gsLst>
-                  <a:path path="circle">
-                    <a:fillToRect l="50000" t="50000" r="50000" b="50000"/>
-                  </a:path>
-                  <a:tileRect/>
-                </a:gradFill>
-                <a:latin typeface="Montserrat" panose="00000500000000000000" pitchFamily="50" charset="0"/>
-              </a:rPr>
-              <a:t> GIT</a:t>
+              <a:t>SIMPLIFICANDO GIT</a:t>
             </a:r>
           </a:p>
         </p:txBody>
@@ -3474,7 +3472,2519 @@
 </p:sld>
 </file>
 
+<file path=ppt/slides/slide10.xml><?xml version="1.0" encoding="utf-8"?>
+<p:sld xmlns:a="http://schemas.openxmlformats.org/drawingml/2006/main" xmlns:r="http://schemas.openxmlformats.org/officeDocument/2006/relationships" xmlns:p="http://schemas.openxmlformats.org/presentationml/2006/main">
+  <p:cSld>
+    <p:spTree>
+      <p:nvGrpSpPr>
+        <p:cNvPr id="1" name=""/>
+        <p:cNvGrpSpPr/>
+        <p:nvPr/>
+      </p:nvGrpSpPr>
+      <p:grpSpPr>
+        <a:xfrm>
+          <a:off x="0" y="0"/>
+          <a:ext cx="0" cy="0"/>
+          <a:chOff x="0" y="0"/>
+          <a:chExt cx="0" cy="0"/>
+        </a:xfrm>
+      </p:grpSpPr>
+      <p:sp>
+        <p:nvSpPr>
+          <p:cNvPr id="2" name="Título 1">
+            <a:extLst>
+              <a:ext uri="{FF2B5EF4-FFF2-40B4-BE49-F238E27FC236}">
+                <a16:creationId xmlns:a16="http://schemas.microsoft.com/office/drawing/2014/main" id="{C291AFC8-2CF3-7BFE-326B-0915B8CDE65D}"/>
+              </a:ext>
+            </a:extLst>
+          </p:cNvPr>
+          <p:cNvSpPr>
+            <a:spLocks noGrp="1"/>
+          </p:cNvSpPr>
+          <p:nvPr>
+            <p:ph type="title"/>
+          </p:nvPr>
+        </p:nvSpPr>
+        <p:spPr/>
+        <p:txBody>
+          <a:bodyPr/>
+          <a:lstStyle/>
+          <a:p>
+            <a:r>
+              <a:rPr lang="es-ES" dirty="0"/>
+              <a:t>ESQUEMAS</a:t>
+            </a:r>
+          </a:p>
+        </p:txBody>
+      </p:sp>
+      <p:sp>
+        <p:nvSpPr>
+          <p:cNvPr id="3" name="Marcador de contenido 2">
+            <a:extLst>
+              <a:ext uri="{FF2B5EF4-FFF2-40B4-BE49-F238E27FC236}">
+                <a16:creationId xmlns:a16="http://schemas.microsoft.com/office/drawing/2014/main" id="{BA43C8AD-23B4-8D9A-3244-2E7AE40417CC}"/>
+              </a:ext>
+            </a:extLst>
+          </p:cNvPr>
+          <p:cNvSpPr>
+            <a:spLocks noGrp="1"/>
+          </p:cNvSpPr>
+          <p:nvPr>
+            <p:ph idx="1"/>
+          </p:nvPr>
+        </p:nvSpPr>
+        <p:spPr/>
+        <p:txBody>
+          <a:bodyPr/>
+          <a:lstStyle/>
+          <a:p>
+            <a:r>
+              <a:rPr lang="es-ES" dirty="0"/>
+              <a:t>Un cambio altera la lista enlazada, y cada cambio en la lista enlaza es un nuevo hash, explicar entonces porque hace un rebase el cambio y aparecen </a:t>
+            </a:r>
+            <a:r>
+              <a:rPr lang="es-ES" dirty="0" err="1"/>
+              <a:t>commits</a:t>
+            </a:r>
+            <a:r>
+              <a:rPr lang="es-ES" dirty="0"/>
+              <a:t> a descargar</a:t>
+            </a:r>
+          </a:p>
+          <a:p>
+            <a:r>
+              <a:rPr lang="es-ES" dirty="0"/>
+              <a:t>Dibujo de una lista enlazada</a:t>
+            </a:r>
+          </a:p>
+          <a:p>
+            <a:r>
+              <a:rPr lang="es-ES" dirty="0"/>
+              <a:t>Dibujo simplificado de un hash</a:t>
+            </a:r>
+          </a:p>
+        </p:txBody>
+      </p:sp>
+    </p:spTree>
+    <p:extLst>
+      <p:ext uri="{BB962C8B-B14F-4D97-AF65-F5344CB8AC3E}">
+        <p14:creationId xmlns:p14="http://schemas.microsoft.com/office/powerpoint/2010/main" val="3976417454"/>
+      </p:ext>
+    </p:extLst>
+  </p:cSld>
+  <p:clrMapOvr>
+    <a:masterClrMapping/>
+  </p:clrMapOvr>
+</p:sld>
+</file>
+
+<file path=ppt/slides/slide11.xml><?xml version="1.0" encoding="utf-8"?>
+<p:sld xmlns:a="http://schemas.openxmlformats.org/drawingml/2006/main" xmlns:r="http://schemas.openxmlformats.org/officeDocument/2006/relationships" xmlns:p="http://schemas.openxmlformats.org/presentationml/2006/main">
+  <p:cSld>
+    <p:spTree>
+      <p:nvGrpSpPr>
+        <p:cNvPr id="1" name=""/>
+        <p:cNvGrpSpPr/>
+        <p:nvPr/>
+      </p:nvGrpSpPr>
+      <p:grpSpPr>
+        <a:xfrm>
+          <a:off x="0" y="0"/>
+          <a:ext cx="0" cy="0"/>
+          <a:chOff x="0" y="0"/>
+          <a:chExt cx="0" cy="0"/>
+        </a:xfrm>
+      </p:grpSpPr>
+      <p:sp>
+        <p:nvSpPr>
+          <p:cNvPr id="2" name="Título 1">
+            <a:extLst>
+              <a:ext uri="{FF2B5EF4-FFF2-40B4-BE49-F238E27FC236}">
+                <a16:creationId xmlns:a16="http://schemas.microsoft.com/office/drawing/2014/main" id="{7B5B4AE4-9A9F-AE16-4B94-F901F6CED438}"/>
+              </a:ext>
+            </a:extLst>
+          </p:cNvPr>
+          <p:cNvSpPr>
+            <a:spLocks noGrp="1"/>
+          </p:cNvSpPr>
+          <p:nvPr>
+            <p:ph type="title"/>
+          </p:nvPr>
+        </p:nvSpPr>
+        <p:spPr/>
+        <p:txBody>
+          <a:bodyPr/>
+          <a:lstStyle/>
+          <a:p>
+            <a:r>
+              <a:rPr lang="es-ES" dirty="0"/>
+              <a:t>Temas a tratar</a:t>
+            </a:r>
+          </a:p>
+        </p:txBody>
+      </p:sp>
+      <p:sp>
+        <p:nvSpPr>
+          <p:cNvPr id="3" name="Marcador de contenido 2">
+            <a:extLst>
+              <a:ext uri="{FF2B5EF4-FFF2-40B4-BE49-F238E27FC236}">
+                <a16:creationId xmlns:a16="http://schemas.microsoft.com/office/drawing/2014/main" id="{E8C38B41-EBDB-1003-553E-989C02C80671}"/>
+              </a:ext>
+            </a:extLst>
+          </p:cNvPr>
+          <p:cNvSpPr>
+            <a:spLocks noGrp="1"/>
+          </p:cNvSpPr>
+          <p:nvPr>
+            <p:ph idx="1"/>
+          </p:nvPr>
+        </p:nvSpPr>
+        <p:spPr>
+          <a:xfrm>
+            <a:off x="838200" y="1825625"/>
+            <a:ext cx="3945556" cy="4351338"/>
+          </a:xfrm>
+        </p:spPr>
+        <p:txBody>
+          <a:bodyPr>
+            <a:normAutofit fontScale="85000" lnSpcReduction="20000"/>
+          </a:bodyPr>
+          <a:lstStyle/>
+          <a:p>
+            <a:r>
+              <a:rPr lang="en-US" dirty="0"/>
+              <a:t>Origin</a:t>
+            </a:r>
+          </a:p>
+          <a:p>
+            <a:r>
+              <a:rPr lang="en-US" dirty="0"/>
+              <a:t>Upstream</a:t>
+            </a:r>
+          </a:p>
+          <a:p>
+            <a:r>
+              <a:rPr lang="en-US" dirty="0" err="1"/>
+              <a:t>stategy</a:t>
+            </a:r>
+            <a:r>
+              <a:rPr lang="en-US" dirty="0"/>
+              <a:t> option</a:t>
+            </a:r>
+          </a:p>
+          <a:p>
+            <a:pPr lvl="1"/>
+            <a:r>
+              <a:rPr lang="en-US" dirty="0"/>
+              <a:t>ours/theirs</a:t>
+            </a:r>
+          </a:p>
+          <a:p>
+            <a:r>
+              <a:rPr lang="en-US" dirty="0"/>
+              <a:t>Merge</a:t>
+            </a:r>
+          </a:p>
+          <a:p>
+            <a:r>
+              <a:rPr lang="en-US" dirty="0"/>
+              <a:t>Rebase</a:t>
+            </a:r>
+          </a:p>
+          <a:p>
+            <a:r>
+              <a:rPr lang="en-US" dirty="0"/>
+              <a:t>Bisect</a:t>
+            </a:r>
+          </a:p>
+          <a:p>
+            <a:r>
+              <a:rPr lang="es-ES" dirty="0" err="1"/>
+              <a:t>Checkout</a:t>
+            </a:r>
+            <a:endParaRPr lang="es-ES" dirty="0"/>
+          </a:p>
+          <a:p>
+            <a:r>
+              <a:rPr lang="es-ES" dirty="0" err="1"/>
+              <a:t>Branches</a:t>
+            </a:r>
+            <a:endParaRPr lang="es-ES" dirty="0"/>
+          </a:p>
+          <a:p>
+            <a:r>
+              <a:rPr lang="es-ES" dirty="0" err="1"/>
+              <a:t>branch</a:t>
+            </a:r>
+            <a:r>
+              <a:rPr lang="es-ES" dirty="0"/>
+              <a:t> </a:t>
+            </a:r>
+            <a:r>
+              <a:rPr lang="es-ES" dirty="0" err="1"/>
+              <a:t>rename</a:t>
+            </a:r>
+            <a:endParaRPr lang="es-ES" dirty="0"/>
+          </a:p>
+          <a:p>
+            <a:r>
+              <a:rPr lang="es-ES" dirty="0"/>
+              <a:t>crear ramas con </a:t>
+            </a:r>
+            <a:r>
+              <a:rPr lang="es-ES" dirty="0" err="1"/>
+              <a:t>checkout</a:t>
+            </a:r>
+            <a:endParaRPr lang="es-ES" dirty="0"/>
+          </a:p>
+        </p:txBody>
+      </p:sp>
+      <p:sp>
+        <p:nvSpPr>
+          <p:cNvPr id="4" name="Marcador de contenido 2">
+            <a:extLst>
+              <a:ext uri="{FF2B5EF4-FFF2-40B4-BE49-F238E27FC236}">
+                <a16:creationId xmlns:a16="http://schemas.microsoft.com/office/drawing/2014/main" id="{ECB9B7F9-DF27-F213-DAB9-3A8A76107E82}"/>
+              </a:ext>
+            </a:extLst>
+          </p:cNvPr>
+          <p:cNvSpPr txBox="1">
+            <a:spLocks/>
+          </p:cNvSpPr>
+          <p:nvPr/>
+        </p:nvSpPr>
+        <p:spPr>
+          <a:xfrm>
+            <a:off x="4561439" y="1820846"/>
+            <a:ext cx="3945556" cy="4351338"/>
+          </a:xfrm>
+          <a:prstGeom prst="rect">
+            <a:avLst/>
+          </a:prstGeom>
+        </p:spPr>
+        <p:txBody>
+          <a:bodyPr vert="horz" lIns="91440" tIns="45720" rIns="91440" bIns="45720" rtlCol="0">
+            <a:normAutofit fontScale="92500" lnSpcReduction="10000"/>
+          </a:bodyPr>
+          <a:lstStyle>
+            <a:lvl1pPr marL="228600" indent="-228600" algn="l" defTabSz="914400" rtl="0" eaLnBrk="1" latinLnBrk="0" hangingPunct="1">
+              <a:lnSpc>
+                <a:spcPct val="90000"/>
+              </a:lnSpc>
+              <a:spcBef>
+                <a:spcPts val="1000"/>
+              </a:spcBef>
+              <a:buFont typeface="Arial" panose="020B0604020202020204" pitchFamily="34" charset="0"/>
+              <a:buChar char="•"/>
+              <a:defRPr sz="2800" kern="1200">
+                <a:solidFill>
+                  <a:schemeClr val="tx1"/>
+                </a:solidFill>
+                <a:latin typeface="+mn-lt"/>
+                <a:ea typeface="+mn-ea"/>
+                <a:cs typeface="+mn-cs"/>
+              </a:defRPr>
+            </a:lvl1pPr>
+            <a:lvl2pPr marL="685800" indent="-228600" algn="l" defTabSz="914400" rtl="0" eaLnBrk="1" latinLnBrk="0" hangingPunct="1">
+              <a:lnSpc>
+                <a:spcPct val="90000"/>
+              </a:lnSpc>
+              <a:spcBef>
+                <a:spcPts val="500"/>
+              </a:spcBef>
+              <a:buFont typeface="Arial" panose="020B0604020202020204" pitchFamily="34" charset="0"/>
+              <a:buChar char="•"/>
+              <a:defRPr sz="2400" kern="1200">
+                <a:solidFill>
+                  <a:schemeClr val="tx1"/>
+                </a:solidFill>
+                <a:latin typeface="+mn-lt"/>
+                <a:ea typeface="+mn-ea"/>
+                <a:cs typeface="+mn-cs"/>
+              </a:defRPr>
+            </a:lvl2pPr>
+            <a:lvl3pPr marL="1143000" indent="-228600" algn="l" defTabSz="914400" rtl="0" eaLnBrk="1" latinLnBrk="0" hangingPunct="1">
+              <a:lnSpc>
+                <a:spcPct val="90000"/>
+              </a:lnSpc>
+              <a:spcBef>
+                <a:spcPts val="500"/>
+              </a:spcBef>
+              <a:buFont typeface="Arial" panose="020B0604020202020204" pitchFamily="34" charset="0"/>
+              <a:buChar char="•"/>
+              <a:defRPr sz="2000" kern="1200">
+                <a:solidFill>
+                  <a:schemeClr val="tx1"/>
+                </a:solidFill>
+                <a:latin typeface="+mn-lt"/>
+                <a:ea typeface="+mn-ea"/>
+                <a:cs typeface="+mn-cs"/>
+              </a:defRPr>
+            </a:lvl3pPr>
+            <a:lvl4pPr marL="1600200" indent="-228600" algn="l" defTabSz="914400" rtl="0" eaLnBrk="1" latinLnBrk="0" hangingPunct="1">
+              <a:lnSpc>
+                <a:spcPct val="90000"/>
+              </a:lnSpc>
+              <a:spcBef>
+                <a:spcPts val="500"/>
+              </a:spcBef>
+              <a:buFont typeface="Arial" panose="020B0604020202020204" pitchFamily="34" charset="0"/>
+              <a:buChar char="•"/>
+              <a:defRPr sz="1800" kern="1200">
+                <a:solidFill>
+                  <a:schemeClr val="tx1"/>
+                </a:solidFill>
+                <a:latin typeface="+mn-lt"/>
+                <a:ea typeface="+mn-ea"/>
+                <a:cs typeface="+mn-cs"/>
+              </a:defRPr>
+            </a:lvl4pPr>
+            <a:lvl5pPr marL="2057400" indent="-228600" algn="l" defTabSz="914400" rtl="0" eaLnBrk="1" latinLnBrk="0" hangingPunct="1">
+              <a:lnSpc>
+                <a:spcPct val="90000"/>
+              </a:lnSpc>
+              <a:spcBef>
+                <a:spcPts val="500"/>
+              </a:spcBef>
+              <a:buFont typeface="Arial" panose="020B0604020202020204" pitchFamily="34" charset="0"/>
+              <a:buChar char="•"/>
+              <a:defRPr sz="1800" kern="1200">
+                <a:solidFill>
+                  <a:schemeClr val="tx1"/>
+                </a:solidFill>
+                <a:latin typeface="+mn-lt"/>
+                <a:ea typeface="+mn-ea"/>
+                <a:cs typeface="+mn-cs"/>
+              </a:defRPr>
+            </a:lvl5pPr>
+            <a:lvl6pPr marL="2514600" indent="-228600" algn="l" defTabSz="914400" rtl="0" eaLnBrk="1" latinLnBrk="0" hangingPunct="1">
+              <a:lnSpc>
+                <a:spcPct val="90000"/>
+              </a:lnSpc>
+              <a:spcBef>
+                <a:spcPts val="500"/>
+              </a:spcBef>
+              <a:buFont typeface="Arial" panose="020B0604020202020204" pitchFamily="34" charset="0"/>
+              <a:buChar char="•"/>
+              <a:defRPr sz="1800" kern="1200">
+                <a:solidFill>
+                  <a:schemeClr val="tx1"/>
+                </a:solidFill>
+                <a:latin typeface="+mn-lt"/>
+                <a:ea typeface="+mn-ea"/>
+                <a:cs typeface="+mn-cs"/>
+              </a:defRPr>
+            </a:lvl6pPr>
+            <a:lvl7pPr marL="2971800" indent="-228600" algn="l" defTabSz="914400" rtl="0" eaLnBrk="1" latinLnBrk="0" hangingPunct="1">
+              <a:lnSpc>
+                <a:spcPct val="90000"/>
+              </a:lnSpc>
+              <a:spcBef>
+                <a:spcPts val="500"/>
+              </a:spcBef>
+              <a:buFont typeface="Arial" panose="020B0604020202020204" pitchFamily="34" charset="0"/>
+              <a:buChar char="•"/>
+              <a:defRPr sz="1800" kern="1200">
+                <a:solidFill>
+                  <a:schemeClr val="tx1"/>
+                </a:solidFill>
+                <a:latin typeface="+mn-lt"/>
+                <a:ea typeface="+mn-ea"/>
+                <a:cs typeface="+mn-cs"/>
+              </a:defRPr>
+            </a:lvl7pPr>
+            <a:lvl8pPr marL="3429000" indent="-228600" algn="l" defTabSz="914400" rtl="0" eaLnBrk="1" latinLnBrk="0" hangingPunct="1">
+              <a:lnSpc>
+                <a:spcPct val="90000"/>
+              </a:lnSpc>
+              <a:spcBef>
+                <a:spcPts val="500"/>
+              </a:spcBef>
+              <a:buFont typeface="Arial" panose="020B0604020202020204" pitchFamily="34" charset="0"/>
+              <a:buChar char="•"/>
+              <a:defRPr sz="1800" kern="1200">
+                <a:solidFill>
+                  <a:schemeClr val="tx1"/>
+                </a:solidFill>
+                <a:latin typeface="+mn-lt"/>
+                <a:ea typeface="+mn-ea"/>
+                <a:cs typeface="+mn-cs"/>
+              </a:defRPr>
+            </a:lvl8pPr>
+            <a:lvl9pPr marL="3886200" indent="-228600" algn="l" defTabSz="914400" rtl="0" eaLnBrk="1" latinLnBrk="0" hangingPunct="1">
+              <a:lnSpc>
+                <a:spcPct val="90000"/>
+              </a:lnSpc>
+              <a:spcBef>
+                <a:spcPts val="500"/>
+              </a:spcBef>
+              <a:buFont typeface="Arial" panose="020B0604020202020204" pitchFamily="34" charset="0"/>
+              <a:buChar char="•"/>
+              <a:defRPr sz="1800" kern="1200">
+                <a:solidFill>
+                  <a:schemeClr val="tx1"/>
+                </a:solidFill>
+                <a:latin typeface="+mn-lt"/>
+                <a:ea typeface="+mn-ea"/>
+                <a:cs typeface="+mn-cs"/>
+              </a:defRPr>
+            </a:lvl9pPr>
+          </a:lstStyle>
+          <a:p>
+            <a:r>
+              <a:rPr lang="en-US" dirty="0"/>
+              <a:t>Origin</a:t>
+            </a:r>
+          </a:p>
+          <a:p>
+            <a:r>
+              <a:rPr lang="en-US" dirty="0"/>
+              <a:t>git stash</a:t>
+            </a:r>
+          </a:p>
+          <a:p>
+            <a:pPr lvl="1"/>
+            <a:r>
+              <a:rPr lang="en-US" dirty="0"/>
+              <a:t>keys y pop</a:t>
+            </a:r>
+          </a:p>
+          <a:p>
+            <a:r>
+              <a:rPr lang="sv-SE" dirty="0"/>
+              <a:t>git fetch vs git pull vs git push</a:t>
+            </a:r>
+          </a:p>
+          <a:p>
+            <a:pPr lvl="1"/>
+            <a:r>
+              <a:rPr lang="en-US" dirty="0"/>
+              <a:t>git fetch especial (git pull &amp;&amp; git push)</a:t>
+            </a:r>
+            <a:endParaRPr lang="sv-SE" dirty="0"/>
+          </a:p>
+          <a:p>
+            <a:r>
+              <a:rPr lang="en-US" dirty="0"/>
+              <a:t>git cherry pick</a:t>
+            </a:r>
+          </a:p>
+          <a:p>
+            <a:r>
+              <a:rPr lang="en-US" dirty="0" err="1"/>
+              <a:t>Entornos</a:t>
+            </a:r>
+            <a:endParaRPr lang="en-US" dirty="0"/>
+          </a:p>
+          <a:p>
+            <a:pPr lvl="1"/>
+            <a:r>
+              <a:rPr lang="en-US" dirty="0"/>
+              <a:t>stating, local, remote, origin</a:t>
+            </a:r>
+          </a:p>
+        </p:txBody>
+      </p:sp>
+      <p:sp>
+        <p:nvSpPr>
+          <p:cNvPr id="5" name="Marcador de contenido 2">
+            <a:extLst>
+              <a:ext uri="{FF2B5EF4-FFF2-40B4-BE49-F238E27FC236}">
+                <a16:creationId xmlns:a16="http://schemas.microsoft.com/office/drawing/2014/main" id="{8A825BB9-091A-676E-DE35-F3F9FFEDB812}"/>
+              </a:ext>
+            </a:extLst>
+          </p:cNvPr>
+          <p:cNvSpPr txBox="1">
+            <a:spLocks/>
+          </p:cNvSpPr>
+          <p:nvPr/>
+        </p:nvSpPr>
+        <p:spPr>
+          <a:xfrm>
+            <a:off x="8246444" y="1820846"/>
+            <a:ext cx="3945556" cy="4351338"/>
+          </a:xfrm>
+          <a:prstGeom prst="rect">
+            <a:avLst/>
+          </a:prstGeom>
+        </p:spPr>
+        <p:txBody>
+          <a:bodyPr vert="horz" lIns="91440" tIns="45720" rIns="91440" bIns="45720" rtlCol="0">
+            <a:normAutofit/>
+          </a:bodyPr>
+          <a:lstStyle>
+            <a:lvl1pPr marL="228600" indent="-228600" algn="l" defTabSz="914400" rtl="0" eaLnBrk="1" latinLnBrk="0" hangingPunct="1">
+              <a:lnSpc>
+                <a:spcPct val="90000"/>
+              </a:lnSpc>
+              <a:spcBef>
+                <a:spcPts val="1000"/>
+              </a:spcBef>
+              <a:buFont typeface="Arial" panose="020B0604020202020204" pitchFamily="34" charset="0"/>
+              <a:buChar char="•"/>
+              <a:defRPr sz="2800" kern="1200">
+                <a:solidFill>
+                  <a:schemeClr val="tx1"/>
+                </a:solidFill>
+                <a:latin typeface="+mn-lt"/>
+                <a:ea typeface="+mn-ea"/>
+                <a:cs typeface="+mn-cs"/>
+              </a:defRPr>
+            </a:lvl1pPr>
+            <a:lvl2pPr marL="685800" indent="-228600" algn="l" defTabSz="914400" rtl="0" eaLnBrk="1" latinLnBrk="0" hangingPunct="1">
+              <a:lnSpc>
+                <a:spcPct val="90000"/>
+              </a:lnSpc>
+              <a:spcBef>
+                <a:spcPts val="500"/>
+              </a:spcBef>
+              <a:buFont typeface="Arial" panose="020B0604020202020204" pitchFamily="34" charset="0"/>
+              <a:buChar char="•"/>
+              <a:defRPr sz="2400" kern="1200">
+                <a:solidFill>
+                  <a:schemeClr val="tx1"/>
+                </a:solidFill>
+                <a:latin typeface="+mn-lt"/>
+                <a:ea typeface="+mn-ea"/>
+                <a:cs typeface="+mn-cs"/>
+              </a:defRPr>
+            </a:lvl2pPr>
+            <a:lvl3pPr marL="1143000" indent="-228600" algn="l" defTabSz="914400" rtl="0" eaLnBrk="1" latinLnBrk="0" hangingPunct="1">
+              <a:lnSpc>
+                <a:spcPct val="90000"/>
+              </a:lnSpc>
+              <a:spcBef>
+                <a:spcPts val="500"/>
+              </a:spcBef>
+              <a:buFont typeface="Arial" panose="020B0604020202020204" pitchFamily="34" charset="0"/>
+              <a:buChar char="•"/>
+              <a:defRPr sz="2000" kern="1200">
+                <a:solidFill>
+                  <a:schemeClr val="tx1"/>
+                </a:solidFill>
+                <a:latin typeface="+mn-lt"/>
+                <a:ea typeface="+mn-ea"/>
+                <a:cs typeface="+mn-cs"/>
+              </a:defRPr>
+            </a:lvl3pPr>
+            <a:lvl4pPr marL="1600200" indent="-228600" algn="l" defTabSz="914400" rtl="0" eaLnBrk="1" latinLnBrk="0" hangingPunct="1">
+              <a:lnSpc>
+                <a:spcPct val="90000"/>
+              </a:lnSpc>
+              <a:spcBef>
+                <a:spcPts val="500"/>
+              </a:spcBef>
+              <a:buFont typeface="Arial" panose="020B0604020202020204" pitchFamily="34" charset="0"/>
+              <a:buChar char="•"/>
+              <a:defRPr sz="1800" kern="1200">
+                <a:solidFill>
+                  <a:schemeClr val="tx1"/>
+                </a:solidFill>
+                <a:latin typeface="+mn-lt"/>
+                <a:ea typeface="+mn-ea"/>
+                <a:cs typeface="+mn-cs"/>
+              </a:defRPr>
+            </a:lvl4pPr>
+            <a:lvl5pPr marL="2057400" indent="-228600" algn="l" defTabSz="914400" rtl="0" eaLnBrk="1" latinLnBrk="0" hangingPunct="1">
+              <a:lnSpc>
+                <a:spcPct val="90000"/>
+              </a:lnSpc>
+              <a:spcBef>
+                <a:spcPts val="500"/>
+              </a:spcBef>
+              <a:buFont typeface="Arial" panose="020B0604020202020204" pitchFamily="34" charset="0"/>
+              <a:buChar char="•"/>
+              <a:defRPr sz="1800" kern="1200">
+                <a:solidFill>
+                  <a:schemeClr val="tx1"/>
+                </a:solidFill>
+                <a:latin typeface="+mn-lt"/>
+                <a:ea typeface="+mn-ea"/>
+                <a:cs typeface="+mn-cs"/>
+              </a:defRPr>
+            </a:lvl5pPr>
+            <a:lvl6pPr marL="2514600" indent="-228600" algn="l" defTabSz="914400" rtl="0" eaLnBrk="1" latinLnBrk="0" hangingPunct="1">
+              <a:lnSpc>
+                <a:spcPct val="90000"/>
+              </a:lnSpc>
+              <a:spcBef>
+                <a:spcPts val="500"/>
+              </a:spcBef>
+              <a:buFont typeface="Arial" panose="020B0604020202020204" pitchFamily="34" charset="0"/>
+              <a:buChar char="•"/>
+              <a:defRPr sz="1800" kern="1200">
+                <a:solidFill>
+                  <a:schemeClr val="tx1"/>
+                </a:solidFill>
+                <a:latin typeface="+mn-lt"/>
+                <a:ea typeface="+mn-ea"/>
+                <a:cs typeface="+mn-cs"/>
+              </a:defRPr>
+            </a:lvl6pPr>
+            <a:lvl7pPr marL="2971800" indent="-228600" algn="l" defTabSz="914400" rtl="0" eaLnBrk="1" latinLnBrk="0" hangingPunct="1">
+              <a:lnSpc>
+                <a:spcPct val="90000"/>
+              </a:lnSpc>
+              <a:spcBef>
+                <a:spcPts val="500"/>
+              </a:spcBef>
+              <a:buFont typeface="Arial" panose="020B0604020202020204" pitchFamily="34" charset="0"/>
+              <a:buChar char="•"/>
+              <a:defRPr sz="1800" kern="1200">
+                <a:solidFill>
+                  <a:schemeClr val="tx1"/>
+                </a:solidFill>
+                <a:latin typeface="+mn-lt"/>
+                <a:ea typeface="+mn-ea"/>
+                <a:cs typeface="+mn-cs"/>
+              </a:defRPr>
+            </a:lvl7pPr>
+            <a:lvl8pPr marL="3429000" indent="-228600" algn="l" defTabSz="914400" rtl="0" eaLnBrk="1" latinLnBrk="0" hangingPunct="1">
+              <a:lnSpc>
+                <a:spcPct val="90000"/>
+              </a:lnSpc>
+              <a:spcBef>
+                <a:spcPts val="500"/>
+              </a:spcBef>
+              <a:buFont typeface="Arial" panose="020B0604020202020204" pitchFamily="34" charset="0"/>
+              <a:buChar char="•"/>
+              <a:defRPr sz="1800" kern="1200">
+                <a:solidFill>
+                  <a:schemeClr val="tx1"/>
+                </a:solidFill>
+                <a:latin typeface="+mn-lt"/>
+                <a:ea typeface="+mn-ea"/>
+                <a:cs typeface="+mn-cs"/>
+              </a:defRPr>
+            </a:lvl8pPr>
+            <a:lvl9pPr marL="3886200" indent="-228600" algn="l" defTabSz="914400" rtl="0" eaLnBrk="1" latinLnBrk="0" hangingPunct="1">
+              <a:lnSpc>
+                <a:spcPct val="90000"/>
+              </a:lnSpc>
+              <a:spcBef>
+                <a:spcPts val="500"/>
+              </a:spcBef>
+              <a:buFont typeface="Arial" panose="020B0604020202020204" pitchFamily="34" charset="0"/>
+              <a:buChar char="•"/>
+              <a:defRPr sz="1800" kern="1200">
+                <a:solidFill>
+                  <a:schemeClr val="tx1"/>
+                </a:solidFill>
+                <a:latin typeface="+mn-lt"/>
+                <a:ea typeface="+mn-ea"/>
+                <a:cs typeface="+mn-cs"/>
+              </a:defRPr>
+            </a:lvl9pPr>
+          </a:lstStyle>
+          <a:p>
+            <a:r>
+              <a:rPr lang="en-US" dirty="0"/>
+              <a:t>git config</a:t>
+            </a:r>
+          </a:p>
+          <a:p>
+            <a:pPr lvl="1"/>
+            <a:r>
+              <a:rPr lang="en-US" dirty="0"/>
+              <a:t>repo, system, global, user</a:t>
+            </a:r>
+          </a:p>
+        </p:txBody>
+      </p:sp>
+    </p:spTree>
+    <p:extLst>
+      <p:ext uri="{BB962C8B-B14F-4D97-AF65-F5344CB8AC3E}">
+        <p14:creationId xmlns:p14="http://schemas.microsoft.com/office/powerpoint/2010/main" val="3900068602"/>
+      </p:ext>
+    </p:extLst>
+  </p:cSld>
+  <p:clrMapOvr>
+    <a:masterClrMapping/>
+  </p:clrMapOvr>
+</p:sld>
+</file>
+
+<file path=ppt/slides/slide12.xml><?xml version="1.0" encoding="utf-8"?>
+<p:sld xmlns:a="http://schemas.openxmlformats.org/drawingml/2006/main" xmlns:r="http://schemas.openxmlformats.org/officeDocument/2006/relationships" xmlns:p="http://schemas.openxmlformats.org/presentationml/2006/main">
+  <p:cSld>
+    <p:spTree>
+      <p:nvGrpSpPr>
+        <p:cNvPr id="1" name=""/>
+        <p:cNvGrpSpPr/>
+        <p:nvPr/>
+      </p:nvGrpSpPr>
+      <p:grpSpPr>
+        <a:xfrm>
+          <a:off x="0" y="0"/>
+          <a:ext cx="0" cy="0"/>
+          <a:chOff x="0" y="0"/>
+          <a:chExt cx="0" cy="0"/>
+        </a:xfrm>
+      </p:grpSpPr>
+      <p:sp>
+        <p:nvSpPr>
+          <p:cNvPr id="2" name="Título 1">
+            <a:extLst>
+              <a:ext uri="{FF2B5EF4-FFF2-40B4-BE49-F238E27FC236}">
+                <a16:creationId xmlns:a16="http://schemas.microsoft.com/office/drawing/2014/main" id="{640A16BE-5F07-6D60-67FA-E5A1FBF376D6}"/>
+              </a:ext>
+            </a:extLst>
+          </p:cNvPr>
+          <p:cNvSpPr>
+            <a:spLocks noGrp="1"/>
+          </p:cNvSpPr>
+          <p:nvPr>
+            <p:ph type="title"/>
+          </p:nvPr>
+        </p:nvSpPr>
+        <p:spPr/>
+        <p:txBody>
+          <a:bodyPr/>
+          <a:lstStyle/>
+          <a:p>
+            <a:r>
+              <a:rPr lang="es-ES" dirty="0"/>
+              <a:t>Ideas</a:t>
+            </a:r>
+          </a:p>
+        </p:txBody>
+      </p:sp>
+      <p:sp>
+        <p:nvSpPr>
+          <p:cNvPr id="3" name="Marcador de contenido 2">
+            <a:extLst>
+              <a:ext uri="{FF2B5EF4-FFF2-40B4-BE49-F238E27FC236}">
+                <a16:creationId xmlns:a16="http://schemas.microsoft.com/office/drawing/2014/main" id="{6F9BBD13-4125-DD6B-5FEB-0CEC0CA0DE3D}"/>
+              </a:ext>
+            </a:extLst>
+          </p:cNvPr>
+          <p:cNvSpPr>
+            <a:spLocks noGrp="1"/>
+          </p:cNvSpPr>
+          <p:nvPr>
+            <p:ph idx="1"/>
+          </p:nvPr>
+        </p:nvSpPr>
+        <p:spPr/>
+        <p:txBody>
+          <a:bodyPr/>
+          <a:lstStyle/>
+          <a:p>
+            <a:r>
+              <a:rPr lang="es-ES" dirty="0"/>
+              <a:t>en </a:t>
+            </a:r>
+            <a:r>
+              <a:rPr lang="es-ES" dirty="0" err="1"/>
+              <a:t>git</a:t>
+            </a:r>
+            <a:r>
+              <a:rPr lang="es-ES" dirty="0"/>
+              <a:t>, para lo de </a:t>
+            </a:r>
+            <a:r>
+              <a:rPr lang="es-ES" dirty="0" err="1"/>
+              <a:t>git</a:t>
+            </a:r>
+            <a:r>
+              <a:rPr lang="es-ES" dirty="0"/>
+              <a:t>, si la rama es un hilo, un </a:t>
+            </a:r>
+            <a:r>
+              <a:rPr lang="es-ES" dirty="0" err="1"/>
+              <a:t>merge</a:t>
+            </a:r>
+            <a:r>
+              <a:rPr lang="es-ES" dirty="0"/>
+              <a:t> es hacerle un nudo y un rebase es deshilacharlo y volverlo a hilar desde determinado punto, según el contexto, una cosa interesa más que la otra</a:t>
+            </a:r>
+          </a:p>
+        </p:txBody>
+      </p:sp>
+    </p:spTree>
+    <p:extLst>
+      <p:ext uri="{BB962C8B-B14F-4D97-AF65-F5344CB8AC3E}">
+        <p14:creationId xmlns:p14="http://schemas.microsoft.com/office/powerpoint/2010/main" val="3469826890"/>
+      </p:ext>
+    </p:extLst>
+  </p:cSld>
+  <p:clrMapOvr>
+    <a:masterClrMapping/>
+  </p:clrMapOvr>
+</p:sld>
+</file>
+
+<file path=ppt/slides/slide13.xml><?xml version="1.0" encoding="utf-8"?>
+<p:sld xmlns:a="http://schemas.openxmlformats.org/drawingml/2006/main" xmlns:r="http://schemas.openxmlformats.org/officeDocument/2006/relationships" xmlns:p="http://schemas.openxmlformats.org/presentationml/2006/main">
+  <p:cSld>
+    <p:bg>
+      <p:bgPr>
+        <a:solidFill>
+          <a:schemeClr val="bg1"/>
+        </a:solidFill>
+        <a:effectLst/>
+      </p:bgPr>
+    </p:bg>
+    <p:spTree>
+      <p:nvGrpSpPr>
+        <p:cNvPr id="1" name=""/>
+        <p:cNvGrpSpPr/>
+        <p:nvPr/>
+      </p:nvGrpSpPr>
+      <p:grpSpPr>
+        <a:xfrm>
+          <a:off x="0" y="0"/>
+          <a:ext cx="0" cy="0"/>
+          <a:chOff x="0" y="0"/>
+          <a:chExt cx="0" cy="0"/>
+        </a:xfrm>
+      </p:grpSpPr>
+      <p:sp useBgFill="1">
+        <p:nvSpPr>
+          <p:cNvPr id="48" name="Rectangle 47">
+            <a:extLst>
+              <a:ext uri="{FF2B5EF4-FFF2-40B4-BE49-F238E27FC236}">
+                <a16:creationId xmlns:a16="http://schemas.microsoft.com/office/drawing/2014/main" id="{2B97F24A-32CE-4C1C-A50D-3016B394DCFB}"/>
+              </a:ext>
+              <a:ext uri="{C183D7F6-B498-43B3-948B-1728B52AA6E4}">
+                <adec:decorative xmlns:adec="http://schemas.microsoft.com/office/drawing/2017/decorative" val="1"/>
+              </a:ext>
+            </a:extLst>
+          </p:cNvPr>
+          <p:cNvSpPr>
+            <a:spLocks noGrp="1" noRot="1" noChangeAspect="1" noMove="1" noResize="1" noEditPoints="1" noAdjustHandles="1" noChangeArrowheads="1" noChangeShapeType="1" noTextEdit="1"/>
+          </p:cNvSpPr>
+          <p:nvPr>
+            <p:extLst>
+              <p:ext uri="{386F3935-93C4-4BCD-93E2-E3B085C9AB24}">
+                <p16:designElem xmlns:p16="http://schemas.microsoft.com/office/powerpoint/2015/main" val="1"/>
+              </p:ext>
+            </p:extLst>
+          </p:nvPr>
+        </p:nvSpPr>
+        <p:spPr>
+          <a:xfrm>
+            <a:off x="0" y="0"/>
+            <a:ext cx="12192000" cy="6858000"/>
+          </a:xfrm>
+          <a:prstGeom prst="rect">
+            <a:avLst/>
+          </a:prstGeom>
+          <a:ln>
+            <a:noFill/>
+          </a:ln>
+        </p:spPr>
+        <p:style>
+          <a:lnRef idx="2">
+            <a:schemeClr val="accent1">
+              <a:shade val="50000"/>
+            </a:schemeClr>
+          </a:lnRef>
+          <a:fillRef idx="1">
+            <a:schemeClr val="accent1"/>
+          </a:fillRef>
+          <a:effectRef idx="0">
+            <a:schemeClr val="accent1"/>
+          </a:effectRef>
+          <a:fontRef idx="minor">
+            <a:schemeClr val="lt1"/>
+          </a:fontRef>
+        </p:style>
+        <p:txBody>
+          <a:bodyPr rtlCol="0" anchor="ctr"/>
+          <a:lstStyle/>
+          <a:p>
+            <a:pPr algn="ctr"/>
+            <a:endParaRPr lang="en-US"/>
+          </a:p>
+        </p:txBody>
+      </p:sp>
+      <p:sp>
+        <p:nvSpPr>
+          <p:cNvPr id="2" name="Título 1">
+            <a:extLst>
+              <a:ext uri="{FF2B5EF4-FFF2-40B4-BE49-F238E27FC236}">
+                <a16:creationId xmlns:a16="http://schemas.microsoft.com/office/drawing/2014/main" id="{389B006D-DD3F-2430-7C49-E47A46D7D2BA}"/>
+              </a:ext>
+            </a:extLst>
+          </p:cNvPr>
+          <p:cNvSpPr>
+            <a:spLocks noGrp="1"/>
+          </p:cNvSpPr>
+          <p:nvPr>
+            <p:ph type="title"/>
+          </p:nvPr>
+        </p:nvSpPr>
+        <p:spPr>
+          <a:xfrm>
+            <a:off x="630936" y="639520"/>
+            <a:ext cx="3429000" cy="1719072"/>
+          </a:xfrm>
+        </p:spPr>
+        <p:txBody>
+          <a:bodyPr vert="horz" lIns="91440" tIns="45720" rIns="91440" bIns="45720" rtlCol="0" anchor="b">
+            <a:normAutofit/>
+          </a:bodyPr>
+          <a:lstStyle/>
+          <a:p>
+            <a:r>
+              <a:rPr lang="en-US" sz="3000" kern="1200" dirty="0">
+                <a:solidFill>
+                  <a:schemeClr val="tx1"/>
+                </a:solidFill>
+                <a:latin typeface="+mj-lt"/>
+                <a:ea typeface="+mj-ea"/>
+                <a:cs typeface="+mj-cs"/>
+              </a:rPr>
+              <a:t>RECAPITULANDO…</a:t>
+            </a:r>
+          </a:p>
+        </p:txBody>
+      </p:sp>
+      <p:sp>
+        <p:nvSpPr>
+          <p:cNvPr id="50" name="sketch line">
+            <a:extLst>
+              <a:ext uri="{FF2B5EF4-FFF2-40B4-BE49-F238E27FC236}">
+                <a16:creationId xmlns:a16="http://schemas.microsoft.com/office/drawing/2014/main" id="{CD8B4F24-440B-49E9-B85D-733523DC064B}"/>
+              </a:ext>
+              <a:ext uri="{C183D7F6-B498-43B3-948B-1728B52AA6E4}">
+                <adec:decorative xmlns:adec="http://schemas.microsoft.com/office/drawing/2017/decorative" val="1"/>
+              </a:ext>
+            </a:extLst>
+          </p:cNvPr>
+          <p:cNvSpPr>
+            <a:spLocks noGrp="1" noRot="1" noChangeAspect="1" noMove="1" noResize="1" noEditPoints="1" noAdjustHandles="1" noChangeArrowheads="1" noChangeShapeType="1" noTextEdit="1"/>
+          </p:cNvSpPr>
+          <p:nvPr>
+            <p:extLst>
+              <p:ext uri="{386F3935-93C4-4BCD-93E2-E3B085C9AB24}">
+                <p16:designElem xmlns:p16="http://schemas.microsoft.com/office/powerpoint/2015/main" val="1"/>
+              </p:ext>
+            </p:extLst>
+          </p:nvPr>
+        </p:nvSpPr>
+        <p:spPr>
+          <a:xfrm>
+            <a:off x="643278" y="2573756"/>
+            <a:ext cx="3255095" cy="18288"/>
+          </a:xfrm>
+          <a:custGeom>
+            <a:avLst/>
+            <a:gdLst>
+              <a:gd name="connsiteX0" fmla="*/ 0 w 3255095"/>
+              <a:gd name="connsiteY0" fmla="*/ 0 h 18288"/>
+              <a:gd name="connsiteX1" fmla="*/ 618468 w 3255095"/>
+              <a:gd name="connsiteY1" fmla="*/ 0 h 18288"/>
+              <a:gd name="connsiteX2" fmla="*/ 1269487 w 3255095"/>
+              <a:gd name="connsiteY2" fmla="*/ 0 h 18288"/>
+              <a:gd name="connsiteX3" fmla="*/ 1953057 w 3255095"/>
+              <a:gd name="connsiteY3" fmla="*/ 0 h 18288"/>
+              <a:gd name="connsiteX4" fmla="*/ 2636627 w 3255095"/>
+              <a:gd name="connsiteY4" fmla="*/ 0 h 18288"/>
+              <a:gd name="connsiteX5" fmla="*/ 3255095 w 3255095"/>
+              <a:gd name="connsiteY5" fmla="*/ 0 h 18288"/>
+              <a:gd name="connsiteX6" fmla="*/ 3255095 w 3255095"/>
+              <a:gd name="connsiteY6" fmla="*/ 18288 h 18288"/>
+              <a:gd name="connsiteX7" fmla="*/ 2538974 w 3255095"/>
+              <a:gd name="connsiteY7" fmla="*/ 18288 h 18288"/>
+              <a:gd name="connsiteX8" fmla="*/ 1822853 w 3255095"/>
+              <a:gd name="connsiteY8" fmla="*/ 18288 h 18288"/>
+              <a:gd name="connsiteX9" fmla="*/ 1171834 w 3255095"/>
+              <a:gd name="connsiteY9" fmla="*/ 18288 h 18288"/>
+              <a:gd name="connsiteX10" fmla="*/ 0 w 3255095"/>
+              <a:gd name="connsiteY10" fmla="*/ 18288 h 18288"/>
+              <a:gd name="connsiteX11" fmla="*/ 0 w 3255095"/>
+              <a:gd name="connsiteY11" fmla="*/ 0 h 18288"/>
+            </a:gdLst>
+            <a:ahLst/>
+            <a:cxnLst>
+              <a:cxn ang="0">
+                <a:pos x="connsiteX0" y="connsiteY0"/>
+              </a:cxn>
+              <a:cxn ang="0">
+                <a:pos x="connsiteX1" y="connsiteY1"/>
+              </a:cxn>
+              <a:cxn ang="0">
+                <a:pos x="connsiteX2" y="connsiteY2"/>
+              </a:cxn>
+              <a:cxn ang="0">
+                <a:pos x="connsiteX3" y="connsiteY3"/>
+              </a:cxn>
+              <a:cxn ang="0">
+                <a:pos x="connsiteX4" y="connsiteY4"/>
+              </a:cxn>
+              <a:cxn ang="0">
+                <a:pos x="connsiteX5" y="connsiteY5"/>
+              </a:cxn>
+              <a:cxn ang="0">
+                <a:pos x="connsiteX6" y="connsiteY6"/>
+              </a:cxn>
+              <a:cxn ang="0">
+                <a:pos x="connsiteX7" y="connsiteY7"/>
+              </a:cxn>
+              <a:cxn ang="0">
+                <a:pos x="connsiteX8" y="connsiteY8"/>
+              </a:cxn>
+              <a:cxn ang="0">
+                <a:pos x="connsiteX9" y="connsiteY9"/>
+              </a:cxn>
+              <a:cxn ang="0">
+                <a:pos x="connsiteX10" y="connsiteY10"/>
+              </a:cxn>
+              <a:cxn ang="0">
+                <a:pos x="connsiteX11" y="connsiteY11"/>
+              </a:cxn>
+            </a:cxnLst>
+            <a:rect l="l" t="t" r="r" b="b"/>
+            <a:pathLst>
+              <a:path w="3255095" h="18288" fill="none" extrusionOk="0">
+                <a:moveTo>
+                  <a:pt x="0" y="0"/>
+                </a:moveTo>
+                <a:cubicBezTo>
+                  <a:pt x="240201" y="-22123"/>
+                  <a:pt x="462021" y="-19623"/>
+                  <a:pt x="618468" y="0"/>
+                </a:cubicBezTo>
+                <a:cubicBezTo>
+                  <a:pt x="774915" y="19623"/>
+                  <a:pt x="974734" y="2035"/>
+                  <a:pt x="1269487" y="0"/>
+                </a:cubicBezTo>
+                <a:cubicBezTo>
+                  <a:pt x="1564240" y="-2035"/>
+                  <a:pt x="1733579" y="10639"/>
+                  <a:pt x="1953057" y="0"/>
+                </a:cubicBezTo>
+                <a:cubicBezTo>
+                  <a:pt x="2172535" y="-10639"/>
+                  <a:pt x="2453962" y="14018"/>
+                  <a:pt x="2636627" y="0"/>
+                </a:cubicBezTo>
+                <a:cubicBezTo>
+                  <a:pt x="2819292" y="-14018"/>
+                  <a:pt x="3121375" y="5399"/>
+                  <a:pt x="3255095" y="0"/>
+                </a:cubicBezTo>
+                <a:cubicBezTo>
+                  <a:pt x="3254386" y="8157"/>
+                  <a:pt x="3254682" y="12125"/>
+                  <a:pt x="3255095" y="18288"/>
+                </a:cubicBezTo>
+                <a:cubicBezTo>
+                  <a:pt x="3088545" y="23203"/>
+                  <a:pt x="2687475" y="7419"/>
+                  <a:pt x="2538974" y="18288"/>
+                </a:cubicBezTo>
+                <a:cubicBezTo>
+                  <a:pt x="2390473" y="29157"/>
+                  <a:pt x="2137381" y="-8959"/>
+                  <a:pt x="1822853" y="18288"/>
+                </a:cubicBezTo>
+                <a:cubicBezTo>
+                  <a:pt x="1508325" y="45535"/>
+                  <a:pt x="1466437" y="20385"/>
+                  <a:pt x="1171834" y="18288"/>
+                </a:cubicBezTo>
+                <a:cubicBezTo>
+                  <a:pt x="877231" y="16191"/>
+                  <a:pt x="561097" y="37643"/>
+                  <a:pt x="0" y="18288"/>
+                </a:cubicBezTo>
+                <a:cubicBezTo>
+                  <a:pt x="-46" y="12483"/>
+                  <a:pt x="-203" y="6491"/>
+                  <a:pt x="0" y="0"/>
+                </a:cubicBezTo>
+                <a:close/>
+              </a:path>
+              <a:path w="3255095" h="18288" stroke="0" extrusionOk="0">
+                <a:moveTo>
+                  <a:pt x="0" y="0"/>
+                </a:moveTo>
+                <a:cubicBezTo>
+                  <a:pt x="291965" y="19429"/>
+                  <a:pt x="363155" y="8568"/>
+                  <a:pt x="618468" y="0"/>
+                </a:cubicBezTo>
+                <a:cubicBezTo>
+                  <a:pt x="873781" y="-8568"/>
+                  <a:pt x="904459" y="-19505"/>
+                  <a:pt x="1171834" y="0"/>
+                </a:cubicBezTo>
+                <a:cubicBezTo>
+                  <a:pt x="1439209" y="19505"/>
+                  <a:pt x="1744369" y="9790"/>
+                  <a:pt x="1887955" y="0"/>
+                </a:cubicBezTo>
+                <a:cubicBezTo>
+                  <a:pt x="2031541" y="-9790"/>
+                  <a:pt x="2346378" y="21240"/>
+                  <a:pt x="2506423" y="0"/>
+                </a:cubicBezTo>
+                <a:cubicBezTo>
+                  <a:pt x="2666468" y="-21240"/>
+                  <a:pt x="2990257" y="30414"/>
+                  <a:pt x="3255095" y="0"/>
+                </a:cubicBezTo>
+                <a:cubicBezTo>
+                  <a:pt x="3254831" y="4493"/>
+                  <a:pt x="3255479" y="9472"/>
+                  <a:pt x="3255095" y="18288"/>
+                </a:cubicBezTo>
+                <a:cubicBezTo>
+                  <a:pt x="3120743" y="16690"/>
+                  <a:pt x="2759628" y="42462"/>
+                  <a:pt x="2604076" y="18288"/>
+                </a:cubicBezTo>
+                <a:cubicBezTo>
+                  <a:pt x="2448524" y="-5886"/>
+                  <a:pt x="2184336" y="19599"/>
+                  <a:pt x="1887955" y="18288"/>
+                </a:cubicBezTo>
+                <a:cubicBezTo>
+                  <a:pt x="1591574" y="16977"/>
+                  <a:pt x="1548845" y="6870"/>
+                  <a:pt x="1334589" y="18288"/>
+                </a:cubicBezTo>
+                <a:cubicBezTo>
+                  <a:pt x="1120333" y="29706"/>
+                  <a:pt x="996014" y="9662"/>
+                  <a:pt x="683570" y="18288"/>
+                </a:cubicBezTo>
+                <a:cubicBezTo>
+                  <a:pt x="371126" y="26914"/>
+                  <a:pt x="198687" y="16167"/>
+                  <a:pt x="0" y="18288"/>
+                </a:cubicBezTo>
+                <a:cubicBezTo>
+                  <a:pt x="843" y="9577"/>
+                  <a:pt x="371" y="6900"/>
+                  <a:pt x="0" y="0"/>
+                </a:cubicBezTo>
+                <a:close/>
+              </a:path>
+            </a:pathLst>
+          </a:custGeom>
+          <a:solidFill>
+            <a:schemeClr val="accent2"/>
+          </a:solidFill>
+          <a:ln w="38100" cap="rnd">
+            <a:solidFill>
+              <a:schemeClr val="accent2"/>
+            </a:solidFill>
+            <a:round/>
+            <a:extLst>
+              <a:ext uri="{C807C97D-BFC1-408E-A445-0C87EB9F89A2}">
+                <ask:lineSketchStyleProps xmlns:ask="http://schemas.microsoft.com/office/drawing/2018/sketchyshapes" sd="1219033472">
+                  <a:prstGeom prst="rect">
+                    <a:avLst/>
+                  </a:prstGeom>
+                  <ask:type>
+                    <ask:lineSketchFreehand/>
+                  </ask:type>
+                </ask:lineSketchStyleProps>
+              </a:ext>
+            </a:extLst>
+          </a:ln>
+        </p:spPr>
+        <p:style>
+          <a:lnRef idx="2">
+            <a:schemeClr val="accent1">
+              <a:shade val="50000"/>
+            </a:schemeClr>
+          </a:lnRef>
+          <a:fillRef idx="1">
+            <a:schemeClr val="accent1"/>
+          </a:fillRef>
+          <a:effectRef idx="0">
+            <a:schemeClr val="accent1"/>
+          </a:effectRef>
+          <a:fontRef idx="minor">
+            <a:schemeClr val="lt1"/>
+          </a:fontRef>
+        </p:style>
+        <p:txBody>
+          <a:bodyPr rtlCol="0" anchor="ctr"/>
+          <a:lstStyle/>
+          <a:p>
+            <a:pPr algn="ctr"/>
+            <a:endParaRPr lang="en-US"/>
+          </a:p>
+        </p:txBody>
+      </p:sp>
+      <p:sp>
+        <p:nvSpPr>
+          <p:cNvPr id="6" name="CuadroTexto 5">
+            <a:extLst>
+              <a:ext uri="{FF2B5EF4-FFF2-40B4-BE49-F238E27FC236}">
+                <a16:creationId xmlns:a16="http://schemas.microsoft.com/office/drawing/2014/main" id="{8AF554BB-4A60-B82C-7228-0281FF7954DA}"/>
+              </a:ext>
+            </a:extLst>
+          </p:cNvPr>
+          <p:cNvSpPr txBox="1"/>
+          <p:nvPr/>
+        </p:nvSpPr>
+        <p:spPr>
+          <a:xfrm>
+            <a:off x="630936" y="2807208"/>
+            <a:ext cx="3429000" cy="3410712"/>
+          </a:xfrm>
+          <a:prstGeom prst="rect">
+            <a:avLst/>
+          </a:prstGeom>
+        </p:spPr>
+        <p:txBody>
+          <a:bodyPr vert="horz" lIns="91440" tIns="45720" rIns="91440" bIns="45720" rtlCol="0" anchor="t">
+            <a:normAutofit/>
+          </a:bodyPr>
+          <a:lstStyle/>
+          <a:p>
+            <a:pPr marL="285750" indent="-228600">
+              <a:lnSpc>
+                <a:spcPct val="90000"/>
+              </a:lnSpc>
+              <a:spcAft>
+                <a:spcPts val="600"/>
+              </a:spcAft>
+              <a:buFont typeface="Arial" panose="020B0604020202020204" pitchFamily="34" charset="0"/>
+              <a:buChar char="•"/>
+            </a:pPr>
+            <a:r>
+              <a:rPr lang="en-US" sz="1900"/>
+              <a:t>git init</a:t>
+            </a:r>
+          </a:p>
+          <a:p>
+            <a:pPr marL="285750" indent="-228600">
+              <a:lnSpc>
+                <a:spcPct val="90000"/>
+              </a:lnSpc>
+              <a:spcAft>
+                <a:spcPts val="600"/>
+              </a:spcAft>
+              <a:buFont typeface="Arial" panose="020B0604020202020204" pitchFamily="34" charset="0"/>
+              <a:buChar char="•"/>
+            </a:pPr>
+            <a:r>
+              <a:rPr lang="en-US" sz="1900"/>
+              <a:t>git add</a:t>
+            </a:r>
+          </a:p>
+          <a:p>
+            <a:pPr marL="285750" indent="-228600">
+              <a:lnSpc>
+                <a:spcPct val="90000"/>
+              </a:lnSpc>
+              <a:spcAft>
+                <a:spcPts val="600"/>
+              </a:spcAft>
+              <a:buFont typeface="Arial" panose="020B0604020202020204" pitchFamily="34" charset="0"/>
+              <a:buChar char="•"/>
+            </a:pPr>
+            <a:r>
+              <a:rPr lang="en-US" sz="1900"/>
+              <a:t>git commit</a:t>
+            </a:r>
+          </a:p>
+          <a:p>
+            <a:pPr marL="285750" indent="-228600">
+              <a:lnSpc>
+                <a:spcPct val="90000"/>
+              </a:lnSpc>
+              <a:spcAft>
+                <a:spcPts val="600"/>
+              </a:spcAft>
+              <a:buFont typeface="Arial" panose="020B0604020202020204" pitchFamily="34" charset="0"/>
+              <a:buChar char="•"/>
+            </a:pPr>
+            <a:r>
+              <a:rPr lang="en-US" sz="1900"/>
+              <a:t>git branch</a:t>
+            </a:r>
+          </a:p>
+          <a:p>
+            <a:pPr marL="285750" indent="-228600">
+              <a:lnSpc>
+                <a:spcPct val="90000"/>
+              </a:lnSpc>
+              <a:spcAft>
+                <a:spcPts val="600"/>
+              </a:spcAft>
+              <a:buFont typeface="Arial" panose="020B0604020202020204" pitchFamily="34" charset="0"/>
+              <a:buChar char="•"/>
+            </a:pPr>
+            <a:r>
+              <a:rPr lang="en-US" sz="1900"/>
+              <a:t>git checkout</a:t>
+            </a:r>
+          </a:p>
+          <a:p>
+            <a:pPr marL="285750" indent="-228600">
+              <a:lnSpc>
+                <a:spcPct val="90000"/>
+              </a:lnSpc>
+              <a:spcAft>
+                <a:spcPts val="600"/>
+              </a:spcAft>
+              <a:buFont typeface="Arial" panose="020B0604020202020204" pitchFamily="34" charset="0"/>
+              <a:buChar char="•"/>
+            </a:pPr>
+            <a:r>
+              <a:rPr lang="en-US" sz="1900"/>
+              <a:t>git push</a:t>
+            </a:r>
+          </a:p>
+          <a:p>
+            <a:pPr marL="285750" indent="-228600">
+              <a:lnSpc>
+                <a:spcPct val="90000"/>
+              </a:lnSpc>
+              <a:spcAft>
+                <a:spcPts val="600"/>
+              </a:spcAft>
+              <a:buFont typeface="Arial" panose="020B0604020202020204" pitchFamily="34" charset="0"/>
+              <a:buChar char="•"/>
+            </a:pPr>
+            <a:r>
+              <a:rPr lang="en-US" sz="1900"/>
+              <a:t>git pull</a:t>
+            </a:r>
+          </a:p>
+          <a:p>
+            <a:pPr marL="285750" indent="-228600">
+              <a:lnSpc>
+                <a:spcPct val="90000"/>
+              </a:lnSpc>
+              <a:spcAft>
+                <a:spcPts val="600"/>
+              </a:spcAft>
+              <a:buFont typeface="Arial" panose="020B0604020202020204" pitchFamily="34" charset="0"/>
+              <a:buChar char="•"/>
+            </a:pPr>
+            <a:r>
+              <a:rPr lang="en-US" sz="1900"/>
+              <a:t>git fetch</a:t>
+            </a:r>
+          </a:p>
+          <a:p>
+            <a:pPr marL="285750" indent="-228600">
+              <a:lnSpc>
+                <a:spcPct val="90000"/>
+              </a:lnSpc>
+              <a:spcAft>
+                <a:spcPts val="600"/>
+              </a:spcAft>
+              <a:buFont typeface="Arial" panose="020B0604020202020204" pitchFamily="34" charset="0"/>
+              <a:buChar char="•"/>
+            </a:pPr>
+            <a:r>
+              <a:rPr lang="en-US" sz="1900"/>
+              <a:t>git merge</a:t>
+            </a:r>
+          </a:p>
+          <a:p>
+            <a:pPr marL="285750" indent="-228600">
+              <a:lnSpc>
+                <a:spcPct val="90000"/>
+              </a:lnSpc>
+              <a:spcAft>
+                <a:spcPts val="600"/>
+              </a:spcAft>
+              <a:buFont typeface="Arial" panose="020B0604020202020204" pitchFamily="34" charset="0"/>
+              <a:buChar char="•"/>
+            </a:pPr>
+            <a:r>
+              <a:rPr lang="en-US" sz="1900"/>
+              <a:t>git rebase</a:t>
+            </a:r>
+          </a:p>
+        </p:txBody>
+      </p:sp>
+      <p:pic>
+        <p:nvPicPr>
+          <p:cNvPr id="37" name="Imagen 36" descr="Diagrama&#10;&#10;Descripción generada automáticamente">
+            <a:extLst>
+              <a:ext uri="{FF2B5EF4-FFF2-40B4-BE49-F238E27FC236}">
+                <a16:creationId xmlns:a16="http://schemas.microsoft.com/office/drawing/2014/main" id="{3F6FBCA6-02C1-2F64-5E5D-20013E78F83F}"/>
+              </a:ext>
+            </a:extLst>
+          </p:cNvPr>
+          <p:cNvPicPr>
+            <a:picLocks noChangeAspect="1"/>
+          </p:cNvPicPr>
+          <p:nvPr/>
+        </p:nvPicPr>
+        <p:blipFill>
+          <a:blip r:embed="rId2">
+            <a:extLst>
+              <a:ext uri="{28A0092B-C50C-407E-A947-70E740481C1C}">
+                <a14:useLocalDpi xmlns:a14="http://schemas.microsoft.com/office/drawing/2010/main" val="0"/>
+              </a:ext>
+            </a:extLst>
+          </a:blip>
+          <a:stretch>
+            <a:fillRect/>
+          </a:stretch>
+        </p:blipFill>
+        <p:spPr>
+          <a:xfrm>
+            <a:off x="4654296" y="1452811"/>
+            <a:ext cx="6903720" cy="3952378"/>
+          </a:xfrm>
+          <a:prstGeom prst="rect">
+            <a:avLst/>
+          </a:prstGeom>
+        </p:spPr>
+      </p:pic>
+    </p:spTree>
+    <p:extLst>
+      <p:ext uri="{BB962C8B-B14F-4D97-AF65-F5344CB8AC3E}">
+        <p14:creationId xmlns:p14="http://schemas.microsoft.com/office/powerpoint/2010/main" val="3628677632"/>
+      </p:ext>
+    </p:extLst>
+  </p:cSld>
+  <p:clrMapOvr>
+    <a:masterClrMapping/>
+  </p:clrMapOvr>
+</p:sld>
+</file>
+
+<file path=ppt/slides/slide14.xml><?xml version="1.0" encoding="utf-8"?>
+<p:sld xmlns:a="http://schemas.openxmlformats.org/drawingml/2006/main" xmlns:r="http://schemas.openxmlformats.org/officeDocument/2006/relationships" xmlns:p="http://schemas.openxmlformats.org/presentationml/2006/main">
+  <p:cSld>
+    <p:spTree>
+      <p:nvGrpSpPr>
+        <p:cNvPr id="1" name=""/>
+        <p:cNvGrpSpPr/>
+        <p:nvPr/>
+      </p:nvGrpSpPr>
+      <p:grpSpPr>
+        <a:xfrm>
+          <a:off x="0" y="0"/>
+          <a:ext cx="0" cy="0"/>
+          <a:chOff x="0" y="0"/>
+          <a:chExt cx="0" cy="0"/>
+        </a:xfrm>
+      </p:grpSpPr>
+      <p:sp>
+        <p:nvSpPr>
+          <p:cNvPr id="2" name="Título 1">
+            <a:extLst>
+              <a:ext uri="{FF2B5EF4-FFF2-40B4-BE49-F238E27FC236}">
+                <a16:creationId xmlns:a16="http://schemas.microsoft.com/office/drawing/2014/main" id="{42715802-6776-BEE6-18FA-C301FE203DE9}"/>
+              </a:ext>
+            </a:extLst>
+          </p:cNvPr>
+          <p:cNvSpPr>
+            <a:spLocks noGrp="1"/>
+          </p:cNvSpPr>
+          <p:nvPr>
+            <p:ph type="title"/>
+          </p:nvPr>
+        </p:nvSpPr>
+        <p:spPr/>
+        <p:txBody>
+          <a:bodyPr/>
+          <a:lstStyle/>
+          <a:p>
+            <a:r>
+              <a:rPr lang="es-ES" dirty="0"/>
+              <a:t>Manejo de armas</a:t>
+            </a:r>
+          </a:p>
+        </p:txBody>
+      </p:sp>
+      <p:sp>
+        <p:nvSpPr>
+          <p:cNvPr id="3" name="Marcador de contenido 2">
+            <a:extLst>
+              <a:ext uri="{FF2B5EF4-FFF2-40B4-BE49-F238E27FC236}">
+                <a16:creationId xmlns:a16="http://schemas.microsoft.com/office/drawing/2014/main" id="{3BAE585B-A8FC-CB5A-4DDF-ADB9A26BC2F2}"/>
+              </a:ext>
+            </a:extLst>
+          </p:cNvPr>
+          <p:cNvSpPr>
+            <a:spLocks noGrp="1"/>
+          </p:cNvSpPr>
+          <p:nvPr>
+            <p:ph idx="1"/>
+          </p:nvPr>
+        </p:nvSpPr>
+        <p:spPr/>
+        <p:txBody>
+          <a:bodyPr/>
+          <a:lstStyle/>
+          <a:p>
+            <a:r>
+              <a:rPr lang="es-ES" dirty="0" err="1"/>
+              <a:t>simplifying</a:t>
+            </a:r>
+            <a:r>
+              <a:rPr lang="es-ES" dirty="0"/>
+              <a:t>-</a:t>
+            </a:r>
+            <a:r>
+              <a:rPr lang="es-ES" dirty="0" err="1"/>
+              <a:t>git</a:t>
+            </a:r>
+            <a:r>
+              <a:rPr lang="es-ES" dirty="0"/>
+              <a:t>-</a:t>
+            </a:r>
+            <a:r>
+              <a:rPr lang="es-ES" dirty="0" err="1"/>
+              <a:t>gaining</a:t>
+            </a:r>
+            <a:r>
+              <a:rPr lang="es-ES" dirty="0"/>
+              <a:t>-</a:t>
+            </a:r>
+            <a:r>
+              <a:rPr lang="es-ES" dirty="0" err="1"/>
+              <a:t>confidence</a:t>
+            </a:r>
+            <a:r>
+              <a:rPr lang="es-ES" dirty="0"/>
+              <a:t>-</a:t>
+            </a:r>
+            <a:r>
+              <a:rPr lang="es-ES" dirty="0" err="1"/>
+              <a:t>in-the-cli</a:t>
+            </a:r>
+            <a:endParaRPr lang="es-ES" dirty="0"/>
+          </a:p>
+        </p:txBody>
+      </p:sp>
+    </p:spTree>
+    <p:extLst>
+      <p:ext uri="{BB962C8B-B14F-4D97-AF65-F5344CB8AC3E}">
+        <p14:creationId xmlns:p14="http://schemas.microsoft.com/office/powerpoint/2010/main" val="1432434206"/>
+      </p:ext>
+    </p:extLst>
+  </p:cSld>
+  <p:clrMapOvr>
+    <a:masterClrMapping/>
+  </p:clrMapOvr>
+</p:sld>
+</file>
+
+<file path=ppt/slides/slide15.xml><?xml version="1.0" encoding="utf-8"?>
+<p:sld xmlns:a="http://schemas.openxmlformats.org/drawingml/2006/main" xmlns:r="http://schemas.openxmlformats.org/officeDocument/2006/relationships" xmlns:p="http://schemas.openxmlformats.org/presentationml/2006/main">
+  <p:cSld>
+    <p:spTree>
+      <p:nvGrpSpPr>
+        <p:cNvPr id="1" name=""/>
+        <p:cNvGrpSpPr/>
+        <p:nvPr/>
+      </p:nvGrpSpPr>
+      <p:grpSpPr>
+        <a:xfrm>
+          <a:off x="0" y="0"/>
+          <a:ext cx="0" cy="0"/>
+          <a:chOff x="0" y="0"/>
+          <a:chExt cx="0" cy="0"/>
+        </a:xfrm>
+      </p:grpSpPr>
+      <p:sp>
+        <p:nvSpPr>
+          <p:cNvPr id="2" name="Título 1">
+            <a:extLst>
+              <a:ext uri="{FF2B5EF4-FFF2-40B4-BE49-F238E27FC236}">
+                <a16:creationId xmlns:a16="http://schemas.microsoft.com/office/drawing/2014/main" id="{C79C412B-6C43-31D1-2A70-01F7FB254A70}"/>
+              </a:ext>
+            </a:extLst>
+          </p:cNvPr>
+          <p:cNvSpPr>
+            <a:spLocks noGrp="1"/>
+          </p:cNvSpPr>
+          <p:nvPr>
+            <p:ph type="title"/>
+          </p:nvPr>
+        </p:nvSpPr>
+        <p:spPr/>
+        <p:txBody>
+          <a:bodyPr/>
+          <a:lstStyle/>
+          <a:p>
+            <a:r>
+              <a:rPr lang="es-ES" dirty="0"/>
+              <a:t>Los salvavidas</a:t>
+            </a:r>
+          </a:p>
+        </p:txBody>
+      </p:sp>
+      <p:sp>
+        <p:nvSpPr>
+          <p:cNvPr id="3" name="Marcador de contenido 2">
+            <a:extLst>
+              <a:ext uri="{FF2B5EF4-FFF2-40B4-BE49-F238E27FC236}">
+                <a16:creationId xmlns:a16="http://schemas.microsoft.com/office/drawing/2014/main" id="{8CC7FD6D-93AC-88E5-C1C0-2B30C5E10C3B}"/>
+              </a:ext>
+            </a:extLst>
+          </p:cNvPr>
+          <p:cNvSpPr>
+            <a:spLocks noGrp="1"/>
+          </p:cNvSpPr>
+          <p:nvPr>
+            <p:ph idx="1"/>
+          </p:nvPr>
+        </p:nvSpPr>
+        <p:spPr/>
+        <p:txBody>
+          <a:bodyPr/>
+          <a:lstStyle/>
+          <a:p>
+            <a:endParaRPr lang="es-ES"/>
+          </a:p>
+        </p:txBody>
+      </p:sp>
+    </p:spTree>
+    <p:extLst>
+      <p:ext uri="{BB962C8B-B14F-4D97-AF65-F5344CB8AC3E}">
+        <p14:creationId xmlns:p14="http://schemas.microsoft.com/office/powerpoint/2010/main" val="291127068"/>
+      </p:ext>
+    </p:extLst>
+  </p:cSld>
+  <p:clrMapOvr>
+    <a:masterClrMapping/>
+  </p:clrMapOvr>
+</p:sld>
+</file>
+
 <file path=ppt/slides/slide2.xml><?xml version="1.0" encoding="utf-8"?>
+<p:sld xmlns:a="http://schemas.openxmlformats.org/drawingml/2006/main" xmlns:r="http://schemas.openxmlformats.org/officeDocument/2006/relationships" xmlns:p="http://schemas.openxmlformats.org/presentationml/2006/main">
+  <p:cSld>
+    <p:bg>
+      <p:bgPr>
+        <a:solidFill>
+          <a:schemeClr val="bg1"/>
+        </a:solidFill>
+        <a:effectLst/>
+      </p:bgPr>
+    </p:bg>
+    <p:spTree>
+      <p:nvGrpSpPr>
+        <p:cNvPr id="1" name=""/>
+        <p:cNvGrpSpPr/>
+        <p:nvPr/>
+      </p:nvGrpSpPr>
+      <p:grpSpPr>
+        <a:xfrm>
+          <a:off x="0" y="0"/>
+          <a:ext cx="0" cy="0"/>
+          <a:chOff x="0" y="0"/>
+          <a:chExt cx="0" cy="0"/>
+        </a:xfrm>
+      </p:grpSpPr>
+      <p:sp>
+        <p:nvSpPr>
+          <p:cNvPr id="2" name="Título 1">
+            <a:extLst>
+              <a:ext uri="{FF2B5EF4-FFF2-40B4-BE49-F238E27FC236}">
+                <a16:creationId xmlns:a16="http://schemas.microsoft.com/office/drawing/2014/main" id="{EFFEEDE1-AC85-3A50-A2DE-B467A41975C8}"/>
+              </a:ext>
+            </a:extLst>
+          </p:cNvPr>
+          <p:cNvSpPr>
+            <a:spLocks noGrp="1"/>
+          </p:cNvSpPr>
+          <p:nvPr>
+            <p:ph type="title"/>
+          </p:nvPr>
+        </p:nvSpPr>
+        <p:spPr/>
+        <p:txBody>
+          <a:bodyPr/>
+          <a:lstStyle/>
+          <a:p>
+            <a:r>
+              <a:rPr lang="es-ES" b="1" dirty="0">
+                <a:gradFill>
+                  <a:gsLst>
+                    <a:gs pos="50500">
+                      <a:srgbClr val="FACD6A"/>
+                    </a:gs>
+                    <a:gs pos="0">
+                      <a:srgbClr val="79FFAF"/>
+                    </a:gs>
+                    <a:gs pos="100000">
+                      <a:srgbClr val="F7797D"/>
+                    </a:gs>
+                  </a:gsLst>
+                  <a:lin ang="3600000" scaled="0"/>
+                </a:gradFill>
+                <a:latin typeface="Montserrat" panose="00000500000000000000" pitchFamily="50" charset="0"/>
+              </a:rPr>
+              <a:t>DE ANTEMANO</a:t>
+            </a:r>
+          </a:p>
+        </p:txBody>
+      </p:sp>
+      <p:sp>
+        <p:nvSpPr>
+          <p:cNvPr id="3" name="Marcador de contenido 2">
+            <a:extLst>
+              <a:ext uri="{FF2B5EF4-FFF2-40B4-BE49-F238E27FC236}">
+                <a16:creationId xmlns:a16="http://schemas.microsoft.com/office/drawing/2014/main" id="{E6667E4F-ABA3-A9FC-F7E8-DB4B5D8E7D96}"/>
+              </a:ext>
+            </a:extLst>
+          </p:cNvPr>
+          <p:cNvSpPr>
+            <a:spLocks noGrp="1"/>
+          </p:cNvSpPr>
+          <p:nvPr>
+            <p:ph idx="1"/>
+          </p:nvPr>
+        </p:nvSpPr>
+        <p:spPr/>
+        <p:txBody>
+          <a:bodyPr/>
+          <a:lstStyle/>
+          <a:p>
+            <a:r>
+              <a:rPr lang="es-ES" dirty="0"/>
+              <a:t>La charla se grabará y se compartirá su acceso</a:t>
+            </a:r>
+          </a:p>
+          <a:p>
+            <a:r>
+              <a:rPr lang="es-ES" dirty="0"/>
+              <a:t>Las diapositivas se compartirán al final de la charla</a:t>
+            </a:r>
+          </a:p>
+          <a:p>
+            <a:r>
+              <a:rPr lang="es-ES" dirty="0"/>
+              <a:t>Cualquier duda no dudes en comentarla (chat o voz, lo que prefieras :D)</a:t>
+            </a:r>
+          </a:p>
+        </p:txBody>
+      </p:sp>
+    </p:spTree>
+    <p:extLst>
+      <p:ext uri="{BB962C8B-B14F-4D97-AF65-F5344CB8AC3E}">
+        <p14:creationId xmlns:p14="http://schemas.microsoft.com/office/powerpoint/2010/main" val="2755319805"/>
+      </p:ext>
+    </p:extLst>
+  </p:cSld>
+  <p:clrMapOvr>
+    <a:masterClrMapping/>
+  </p:clrMapOvr>
+</p:sld>
+</file>
+
+<file path=ppt/slides/slide3.xml><?xml version="1.0" encoding="utf-8"?>
+<p:sld xmlns:a="http://schemas.openxmlformats.org/drawingml/2006/main" xmlns:r="http://schemas.openxmlformats.org/officeDocument/2006/relationships" xmlns:p="http://schemas.openxmlformats.org/presentationml/2006/main">
+  <p:cSld>
+    <p:spTree>
+      <p:nvGrpSpPr>
+        <p:cNvPr id="1" name=""/>
+        <p:cNvGrpSpPr/>
+        <p:nvPr/>
+      </p:nvGrpSpPr>
+      <p:grpSpPr>
+        <a:xfrm>
+          <a:off x="0" y="0"/>
+          <a:ext cx="0" cy="0"/>
+          <a:chOff x="0" y="0"/>
+          <a:chExt cx="0" cy="0"/>
+        </a:xfrm>
+      </p:grpSpPr>
+      <p:sp>
+        <p:nvSpPr>
+          <p:cNvPr id="2" name="Título 1">
+            <a:extLst>
+              <a:ext uri="{FF2B5EF4-FFF2-40B4-BE49-F238E27FC236}">
+                <a16:creationId xmlns:a16="http://schemas.microsoft.com/office/drawing/2014/main" id="{968CDDEA-4628-D732-D3B0-566CFDAF4151}"/>
+              </a:ext>
+            </a:extLst>
+          </p:cNvPr>
+          <p:cNvSpPr>
+            <a:spLocks noGrp="1"/>
+          </p:cNvSpPr>
+          <p:nvPr>
+            <p:ph type="title"/>
+          </p:nvPr>
+        </p:nvSpPr>
+        <p:spPr>
+          <a:xfrm>
+            <a:off x="838200" y="1173647"/>
+            <a:ext cx="10515600" cy="1325563"/>
+          </a:xfrm>
+          <a:noFill/>
+        </p:spPr>
+        <p:txBody>
+          <a:bodyPr/>
+          <a:lstStyle/>
+          <a:p>
+            <a:r>
+              <a:rPr lang="es-ES" b="1" dirty="0">
+                <a:gradFill>
+                  <a:gsLst>
+                    <a:gs pos="0">
+                      <a:srgbClr val="AD5389"/>
+                    </a:gs>
+                    <a:gs pos="100000">
+                      <a:srgbClr val="3C1053"/>
+                    </a:gs>
+                  </a:gsLst>
+                  <a:lin ang="3600000" scaled="0"/>
+                </a:gradFill>
+                <a:latin typeface="Montserrat" panose="00000500000000000000" pitchFamily="50" charset="0"/>
+              </a:rPr>
+              <a:t>¿PARA QUIÉN ESTÁ PENSADA LA CHARLA?</a:t>
+            </a:r>
+          </a:p>
+        </p:txBody>
+      </p:sp>
+      <p:sp>
+        <p:nvSpPr>
+          <p:cNvPr id="3" name="Marcador de contenido 2">
+            <a:extLst>
+              <a:ext uri="{FF2B5EF4-FFF2-40B4-BE49-F238E27FC236}">
+                <a16:creationId xmlns:a16="http://schemas.microsoft.com/office/drawing/2014/main" id="{BB6C6554-2682-01E8-EBBB-FB3757215029}"/>
+              </a:ext>
+            </a:extLst>
+          </p:cNvPr>
+          <p:cNvSpPr>
+            <a:spLocks noGrp="1"/>
+          </p:cNvSpPr>
+          <p:nvPr>
+            <p:ph idx="1"/>
+          </p:nvPr>
+        </p:nvSpPr>
+        <p:spPr>
+          <a:xfrm>
+            <a:off x="838200" y="2634147"/>
+            <a:ext cx="10515600" cy="3088706"/>
+          </a:xfrm>
+        </p:spPr>
+        <p:txBody>
+          <a:bodyPr/>
+          <a:lstStyle/>
+          <a:p>
+            <a:r>
+              <a:rPr lang="es-ES" dirty="0"/>
+              <a:t>Aquellas personas que le tienen reparo a los comandos</a:t>
+            </a:r>
+          </a:p>
+          <a:p>
+            <a:r>
+              <a:rPr lang="es-ES" dirty="0"/>
+              <a:t>Quienes no hayan usado, o apenas, </a:t>
+            </a:r>
+            <a:r>
+              <a:rPr lang="es-ES" dirty="0" err="1"/>
+              <a:t>git</a:t>
+            </a:r>
+            <a:endParaRPr lang="es-ES" dirty="0"/>
+          </a:p>
+          <a:p>
+            <a:r>
+              <a:rPr lang="es-ES" dirty="0"/>
+              <a:t>Quienes tengan algo de experiencia pero les gustase más soltura</a:t>
+            </a:r>
+          </a:p>
+          <a:p>
+            <a:r>
+              <a:rPr lang="es-ES" dirty="0"/>
+              <a:t>De principiante a intermedio</a:t>
+            </a:r>
+          </a:p>
+          <a:p>
+            <a:pPr lvl="1"/>
+            <a:r>
+              <a:rPr lang="es-ES" dirty="0"/>
+              <a:t>Avanzado es responder en </a:t>
+            </a:r>
+            <a:r>
+              <a:rPr lang="es-ES" dirty="0" err="1"/>
+              <a:t>stackoverflow</a:t>
+            </a:r>
+            <a:r>
+              <a:rPr lang="es-ES" dirty="0"/>
+              <a:t>, y eso me queda lejos</a:t>
+            </a:r>
+          </a:p>
+          <a:p>
+            <a:r>
+              <a:rPr lang="es-ES" dirty="0"/>
+              <a:t>Personas con afán de revisitar conceptos</a:t>
+            </a:r>
+          </a:p>
+        </p:txBody>
+      </p:sp>
+    </p:spTree>
+    <p:extLst>
+      <p:ext uri="{BB962C8B-B14F-4D97-AF65-F5344CB8AC3E}">
+        <p14:creationId xmlns:p14="http://schemas.microsoft.com/office/powerpoint/2010/main" val="383589012"/>
+      </p:ext>
+    </p:extLst>
+  </p:cSld>
+  <p:clrMapOvr>
+    <a:masterClrMapping/>
+  </p:clrMapOvr>
+</p:sld>
+</file>
+
+<file path=ppt/slides/slide4.xml><?xml version="1.0" encoding="utf-8"?>
+<p:sld xmlns:a="http://schemas.openxmlformats.org/drawingml/2006/main" xmlns:r="http://schemas.openxmlformats.org/officeDocument/2006/relationships" xmlns:p="http://schemas.openxmlformats.org/presentationml/2006/main">
+  <p:cSld>
+    <p:spTree>
+      <p:nvGrpSpPr>
+        <p:cNvPr id="1" name=""/>
+        <p:cNvGrpSpPr/>
+        <p:nvPr/>
+      </p:nvGrpSpPr>
+      <p:grpSpPr>
+        <a:xfrm>
+          <a:off x="0" y="0"/>
+          <a:ext cx="0" cy="0"/>
+          <a:chOff x="0" y="0"/>
+          <a:chExt cx="0" cy="0"/>
+        </a:xfrm>
+      </p:grpSpPr>
+      <p:sp>
+        <p:nvSpPr>
+          <p:cNvPr id="2" name="Título 1">
+            <a:extLst>
+              <a:ext uri="{FF2B5EF4-FFF2-40B4-BE49-F238E27FC236}">
+                <a16:creationId xmlns:a16="http://schemas.microsoft.com/office/drawing/2014/main" id="{BE1485FB-80A5-75DF-61CE-BC65C65111EA}"/>
+              </a:ext>
+            </a:extLst>
+          </p:cNvPr>
+          <p:cNvSpPr>
+            <a:spLocks noGrp="1"/>
+          </p:cNvSpPr>
+          <p:nvPr>
+            <p:ph type="title"/>
+          </p:nvPr>
+        </p:nvSpPr>
+        <p:spPr/>
+        <p:txBody>
+          <a:bodyPr/>
+          <a:lstStyle/>
+          <a:p>
+            <a:r>
+              <a:rPr lang="es-ES" b="1" dirty="0">
+                <a:gradFill>
+                  <a:gsLst>
+                    <a:gs pos="0">
+                      <a:srgbClr val="5C258D"/>
+                    </a:gs>
+                    <a:gs pos="100000">
+                      <a:srgbClr val="4389A2"/>
+                    </a:gs>
+                  </a:gsLst>
+                  <a:lin ang="3600000" scaled="0"/>
+                </a:gradFill>
+                <a:latin typeface="Montserrat" panose="00000500000000000000" pitchFamily="50" charset="0"/>
+              </a:rPr>
+              <a:t>ESTRUCTURA DE LAS CHARLAS</a:t>
+            </a:r>
+          </a:p>
+        </p:txBody>
+      </p:sp>
+      <p:sp>
+        <p:nvSpPr>
+          <p:cNvPr id="3" name="Marcador de contenido 2">
+            <a:extLst>
+              <a:ext uri="{FF2B5EF4-FFF2-40B4-BE49-F238E27FC236}">
+                <a16:creationId xmlns:a16="http://schemas.microsoft.com/office/drawing/2014/main" id="{AB8CBCA0-EC60-38A5-192A-02AFE730D2C9}"/>
+              </a:ext>
+            </a:extLst>
+          </p:cNvPr>
+          <p:cNvSpPr>
+            <a:spLocks noGrp="1"/>
+          </p:cNvSpPr>
+          <p:nvPr>
+            <p:ph idx="1"/>
+          </p:nvPr>
+        </p:nvSpPr>
+        <p:spPr/>
+        <p:txBody>
+          <a:bodyPr/>
+          <a:lstStyle/>
+          <a:p>
+            <a:r>
+              <a:rPr lang="es-ES" dirty="0">
+                <a:hlinkClick r:id="rId2" action="ppaction://hlinksldjump"/>
+              </a:rPr>
+              <a:t>I – Introducción y modelo mental, los fundamentos</a:t>
+            </a:r>
+            <a:endParaRPr lang="es-ES" dirty="0"/>
+          </a:p>
+          <a:p>
+            <a:r>
+              <a:rPr lang="es-ES" dirty="0">
+                <a:hlinkClick r:id="rId3" action="ppaction://hlinksldjump"/>
+              </a:rPr>
+              <a:t>II – Manejo de </a:t>
+            </a:r>
+            <a:r>
+              <a:rPr lang="es-ES" i="1" dirty="0">
+                <a:hlinkClick r:id="rId3" action="ppaction://hlinksldjump"/>
+              </a:rPr>
+              <a:t>armas</a:t>
+            </a:r>
+            <a:r>
+              <a:rPr lang="es-ES" dirty="0">
+                <a:hlinkClick r:id="rId3" action="ppaction://hlinksldjump"/>
+              </a:rPr>
+              <a:t>, aprende a defenderte</a:t>
+            </a:r>
+            <a:endParaRPr lang="es-ES" dirty="0"/>
+          </a:p>
+          <a:p>
+            <a:r>
+              <a:rPr lang="es-ES" dirty="0">
+                <a:hlinkClick r:id="rId4" action="ppaction://hlinksldjump"/>
+              </a:rPr>
+              <a:t>III – Profundización y salvavidas, entiende errores y aprende su </a:t>
+            </a:r>
+            <a:r>
+              <a:rPr lang="es-ES" i="1" dirty="0" err="1">
+                <a:hlinkClick r:id="rId4" action="ppaction://hlinksldjump"/>
+              </a:rPr>
+              <a:t>origin</a:t>
+            </a:r>
+            <a:endParaRPr lang="es-ES" i="1" dirty="0"/>
+          </a:p>
+        </p:txBody>
+      </p:sp>
+    </p:spTree>
+    <p:extLst>
+      <p:ext uri="{BB962C8B-B14F-4D97-AF65-F5344CB8AC3E}">
+        <p14:creationId xmlns:p14="http://schemas.microsoft.com/office/powerpoint/2010/main" val="216039602"/>
+      </p:ext>
+    </p:extLst>
+  </p:cSld>
+  <p:clrMapOvr>
+    <a:masterClrMapping/>
+  </p:clrMapOvr>
+</p:sld>
+</file>
+
+<file path=ppt/slides/slide5.xml><?xml version="1.0" encoding="utf-8"?>
+<p:sld xmlns:a="http://schemas.openxmlformats.org/drawingml/2006/main" xmlns:r="http://schemas.openxmlformats.org/officeDocument/2006/relationships" xmlns:p="http://schemas.openxmlformats.org/presentationml/2006/main">
+  <p:cSld>
+    <p:spTree>
+      <p:nvGrpSpPr>
+        <p:cNvPr id="1" name=""/>
+        <p:cNvGrpSpPr/>
+        <p:nvPr/>
+      </p:nvGrpSpPr>
+      <p:grpSpPr>
+        <a:xfrm>
+          <a:off x="0" y="0"/>
+          <a:ext cx="0" cy="0"/>
+          <a:chOff x="0" y="0"/>
+          <a:chExt cx="0" cy="0"/>
+        </a:xfrm>
+      </p:grpSpPr>
+      <p:sp>
+        <p:nvSpPr>
+          <p:cNvPr id="2" name="Título 1">
+            <a:extLst>
+              <a:ext uri="{FF2B5EF4-FFF2-40B4-BE49-F238E27FC236}">
+                <a16:creationId xmlns:a16="http://schemas.microsoft.com/office/drawing/2014/main" id="{B49D6A84-CCAD-AD94-F29A-1C987926A35E}"/>
+              </a:ext>
+            </a:extLst>
+          </p:cNvPr>
+          <p:cNvSpPr>
+            <a:spLocks noGrp="1"/>
+          </p:cNvSpPr>
+          <p:nvPr>
+            <p:ph type="title"/>
+          </p:nvPr>
+        </p:nvSpPr>
+        <p:spPr/>
+        <p:txBody>
+          <a:bodyPr/>
+          <a:lstStyle/>
+          <a:p>
+            <a:r>
+              <a:rPr lang="es-ES" b="1" dirty="0">
+                <a:gradFill>
+                  <a:gsLst>
+                    <a:gs pos="0">
+                      <a:srgbClr val="02AAB0"/>
+                    </a:gs>
+                    <a:gs pos="100000">
+                      <a:srgbClr val="00CDAC"/>
+                    </a:gs>
+                  </a:gsLst>
+                  <a:lin ang="5400000" scaled="1"/>
+                </a:gradFill>
+                <a:latin typeface="Montserrat" panose="00000500000000000000" pitchFamily="50" charset="0"/>
+              </a:rPr>
+              <a:t>PRESENTACIONES</a:t>
+            </a:r>
+          </a:p>
+        </p:txBody>
+      </p:sp>
+      <p:sp>
+        <p:nvSpPr>
+          <p:cNvPr id="3" name="Marcador de contenido 2">
+            <a:extLst>
+              <a:ext uri="{FF2B5EF4-FFF2-40B4-BE49-F238E27FC236}">
+                <a16:creationId xmlns:a16="http://schemas.microsoft.com/office/drawing/2014/main" id="{F7AD0A66-10B5-5501-ECB6-8ED44EDBDD8E}"/>
+              </a:ext>
+            </a:extLst>
+          </p:cNvPr>
+          <p:cNvSpPr>
+            <a:spLocks noGrp="1"/>
+          </p:cNvSpPr>
+          <p:nvPr>
+            <p:ph idx="1"/>
+          </p:nvPr>
+        </p:nvSpPr>
+        <p:spPr/>
+        <p:txBody>
+          <a:bodyPr/>
+          <a:lstStyle/>
+          <a:p>
+            <a:pPr marL="0" indent="0">
+              <a:buNone/>
+            </a:pPr>
+            <a:r>
+              <a:rPr lang="es-ES" dirty="0"/>
+              <a:t>Soy Pepe, aunque </a:t>
+            </a:r>
+            <a:r>
+              <a:rPr lang="es-ES" dirty="0" err="1"/>
+              <a:t>Jose</a:t>
+            </a:r>
+            <a:r>
+              <a:rPr lang="es-ES" dirty="0"/>
+              <a:t> no me molesta, hago cosas de </a:t>
+            </a:r>
+            <a:r>
+              <a:rPr lang="es-ES" dirty="0" err="1"/>
+              <a:t>front</a:t>
+            </a:r>
+            <a:r>
+              <a:rPr lang="es-ES" dirty="0"/>
+              <a:t>, experto en tirar producción, años de experiencia constatada rompiendo ramas en conflictos de </a:t>
+            </a:r>
+            <a:r>
+              <a:rPr lang="es-ES" dirty="0" err="1"/>
+              <a:t>merge</a:t>
+            </a:r>
+            <a:r>
+              <a:rPr lang="es-ES" dirty="0"/>
+              <a:t>.</a:t>
+            </a:r>
+          </a:p>
+          <a:p>
+            <a:pPr marL="0" indent="0">
+              <a:buNone/>
+            </a:pPr>
+            <a:endParaRPr lang="es-ES" dirty="0"/>
+          </a:p>
+          <a:p>
+            <a:pPr marL="0" indent="0">
+              <a:buNone/>
+            </a:pPr>
+            <a:r>
+              <a:rPr lang="es-ES" dirty="0"/>
+              <a:t>Odiaba los comandos… y ahora… no tanto</a:t>
+            </a:r>
+          </a:p>
+        </p:txBody>
+      </p:sp>
+    </p:spTree>
+    <p:extLst>
+      <p:ext uri="{BB962C8B-B14F-4D97-AF65-F5344CB8AC3E}">
+        <p14:creationId xmlns:p14="http://schemas.microsoft.com/office/powerpoint/2010/main" val="3378692924"/>
+      </p:ext>
+    </p:extLst>
+  </p:cSld>
+  <p:clrMapOvr>
+    <a:masterClrMapping/>
+  </p:clrMapOvr>
+</p:sld>
+</file>
+
+<file path=ppt/slides/slide6.xml><?xml version="1.0" encoding="utf-8"?>
+<p:sld xmlns:a="http://schemas.openxmlformats.org/drawingml/2006/main" xmlns:r="http://schemas.openxmlformats.org/officeDocument/2006/relationships" xmlns:p="http://schemas.openxmlformats.org/presentationml/2006/main">
+  <p:cSld>
+    <p:spTree>
+      <p:nvGrpSpPr>
+        <p:cNvPr id="1" name=""/>
+        <p:cNvGrpSpPr/>
+        <p:nvPr/>
+      </p:nvGrpSpPr>
+      <p:grpSpPr>
+        <a:xfrm>
+          <a:off x="0" y="0"/>
+          <a:ext cx="0" cy="0"/>
+          <a:chOff x="0" y="0"/>
+          <a:chExt cx="0" cy="0"/>
+        </a:xfrm>
+      </p:grpSpPr>
+      <p:sp>
+        <p:nvSpPr>
+          <p:cNvPr id="2" name="Título 1">
+            <a:extLst>
+              <a:ext uri="{FF2B5EF4-FFF2-40B4-BE49-F238E27FC236}">
+                <a16:creationId xmlns:a16="http://schemas.microsoft.com/office/drawing/2014/main" id="{9E8B77D0-1254-B43A-8A3C-4F1B929F9346}"/>
+              </a:ext>
+            </a:extLst>
+          </p:cNvPr>
+          <p:cNvSpPr>
+            <a:spLocks noGrp="1"/>
+          </p:cNvSpPr>
+          <p:nvPr>
+            <p:ph type="title"/>
+          </p:nvPr>
+        </p:nvSpPr>
+        <p:spPr>
+          <a:noFill/>
+        </p:spPr>
+        <p:txBody>
+          <a:bodyPr/>
+          <a:lstStyle/>
+          <a:p>
+            <a:r>
+              <a:rPr lang="es-ES" b="1" dirty="0">
+                <a:gradFill>
+                  <a:gsLst>
+                    <a:gs pos="50500">
+                      <a:srgbClr val="E94057"/>
+                    </a:gs>
+                    <a:gs pos="0">
+                      <a:srgbClr val="8A2387"/>
+                    </a:gs>
+                    <a:gs pos="100000">
+                      <a:srgbClr val="F7797D"/>
+                    </a:gs>
+                  </a:gsLst>
+                  <a:lin ang="0" scaled="0"/>
+                </a:gradFill>
+                <a:latin typeface="Montserrat" panose="00000500000000000000" pitchFamily="50" charset="0"/>
+              </a:rPr>
+              <a:t>INTRODUCCIÓN A GIT</a:t>
+            </a:r>
+          </a:p>
+        </p:txBody>
+      </p:sp>
+      <p:sp>
+        <p:nvSpPr>
+          <p:cNvPr id="4" name="CuadroTexto 3">
+            <a:extLst>
+              <a:ext uri="{FF2B5EF4-FFF2-40B4-BE49-F238E27FC236}">
+                <a16:creationId xmlns:a16="http://schemas.microsoft.com/office/drawing/2014/main" id="{71BEFDAB-A416-A1A9-D792-09DD64B6F0FA}"/>
+              </a:ext>
+            </a:extLst>
+          </p:cNvPr>
+          <p:cNvSpPr txBox="1"/>
+          <p:nvPr/>
+        </p:nvSpPr>
+        <p:spPr>
+          <a:xfrm>
+            <a:off x="838201" y="1998697"/>
+            <a:ext cx="9993672" cy="954107"/>
+          </a:xfrm>
+          <a:prstGeom prst="rect">
+            <a:avLst/>
+          </a:prstGeom>
+          <a:noFill/>
+        </p:spPr>
+        <p:txBody>
+          <a:bodyPr wrap="square" rtlCol="0">
+            <a:spAutoFit/>
+          </a:bodyPr>
+          <a:lstStyle/>
+          <a:p>
+            <a:r>
+              <a:rPr lang="es-ES" sz="2800" dirty="0"/>
+              <a:t>Antes de nada, vamos a explicar algunos conceptos que ayudarán a entender/repasar cómo funciona Git</a:t>
+            </a:r>
+          </a:p>
+        </p:txBody>
+      </p:sp>
+      <p:pic>
+        <p:nvPicPr>
+          <p:cNvPr id="5" name="Imagen 4" descr="Icono&#10;&#10;Descripción generada automáticamente">
+            <a:extLst>
+              <a:ext uri="{FF2B5EF4-FFF2-40B4-BE49-F238E27FC236}">
+                <a16:creationId xmlns:a16="http://schemas.microsoft.com/office/drawing/2014/main" id="{AB158C85-2150-AFE8-3B31-9576F60B41F6}"/>
+              </a:ext>
+            </a:extLst>
+          </p:cNvPr>
+          <p:cNvPicPr>
+            <a:picLocks noChangeAspect="1"/>
+          </p:cNvPicPr>
+          <p:nvPr/>
+        </p:nvPicPr>
+        <p:blipFill>
+          <a:blip r:embed="rId2">
+            <a:extLst>
+              <a:ext uri="{28A0092B-C50C-407E-A947-70E740481C1C}">
+                <a14:useLocalDpi xmlns:a14="http://schemas.microsoft.com/office/drawing/2010/main" val="0"/>
+              </a:ext>
+              <a:ext uri="{837473B0-CC2E-450A-ABE3-18F120FF3D39}">
+                <a1611:picAttrSrcUrl xmlns:a1611="http://schemas.microsoft.com/office/drawing/2016/11/main" r:id="rId3"/>
+              </a:ext>
+            </a:extLst>
+          </a:blip>
+          <a:stretch>
+            <a:fillRect/>
+          </a:stretch>
+        </p:blipFill>
+        <p:spPr>
+          <a:xfrm>
+            <a:off x="1360128" y="3194424"/>
+            <a:ext cx="1143000" cy="1143000"/>
+          </a:xfrm>
+          <a:prstGeom prst="rect">
+            <a:avLst/>
+          </a:prstGeom>
+        </p:spPr>
+      </p:pic>
+      <p:sp>
+        <p:nvSpPr>
+          <p:cNvPr id="6" name="CuadroTexto 5">
+            <a:extLst>
+              <a:ext uri="{FF2B5EF4-FFF2-40B4-BE49-F238E27FC236}">
+                <a16:creationId xmlns:a16="http://schemas.microsoft.com/office/drawing/2014/main" id="{0A7DA03F-4992-05DF-8CCA-B38610C9D048}"/>
+              </a:ext>
+            </a:extLst>
+          </p:cNvPr>
+          <p:cNvSpPr txBox="1"/>
+          <p:nvPr/>
+        </p:nvSpPr>
+        <p:spPr>
+          <a:xfrm>
+            <a:off x="2706164" y="3073426"/>
+            <a:ext cx="8125708" cy="1384995"/>
+          </a:xfrm>
+          <a:prstGeom prst="rect">
+            <a:avLst/>
+          </a:prstGeom>
+          <a:noFill/>
+        </p:spPr>
+        <p:txBody>
+          <a:bodyPr wrap="square" rtlCol="0">
+            <a:spAutoFit/>
+          </a:bodyPr>
+          <a:lstStyle/>
+          <a:p>
+            <a:r>
+              <a:rPr lang="es-ES" sz="2800" dirty="0"/>
+              <a:t>Git es un Sistema de Control de Versiones (VCS), esto quiere decir que nos permite </a:t>
+            </a:r>
+            <a:r>
+              <a:rPr lang="es-ES" sz="2800" b="1" dirty="0">
+                <a:gradFill>
+                  <a:gsLst>
+                    <a:gs pos="0">
+                      <a:srgbClr val="00B0F0"/>
+                    </a:gs>
+                    <a:gs pos="48000">
+                      <a:schemeClr val="accent1">
+                        <a:lumMod val="60000"/>
+                        <a:lumOff val="40000"/>
+                      </a:schemeClr>
+                    </a:gs>
+                    <a:gs pos="100000">
+                      <a:srgbClr val="B684D2"/>
+                    </a:gs>
+                  </a:gsLst>
+                  <a:path path="circle">
+                    <a:fillToRect l="100000" t="100000"/>
+                  </a:path>
+                </a:gradFill>
+              </a:rPr>
+              <a:t>gestionar</a:t>
+            </a:r>
+            <a:r>
+              <a:rPr lang="es-ES" sz="2800" dirty="0"/>
+              <a:t> un </a:t>
+            </a:r>
+            <a:r>
+              <a:rPr lang="es-ES" sz="2800" b="1" dirty="0">
+                <a:gradFill>
+                  <a:gsLst>
+                    <a:gs pos="0">
+                      <a:srgbClr val="00B0F0"/>
+                    </a:gs>
+                    <a:gs pos="48000">
+                      <a:schemeClr val="accent1">
+                        <a:lumMod val="60000"/>
+                        <a:lumOff val="40000"/>
+                      </a:schemeClr>
+                    </a:gs>
+                    <a:gs pos="100000">
+                      <a:srgbClr val="B684D2"/>
+                    </a:gs>
+                  </a:gsLst>
+                  <a:path path="circle">
+                    <a:fillToRect l="100000" t="100000"/>
+                  </a:path>
+                </a:gradFill>
+              </a:rPr>
+              <a:t>historial de versiones</a:t>
+            </a:r>
+            <a:r>
+              <a:rPr lang="es-ES" sz="2800" dirty="0"/>
+              <a:t> de lo que queramos</a:t>
+            </a:r>
+          </a:p>
+        </p:txBody>
+      </p:sp>
+      <p:sp>
+        <p:nvSpPr>
+          <p:cNvPr id="7" name="CuadroTexto 6">
+            <a:extLst>
+              <a:ext uri="{FF2B5EF4-FFF2-40B4-BE49-F238E27FC236}">
+                <a16:creationId xmlns:a16="http://schemas.microsoft.com/office/drawing/2014/main" id="{9E048A00-CDA5-DEA2-150F-F76F889CC0E4}"/>
+              </a:ext>
+            </a:extLst>
+          </p:cNvPr>
+          <p:cNvSpPr txBox="1"/>
+          <p:nvPr/>
+        </p:nvSpPr>
+        <p:spPr>
+          <a:xfrm>
+            <a:off x="838201" y="4458421"/>
+            <a:ext cx="9993672" cy="523220"/>
+          </a:xfrm>
+          <a:prstGeom prst="rect">
+            <a:avLst/>
+          </a:prstGeom>
+          <a:noFill/>
+        </p:spPr>
+        <p:txBody>
+          <a:bodyPr wrap="square" rtlCol="0">
+            <a:spAutoFit/>
+          </a:bodyPr>
+          <a:lstStyle/>
+          <a:p>
+            <a:r>
+              <a:rPr lang="es-ES" sz="2800" dirty="0"/>
+              <a:t>Vamos a empezar desde lo más básico e ir construyendo desde ahí</a:t>
+            </a:r>
+          </a:p>
+        </p:txBody>
+      </p:sp>
+    </p:spTree>
+    <p:extLst>
+      <p:ext uri="{BB962C8B-B14F-4D97-AF65-F5344CB8AC3E}">
+        <p14:creationId xmlns:p14="http://schemas.microsoft.com/office/powerpoint/2010/main" val="45696626"/>
+      </p:ext>
+    </p:extLst>
+  </p:cSld>
+  <p:clrMapOvr>
+    <a:masterClrMapping/>
+  </p:clrMapOvr>
+</p:sld>
+</file>
+
+<file path=ppt/slides/slide7.xml><?xml version="1.0" encoding="utf-8"?>
 <p:sld xmlns:a="http://schemas.openxmlformats.org/drawingml/2006/main" xmlns:r="http://schemas.openxmlformats.org/officeDocument/2006/relationships" xmlns:p="http://schemas.openxmlformats.org/presentationml/2006/main">
   <p:cSld>
     <p:spTree>
@@ -3553,10 +6063,10 @@
       </p:sp>
       <p:sp>
         <p:nvSpPr>
-          <p:cNvPr id="4" name="CuadroTexto 3">
-            <a:extLst>
-              <a:ext uri="{FF2B5EF4-FFF2-40B4-BE49-F238E27FC236}">
-                <a16:creationId xmlns:a16="http://schemas.microsoft.com/office/drawing/2014/main" id="{F5177EB0-4397-F7DF-56F3-A044FE9A40BB}"/>
+          <p:cNvPr id="9" name="CuadroTexto 8">
+            <a:extLst>
+              <a:ext uri="{FF2B5EF4-FFF2-40B4-BE49-F238E27FC236}">
+                <a16:creationId xmlns:a16="http://schemas.microsoft.com/office/drawing/2014/main" id="{6B630C59-AC81-194F-09C1-C357D45AE648}"/>
               </a:ext>
             </a:extLst>
           </p:cNvPr>
@@ -3565,8 +6075,8 @@
         </p:nvSpPr>
         <p:spPr>
           <a:xfrm>
-            <a:off x="838201" y="1998697"/>
-            <a:ext cx="9993672" cy="954107"/>
+            <a:off x="838200" y="1998697"/>
+            <a:ext cx="10263996" cy="1384995"/>
           </a:xfrm>
           <a:prstGeom prst="rect">
             <a:avLst/>
@@ -3581,172 +6091,7 @@
           <a:p>
             <a:r>
               <a:rPr lang="es-ES" sz="2800" dirty="0"/>
-              <a:t>Antes de nada, vamos a explicar algunos conceptos que ayudarán a entender/repasar cómo funciona Git</a:t>
-            </a:r>
-          </a:p>
-        </p:txBody>
-      </p:sp>
-      <p:pic>
-        <p:nvPicPr>
-          <p:cNvPr id="6" name="Imagen 5" descr="Icono&#10;&#10;Descripción generada automáticamente">
-            <a:extLst>
-              <a:ext uri="{FF2B5EF4-FFF2-40B4-BE49-F238E27FC236}">
-                <a16:creationId xmlns:a16="http://schemas.microsoft.com/office/drawing/2014/main" id="{74F2AF0A-9FFB-EFB9-4B2B-6167ACC02594}"/>
-              </a:ext>
-            </a:extLst>
-          </p:cNvPr>
-          <p:cNvPicPr>
-            <a:picLocks noChangeAspect="1"/>
-          </p:cNvPicPr>
-          <p:nvPr/>
-        </p:nvPicPr>
-        <p:blipFill>
-          <a:blip r:embed="rId2">
-            <a:extLst>
-              <a:ext uri="{28A0092B-C50C-407E-A947-70E740481C1C}">
-                <a14:useLocalDpi xmlns:a14="http://schemas.microsoft.com/office/drawing/2010/main" val="0"/>
-              </a:ext>
-              <a:ext uri="{837473B0-CC2E-450A-ABE3-18F120FF3D39}">
-                <a1611:picAttrSrcUrl xmlns:a1611="http://schemas.microsoft.com/office/drawing/2016/11/main" r:id="rId3"/>
-              </a:ext>
-            </a:extLst>
-          </a:blip>
-          <a:stretch>
-            <a:fillRect/>
-          </a:stretch>
-        </p:blipFill>
-        <p:spPr>
-          <a:xfrm>
-            <a:off x="1360128" y="3194424"/>
-            <a:ext cx="1143000" cy="1143000"/>
-          </a:xfrm>
-          <a:prstGeom prst="rect">
-            <a:avLst/>
-          </a:prstGeom>
-        </p:spPr>
-      </p:pic>
-      <p:sp>
-        <p:nvSpPr>
-          <p:cNvPr id="8" name="CuadroTexto 7">
-            <a:extLst>
-              <a:ext uri="{FF2B5EF4-FFF2-40B4-BE49-F238E27FC236}">
-                <a16:creationId xmlns:a16="http://schemas.microsoft.com/office/drawing/2014/main" id="{544EDC6F-6C88-5EB6-578F-C986EDB688D0}"/>
-              </a:ext>
-            </a:extLst>
-          </p:cNvPr>
-          <p:cNvSpPr txBox="1"/>
-          <p:nvPr/>
-        </p:nvSpPr>
-        <p:spPr>
-          <a:xfrm>
-            <a:off x="2706164" y="3073426"/>
-            <a:ext cx="8125708" cy="1384995"/>
-          </a:xfrm>
-          <a:prstGeom prst="rect">
-            <a:avLst/>
-          </a:prstGeom>
-          <a:noFill/>
-        </p:spPr>
-        <p:txBody>
-          <a:bodyPr wrap="square" rtlCol="0">
-            <a:spAutoFit/>
-          </a:bodyPr>
-          <a:lstStyle/>
-          <a:p>
-            <a:r>
-              <a:rPr lang="es-ES" sz="2800" dirty="0"/>
-              <a:t>Git es un Sistema de Control de Versiones (VCS), esto quiere decir que nos permite </a:t>
-            </a:r>
-            <a:r>
-              <a:rPr lang="es-ES" sz="2800" b="1" dirty="0">
-                <a:gradFill>
-                  <a:gsLst>
-                    <a:gs pos="0">
-                      <a:srgbClr val="00B0F0"/>
-                    </a:gs>
-                    <a:gs pos="48000">
-                      <a:schemeClr val="accent1">
-                        <a:lumMod val="60000"/>
-                        <a:lumOff val="40000"/>
-                      </a:schemeClr>
-                    </a:gs>
-                    <a:gs pos="100000">
-                      <a:srgbClr val="B684D2"/>
-                    </a:gs>
-                  </a:gsLst>
-                  <a:path path="circle">
-                    <a:fillToRect l="100000" t="100000"/>
-                  </a:path>
-                </a:gradFill>
-              </a:rPr>
-              <a:t>gestionar</a:t>
-            </a:r>
-            <a:r>
-              <a:rPr lang="es-ES" sz="2800" dirty="0"/>
-              <a:t> un </a:t>
-            </a:r>
-            <a:r>
-              <a:rPr lang="es-ES" sz="2800" b="1" dirty="0">
-                <a:gradFill>
-                  <a:gsLst>
-                    <a:gs pos="0">
-                      <a:srgbClr val="00B0F0"/>
-                    </a:gs>
-                    <a:gs pos="48000">
-                      <a:schemeClr val="accent1">
-                        <a:lumMod val="60000"/>
-                        <a:lumOff val="40000"/>
-                      </a:schemeClr>
-                    </a:gs>
-                    <a:gs pos="100000">
-                      <a:srgbClr val="B684D2"/>
-                    </a:gs>
-                  </a:gsLst>
-                  <a:path path="circle">
-                    <a:fillToRect l="100000" t="100000"/>
-                  </a:path>
-                </a:gradFill>
-              </a:rPr>
-              <a:t>historial de versiones</a:t>
-            </a:r>
-            <a:r>
-              <a:rPr lang="es-ES" sz="2800" dirty="0"/>
-              <a:t> de lo que queramos</a:t>
-            </a:r>
-          </a:p>
-        </p:txBody>
-      </p:sp>
-      <p:sp>
-        <p:nvSpPr>
-          <p:cNvPr id="9" name="CuadroTexto 8">
-            <a:extLst>
-              <a:ext uri="{FF2B5EF4-FFF2-40B4-BE49-F238E27FC236}">
-                <a16:creationId xmlns:a16="http://schemas.microsoft.com/office/drawing/2014/main" id="{6B630C59-AC81-194F-09C1-C357D45AE648}"/>
-              </a:ext>
-            </a:extLst>
-          </p:cNvPr>
-          <p:cNvSpPr txBox="1"/>
-          <p:nvPr/>
-        </p:nvSpPr>
-        <p:spPr>
-          <a:xfrm>
-            <a:off x="838200" y="4579044"/>
-            <a:ext cx="8125708" cy="1815882"/>
-          </a:xfrm>
-          <a:prstGeom prst="rect">
-            <a:avLst/>
-          </a:prstGeom>
-          <a:noFill/>
-        </p:spPr>
-        <p:txBody>
-          <a:bodyPr wrap="square" rtlCol="0">
-            <a:spAutoFit/>
-          </a:bodyPr>
-          <a:lstStyle/>
-          <a:p>
-            <a:r>
-              <a:rPr lang="es-ES" sz="2800" dirty="0"/>
-              <a:t>Para entenderlo explicaremos dos conceptos, por encima:</a:t>
+              <a:t>Antes de empezar explicaremos dos conceptos, por encima:</a:t>
             </a:r>
           </a:p>
           <a:p>
@@ -3800,7 +6145,7 @@
 </p:sld>
 </file>
 
-<file path=ppt/slides/slide3.xml><?xml version="1.0" encoding="utf-8"?>
+<file path=ppt/slides/slide8.xml><?xml version="1.0" encoding="utf-8"?>
 <p:sld xmlns:a="http://schemas.openxmlformats.org/drawingml/2006/main" xmlns:r="http://schemas.openxmlformats.org/officeDocument/2006/relationships" xmlns:p="http://schemas.openxmlformats.org/presentationml/2006/main">
   <p:cSld>
     <p:spTree>
@@ -3937,7 +6282,7 @@
 </p:sld>
 </file>
 
-<file path=ppt/slides/slide4.xml><?xml version="1.0" encoding="utf-8"?>
+<file path=ppt/slides/slide9.xml><?xml version="1.0" encoding="utf-8"?>
 <p:sld xmlns:a="http://schemas.openxmlformats.org/drawingml/2006/main" xmlns:r="http://schemas.openxmlformats.org/officeDocument/2006/relationships" xmlns:p="http://schemas.openxmlformats.org/presentationml/2006/main">
   <p:cSld>
     <p:spTree>
@@ -4049,112 +6394,6 @@
     <p:extLst>
       <p:ext uri="{BB962C8B-B14F-4D97-AF65-F5344CB8AC3E}">
         <p14:creationId xmlns:p14="http://schemas.microsoft.com/office/powerpoint/2010/main" val="2504731986"/>
-      </p:ext>
-    </p:extLst>
-  </p:cSld>
-  <p:clrMapOvr>
-    <a:masterClrMapping/>
-  </p:clrMapOvr>
-</p:sld>
-</file>
-
-<file path=ppt/slides/slide5.xml><?xml version="1.0" encoding="utf-8"?>
-<p:sld xmlns:a="http://schemas.openxmlformats.org/drawingml/2006/main" xmlns:r="http://schemas.openxmlformats.org/officeDocument/2006/relationships" xmlns:p="http://schemas.openxmlformats.org/presentationml/2006/main">
-  <p:cSld>
-    <p:spTree>
-      <p:nvGrpSpPr>
-        <p:cNvPr id="1" name=""/>
-        <p:cNvGrpSpPr/>
-        <p:nvPr/>
-      </p:nvGrpSpPr>
-      <p:grpSpPr>
-        <a:xfrm>
-          <a:off x="0" y="0"/>
-          <a:ext cx="0" cy="0"/>
-          <a:chOff x="0" y="0"/>
-          <a:chExt cx="0" cy="0"/>
-        </a:xfrm>
-      </p:grpSpPr>
-      <p:sp>
-        <p:nvSpPr>
-          <p:cNvPr id="2" name="Título 1">
-            <a:extLst>
-              <a:ext uri="{FF2B5EF4-FFF2-40B4-BE49-F238E27FC236}">
-                <a16:creationId xmlns:a16="http://schemas.microsoft.com/office/drawing/2014/main" id="{C291AFC8-2CF3-7BFE-326B-0915B8CDE65D}"/>
-              </a:ext>
-            </a:extLst>
-          </p:cNvPr>
-          <p:cNvSpPr>
-            <a:spLocks noGrp="1"/>
-          </p:cNvSpPr>
-          <p:nvPr>
-            <p:ph type="title"/>
-          </p:nvPr>
-        </p:nvSpPr>
-        <p:spPr/>
-        <p:txBody>
-          <a:bodyPr/>
-          <a:lstStyle/>
-          <a:p>
-            <a:r>
-              <a:rPr lang="es-ES" dirty="0"/>
-              <a:t>ESQUEMAS</a:t>
-            </a:r>
-          </a:p>
-        </p:txBody>
-      </p:sp>
-      <p:sp>
-        <p:nvSpPr>
-          <p:cNvPr id="3" name="Marcador de contenido 2">
-            <a:extLst>
-              <a:ext uri="{FF2B5EF4-FFF2-40B4-BE49-F238E27FC236}">
-                <a16:creationId xmlns:a16="http://schemas.microsoft.com/office/drawing/2014/main" id="{BA43C8AD-23B4-8D9A-3244-2E7AE40417CC}"/>
-              </a:ext>
-            </a:extLst>
-          </p:cNvPr>
-          <p:cNvSpPr>
-            <a:spLocks noGrp="1"/>
-          </p:cNvSpPr>
-          <p:nvPr>
-            <p:ph idx="1"/>
-          </p:nvPr>
-        </p:nvSpPr>
-        <p:spPr/>
-        <p:txBody>
-          <a:bodyPr/>
-          <a:lstStyle/>
-          <a:p>
-            <a:r>
-              <a:rPr lang="es-ES" dirty="0"/>
-              <a:t>Un cambio altera la lista enlazada, y cada cambio en la lista enlaza es un nuevo hash, explicar entonces porque hace un rebase el cambio y aparecen </a:t>
-            </a:r>
-            <a:r>
-              <a:rPr lang="es-ES" dirty="0" err="1"/>
-              <a:t>commits</a:t>
-            </a:r>
-            <a:r>
-              <a:rPr lang="es-ES" dirty="0"/>
-              <a:t> a descargar</a:t>
-            </a:r>
-          </a:p>
-          <a:p>
-            <a:r>
-              <a:rPr lang="es-ES" dirty="0"/>
-              <a:t>Dibujo de una lista enlazada</a:t>
-            </a:r>
-          </a:p>
-          <a:p>
-            <a:r>
-              <a:rPr lang="es-ES" dirty="0"/>
-              <a:t>Dibujo simplificado de un hash</a:t>
-            </a:r>
-          </a:p>
-        </p:txBody>
-      </p:sp>
-    </p:spTree>
-    <p:extLst>
-      <p:ext uri="{BB962C8B-B14F-4D97-AF65-F5344CB8AC3E}">
-        <p14:creationId xmlns:p14="http://schemas.microsoft.com/office/powerpoint/2010/main" val="3976417454"/>
       </p:ext>
     </p:extLst>
   </p:cSld>

</xml_diff>

<commit_message>
feat(simplifying-git): visual updates and progress
</commit_message>
<xml_diff>
--- a/simplifying-git/fear-the-cli-no-more/simplifying-git-fear-the-cli-no-more.slides.es.pptx
+++ b/simplifying-git/fear-the-cli-no-more/simplifying-git-fear-the-cli-no-more.slides.es.pptx
@@ -11,15 +11,22 @@
     <p:sldId id="264" r:id="rId5"/>
     <p:sldId id="262" r:id="rId6"/>
     <p:sldId id="265" r:id="rId7"/>
-    <p:sldId id="257" r:id="rId8"/>
-    <p:sldId id="259" r:id="rId9"/>
-    <p:sldId id="258" r:id="rId10"/>
-    <p:sldId id="260" r:id="rId11"/>
-    <p:sldId id="269" r:id="rId12"/>
+    <p:sldId id="269" r:id="rId8"/>
+    <p:sldId id="257" r:id="rId9"/>
+    <p:sldId id="259" r:id="rId10"/>
+    <p:sldId id="258" r:id="rId11"/>
+    <p:sldId id="260" r:id="rId12"/>
     <p:sldId id="270" r:id="rId13"/>
-    <p:sldId id="267" r:id="rId14"/>
-    <p:sldId id="261" r:id="rId15"/>
-    <p:sldId id="266" r:id="rId16"/>
+    <p:sldId id="273" r:id="rId14"/>
+    <p:sldId id="276" r:id="rId15"/>
+    <p:sldId id="277" r:id="rId16"/>
+    <p:sldId id="267" r:id="rId17"/>
+    <p:sldId id="261" r:id="rId18"/>
+    <p:sldId id="272" r:id="rId19"/>
+    <p:sldId id="266" r:id="rId20"/>
+    <p:sldId id="271" r:id="rId21"/>
+    <p:sldId id="274" r:id="rId22"/>
+    <p:sldId id="275" r:id="rId23"/>
   </p:sldIdLst>
   <p:sldSz cx="12192000" cy="6858000"/>
   <p:notesSz cx="6858000" cy="9144000"/>
@@ -130,15 +137,22 @@
             <p14:sldId id="262"/>
           </p14:sldIdLst>
         </p14:section>
-        <p14:section name="Conceptos (Modelo mental)" id="{2E200D25-3479-488F-8095-05C650D48EB5}">
+        <p14:section name="I - Modelo mental" id="{2E200D25-3479-488F-8095-05C650D48EB5}">
           <p14:sldIdLst>
             <p14:sldId id="265"/>
+            <p14:sldId id="269"/>
             <p14:sldId id="257"/>
             <p14:sldId id="259"/>
             <p14:sldId id="258"/>
             <p14:sldId id="260"/>
-            <p14:sldId id="269"/>
             <p14:sldId id="270"/>
+          </p14:sldIdLst>
+        </p14:section>
+        <p14:section name="I - Las bases; entornos, commits, add, remove" id="{0219F79B-A81E-4361-BCEA-90B74AB46B08}">
+          <p14:sldIdLst>
+            <p14:sldId id="273"/>
+            <p14:sldId id="276"/>
+            <p14:sldId id="277"/>
           </p14:sldIdLst>
         </p14:section>
         <p14:section name="Fin de la primera sesión" id="{4F47F7D3-8F7B-43EE-ACDB-C75BC471F8FC}">
@@ -148,6 +162,7 @@
           <p14:sldIdLst>
             <p14:sldId id="267"/>
             <p14:sldId id="261"/>
+            <p14:sldId id="272"/>
           </p14:sldIdLst>
         </p14:section>
         <p14:section name="Fin de la segunda sesión" id="{7259622E-334C-43B5-8DB2-425DB5978CA9}">
@@ -156,10 +171,17 @@
         <p14:section name="Inicio de la tercera sesión" id="{8C7ED144-54EB-4D19-A618-B6EF8DF0CA4F}">
           <p14:sldIdLst>
             <p14:sldId id="266"/>
+            <p14:sldId id="271"/>
           </p14:sldIdLst>
         </p14:section>
         <p14:section name="Fin de la tercera sesión" id="{11398076-7C0E-4AE9-92BA-312E512DB9B8}">
           <p14:sldIdLst/>
+        </p14:section>
+        <p14:section name="Clausura" id="{5A65086D-AF6A-4096-A0AF-BA32DA6093BA}">
+          <p14:sldIdLst>
+            <p14:sldId id="274"/>
+            <p14:sldId id="275"/>
+          </p14:sldIdLst>
         </p14:section>
       </p14:sectionLst>
     </p:ext>
@@ -168,6 +190,38 @@
     </p:ext>
   </p:extLst>
 </p:presentation>
+</file>
+
+<file path=ppt/authors.xml><?xml version="1.0" encoding="utf-8"?>
+<p188:authorLst xmlns:a="http://schemas.openxmlformats.org/drawingml/2006/main" xmlns:r="http://schemas.openxmlformats.org/officeDocument/2006/relationships" xmlns:p188="http://schemas.microsoft.com/office/powerpoint/2018/8/main">
+  <p188:author id="{55FAF72C-6E70-59C4-67AD-FC2ED33AE7B3}" name="Pepe Fabra" initials="PF" userId="37f8446d3c55dfea" providerId="Windows Live"/>
+</p188:authorLst>
+</file>
+
+<file path=ppt/comments/modernComment_115_B8A9B70B.xml><?xml version="1.0" encoding="utf-8"?>
+<p188:cmLst xmlns:a="http://schemas.openxmlformats.org/drawingml/2006/main" xmlns:r="http://schemas.openxmlformats.org/officeDocument/2006/relationships" xmlns:p188="http://schemas.microsoft.com/office/powerpoint/2018/8/main">
+  <p188:cm id="{2C5B77E8-8011-4AE2-B685-5ECF4B5683C4}" authorId="{55FAF72C-6E70-59C4-67AD-FC2ED33AE7B3}" created="2023-06-10T14:13:33.471">
+    <ac:txMkLst xmlns:ac="http://schemas.microsoft.com/office/drawing/2013/main/command">
+      <pc:docMk xmlns:pc="http://schemas.microsoft.com/office/powerpoint/2013/main/command"/>
+      <pc:sldMk xmlns:pc="http://schemas.microsoft.com/office/powerpoint/2013/main/command" cId="3098130187" sldId="277"/>
+      <ac:spMk id="3" creationId="{83139AFF-1E34-1238-EA57-C9EFF35A1DFA}"/>
+      <ac:txMk cp="396" len="28">
+        <ac:context len="425" hash="3669523167"/>
+      </ac:txMk>
+    </ac:txMkLst>
+    <p188:pos x="8732520" y="3863975"/>
+    <p188:txBody>
+      <a:bodyPr/>
+      <a:lstStyle/>
+      <a:p>
+        <a:r>
+          <a:rPr lang="es-ES"/>
+          <a:t>Lo explicaremos más adelante, comentarlo</a:t>
+        </a:r>
+      </a:p>
+    </p188:txBody>
+  </p188:cm>
+</p188:cmLst>
 </file>
 
 <file path=ppt/slideLayouts/slideLayout1.xml><?xml version="1.0" encoding="utf-8"?>
@@ -317,7 +371,7 @@
           <a:p>
             <a:fld id="{7C8BB0C9-757F-4D7A-8A7C-BC915ADF917F}" type="datetimeFigureOut">
               <a:rPr lang="es-ES" smtClean="0"/>
-              <a:t>09/06/2023</a:t>
+              <a:t>10/06/2023</a:t>
             </a:fld>
             <a:endParaRPr lang="es-ES"/>
           </a:p>
@@ -515,7 +569,7 @@
           <a:p>
             <a:fld id="{7C8BB0C9-757F-4D7A-8A7C-BC915ADF917F}" type="datetimeFigureOut">
               <a:rPr lang="es-ES" smtClean="0"/>
-              <a:t>09/06/2023</a:t>
+              <a:t>10/06/2023</a:t>
             </a:fld>
             <a:endParaRPr lang="es-ES"/>
           </a:p>
@@ -723,7 +777,7 @@
           <a:p>
             <a:fld id="{7C8BB0C9-757F-4D7A-8A7C-BC915ADF917F}" type="datetimeFigureOut">
               <a:rPr lang="es-ES" smtClean="0"/>
-              <a:t>09/06/2023</a:t>
+              <a:t>10/06/2023</a:t>
             </a:fld>
             <a:endParaRPr lang="es-ES"/>
           </a:p>
@@ -921,7 +975,7 @@
           <a:p>
             <a:fld id="{7C8BB0C9-757F-4D7A-8A7C-BC915ADF917F}" type="datetimeFigureOut">
               <a:rPr lang="es-ES" smtClean="0"/>
-              <a:t>09/06/2023</a:t>
+              <a:t>10/06/2023</a:t>
             </a:fld>
             <a:endParaRPr lang="es-ES"/>
           </a:p>
@@ -1196,7 +1250,7 @@
           <a:p>
             <a:fld id="{7C8BB0C9-757F-4D7A-8A7C-BC915ADF917F}" type="datetimeFigureOut">
               <a:rPr lang="es-ES" smtClean="0"/>
-              <a:t>09/06/2023</a:t>
+              <a:t>10/06/2023</a:t>
             </a:fld>
             <a:endParaRPr lang="es-ES"/>
           </a:p>
@@ -1461,7 +1515,7 @@
           <a:p>
             <a:fld id="{7C8BB0C9-757F-4D7A-8A7C-BC915ADF917F}" type="datetimeFigureOut">
               <a:rPr lang="es-ES" smtClean="0"/>
-              <a:t>09/06/2023</a:t>
+              <a:t>10/06/2023</a:t>
             </a:fld>
             <a:endParaRPr lang="es-ES"/>
           </a:p>
@@ -1873,7 +1927,7 @@
           <a:p>
             <a:fld id="{7C8BB0C9-757F-4D7A-8A7C-BC915ADF917F}" type="datetimeFigureOut">
               <a:rPr lang="es-ES" smtClean="0"/>
-              <a:t>09/06/2023</a:t>
+              <a:t>10/06/2023</a:t>
             </a:fld>
             <a:endParaRPr lang="es-ES"/>
           </a:p>
@@ -2014,7 +2068,7 @@
           <a:p>
             <a:fld id="{7C8BB0C9-757F-4D7A-8A7C-BC915ADF917F}" type="datetimeFigureOut">
               <a:rPr lang="es-ES" smtClean="0"/>
-              <a:t>09/06/2023</a:t>
+              <a:t>10/06/2023</a:t>
             </a:fld>
             <a:endParaRPr lang="es-ES"/>
           </a:p>
@@ -2127,7 +2181,7 @@
           <a:p>
             <a:fld id="{7C8BB0C9-757F-4D7A-8A7C-BC915ADF917F}" type="datetimeFigureOut">
               <a:rPr lang="es-ES" smtClean="0"/>
-              <a:t>09/06/2023</a:t>
+              <a:t>10/06/2023</a:t>
             </a:fld>
             <a:endParaRPr lang="es-ES"/>
           </a:p>
@@ -2438,7 +2492,7 @@
           <a:p>
             <a:fld id="{7C8BB0C9-757F-4D7A-8A7C-BC915ADF917F}" type="datetimeFigureOut">
               <a:rPr lang="es-ES" smtClean="0"/>
-              <a:t>09/06/2023</a:t>
+              <a:t>10/06/2023</a:t>
             </a:fld>
             <a:endParaRPr lang="es-ES"/>
           </a:p>
@@ -2726,7 +2780,7 @@
           <a:p>
             <a:fld id="{7C8BB0C9-757F-4D7A-8A7C-BC915ADF917F}" type="datetimeFigureOut">
               <a:rPr lang="es-ES" smtClean="0"/>
-              <a:t>09/06/2023</a:t>
+              <a:t>10/06/2023</a:t>
             </a:fld>
             <a:endParaRPr lang="es-ES"/>
           </a:p>
@@ -2967,7 +3021,7 @@
           <a:p>
             <a:fld id="{7C8BB0C9-757F-4D7A-8A7C-BC915ADF917F}" type="datetimeFigureOut">
               <a:rPr lang="es-ES" smtClean="0"/>
-              <a:t>09/06/2023</a:t>
+              <a:t>10/06/2023</a:t>
             </a:fld>
             <a:endParaRPr lang="es-ES"/>
           </a:p>
@@ -3426,8 +3480,47 @@
                 </a:effectLst>
                 <a:latin typeface="Montserrat" panose="00000500000000000000" pitchFamily="50" charset="0"/>
               </a:rPr>
-              <a:t>SIMPLIFICANDO GIT</a:t>
-            </a:r>
+              <a:t>simplificando </a:t>
+            </a:r>
+            <a:r>
+              <a:rPr lang="es-ES" b="1" dirty="0" err="1">
+                <a:gradFill flip="none" rotWithShape="1">
+                  <a:gsLst>
+                    <a:gs pos="0">
+                      <a:srgbClr val="36D1DC"/>
+                    </a:gs>
+                    <a:gs pos="100000">
+                      <a:srgbClr val="5B86E5"/>
+                    </a:gs>
+                  </a:gsLst>
+                  <a:lin ang="3600000" scaled="0"/>
+                  <a:tileRect/>
+                </a:gradFill>
+                <a:effectLst>
+                  <a:reflection blurRad="101600" stA="18000" endPos="65000" dist="50800" dir="5400000" sy="-100000" algn="bl" rotWithShape="0"/>
+                </a:effectLst>
+                <a:latin typeface="Montserrat" panose="00000500000000000000" pitchFamily="50" charset="0"/>
+              </a:rPr>
+              <a:t>git</a:t>
+            </a:r>
+            <a:endParaRPr lang="es-ES" b="1" dirty="0">
+              <a:gradFill flip="none" rotWithShape="1">
+                <a:gsLst>
+                  <a:gs pos="0">
+                    <a:srgbClr val="36D1DC"/>
+                  </a:gs>
+                  <a:gs pos="100000">
+                    <a:srgbClr val="5B86E5"/>
+                  </a:gs>
+                </a:gsLst>
+                <a:lin ang="3600000" scaled="0"/>
+                <a:tileRect/>
+              </a:gradFill>
+              <a:effectLst>
+                <a:reflection blurRad="101600" stA="18000" endPos="65000" dist="50800" dir="5400000" sy="-100000" algn="bl" rotWithShape="0"/>
+              </a:effectLst>
+              <a:latin typeface="Montserrat" panose="00000500000000000000" pitchFamily="50" charset="0"/>
+            </a:endParaRPr>
           </a:p>
         </p:txBody>
       </p:sp>
@@ -3453,8 +3546,21 @@
           <a:lstStyle/>
           <a:p>
             <a:r>
-              <a:rPr lang="es-ES" dirty="0"/>
-              <a:t>Piérdele el miedo a la línea de comandos</a:t>
+              <a:rPr lang="es-ES" b="1" dirty="0">
+                <a:gradFill>
+                  <a:gsLst>
+                    <a:gs pos="31000">
+                      <a:srgbClr val="F7971E"/>
+                    </a:gs>
+                    <a:gs pos="100000">
+                      <a:srgbClr val="FFD200"/>
+                    </a:gs>
+                  </a:gsLst>
+                  <a:lin ang="0" scaled="0"/>
+                </a:gradFill>
+                <a:latin typeface="Montserrat" panose="00000500000000000000" pitchFamily="50" charset="0"/>
+              </a:rPr>
+              <a:t>piérdele el miedo a la línea de comandos</a:t>
             </a:r>
           </a:p>
         </p:txBody>
@@ -3494,7 +3600,7 @@
           <p:cNvPr id="2" name="Título 1">
             <a:extLst>
               <a:ext uri="{FF2B5EF4-FFF2-40B4-BE49-F238E27FC236}">
-                <a16:creationId xmlns:a16="http://schemas.microsoft.com/office/drawing/2014/main" id="{C291AFC8-2CF3-7BFE-326B-0915B8CDE65D}"/>
+                <a16:creationId xmlns:a16="http://schemas.microsoft.com/office/drawing/2014/main" id="{B92FEAEF-8D67-D80D-C9A5-27E66DCAA4C7}"/>
               </a:ext>
             </a:extLst>
           </p:cNvPr>
@@ -3511,56 +3617,71 @@
           <a:lstStyle/>
           <a:p>
             <a:r>
-              <a:rPr lang="es-ES" dirty="0"/>
-              <a:t>ESQUEMAS</a:t>
-            </a:r>
-          </a:p>
-        </p:txBody>
-      </p:sp>
-      <p:sp>
-        <p:nvSpPr>
-          <p:cNvPr id="3" name="Marcador de contenido 2">
-            <a:extLst>
-              <a:ext uri="{FF2B5EF4-FFF2-40B4-BE49-F238E27FC236}">
-                <a16:creationId xmlns:a16="http://schemas.microsoft.com/office/drawing/2014/main" id="{BA43C8AD-23B4-8D9A-3244-2E7AE40417CC}"/>
-              </a:ext>
-            </a:extLst>
-          </p:cNvPr>
-          <p:cNvSpPr>
-            <a:spLocks noGrp="1"/>
-          </p:cNvSpPr>
-          <p:nvPr>
-            <p:ph idx="1"/>
-          </p:nvPr>
-        </p:nvSpPr>
-        <p:spPr/>
-        <p:txBody>
-          <a:bodyPr/>
-          <a:lstStyle/>
-          <a:p>
-            <a:r>
-              <a:rPr lang="es-ES" dirty="0"/>
-              <a:t>Un cambio altera la lista enlazada, y cada cambio en la lista enlaza es un nuevo hash, explicar entonces porque hace un rebase el cambio y aparecen </a:t>
-            </a:r>
-            <a:r>
-              <a:rPr lang="es-ES" dirty="0" err="1"/>
-              <a:t>commits</a:t>
-            </a:r>
-            <a:r>
-              <a:rPr lang="es-ES" dirty="0"/>
-              <a:t> a descargar</a:t>
-            </a:r>
-          </a:p>
-          <a:p>
-            <a:r>
-              <a:rPr lang="es-ES" dirty="0"/>
-              <a:t>Dibujo de una lista enlazada</a:t>
-            </a:r>
-          </a:p>
-          <a:p>
-            <a:r>
-              <a:rPr lang="es-ES" dirty="0"/>
-              <a:t>Dibujo simplificado de un hash</a:t>
+              <a:rPr lang="es-ES" b="1" dirty="0">
+                <a:gradFill flip="none" rotWithShape="1">
+                  <a:gsLst>
+                    <a:gs pos="0">
+                      <a:srgbClr val="00B0F0"/>
+                    </a:gs>
+                    <a:gs pos="48000">
+                      <a:schemeClr val="accent1">
+                        <a:lumMod val="60000"/>
+                        <a:lumOff val="40000"/>
+                      </a:schemeClr>
+                    </a:gs>
+                    <a:gs pos="100000">
+                      <a:srgbClr val="B684D2"/>
+                    </a:gs>
+                  </a:gsLst>
+                  <a:path path="rect">
+                    <a:fillToRect l="100000" t="100000"/>
+                  </a:path>
+                  <a:tileRect r="-100000" b="-100000"/>
+                </a:gradFill>
+                <a:latin typeface="Montserrat" panose="00000500000000000000" pitchFamily="50" charset="0"/>
+              </a:rPr>
+              <a:t>listas enlazadas</a:t>
+            </a:r>
+          </a:p>
+        </p:txBody>
+      </p:sp>
+      <p:sp>
+        <p:nvSpPr>
+          <p:cNvPr id="4" name="CuadroTexto 3">
+            <a:extLst>
+              <a:ext uri="{FF2B5EF4-FFF2-40B4-BE49-F238E27FC236}">
+                <a16:creationId xmlns:a16="http://schemas.microsoft.com/office/drawing/2014/main" id="{B7B463BB-39A5-59C0-CEDB-21B6F79FBDCF}"/>
+              </a:ext>
+            </a:extLst>
+          </p:cNvPr>
+          <p:cNvSpPr txBox="1"/>
+          <p:nvPr/>
+        </p:nvSpPr>
+        <p:spPr>
+          <a:xfrm>
+            <a:off x="838200" y="1690688"/>
+            <a:ext cx="4664547" cy="954107"/>
+          </a:xfrm>
+          <a:prstGeom prst="rect">
+            <a:avLst/>
+          </a:prstGeom>
+          <a:noFill/>
+        </p:spPr>
+        <p:txBody>
+          <a:bodyPr wrap="none" rtlCol="0">
+            <a:spAutoFit/>
+          </a:bodyPr>
+          <a:lstStyle/>
+          <a:p>
+            <a:r>
+              <a:rPr lang="es-ES" sz="2800" dirty="0"/>
+              <a:t>Estructuras de datos</a:t>
+            </a:r>
+          </a:p>
+          <a:p>
+            <a:r>
+              <a:rPr lang="es-ES" sz="2800" dirty="0"/>
+              <a:t>Nodos anteriores y posteriores</a:t>
             </a:r>
           </a:p>
         </p:txBody>
@@ -3568,7 +3689,7 @@
     </p:spTree>
     <p:extLst>
       <p:ext uri="{BB962C8B-B14F-4D97-AF65-F5344CB8AC3E}">
-        <p14:creationId xmlns:p14="http://schemas.microsoft.com/office/powerpoint/2010/main" val="3976417454"/>
+        <p14:creationId xmlns:p14="http://schemas.microsoft.com/office/powerpoint/2010/main" val="2504731986"/>
       </p:ext>
     </p:extLst>
   </p:cSld>
@@ -3600,7 +3721,7 @@
           <p:cNvPr id="2" name="Título 1">
             <a:extLst>
               <a:ext uri="{FF2B5EF4-FFF2-40B4-BE49-F238E27FC236}">
-                <a16:creationId xmlns:a16="http://schemas.microsoft.com/office/drawing/2014/main" id="{7B5B4AE4-9A9F-AE16-4B94-F901F6CED438}"/>
+                <a16:creationId xmlns:a16="http://schemas.microsoft.com/office/drawing/2014/main" id="{C291AFC8-2CF3-7BFE-326B-0915B8CDE65D}"/>
               </a:ext>
             </a:extLst>
           </p:cNvPr>
@@ -3618,7 +3739,7 @@
           <a:p>
             <a:r>
               <a:rPr lang="es-ES" dirty="0"/>
-              <a:t>Temas a tratar</a:t>
+              <a:t>ESQUEMAS</a:t>
             </a:r>
           </a:p>
         </p:txBody>
@@ -3628,7 +3749,7 @@
           <p:cNvPr id="3" name="Marcador de contenido 2">
             <a:extLst>
               <a:ext uri="{FF2B5EF4-FFF2-40B4-BE49-F238E27FC236}">
-                <a16:creationId xmlns:a16="http://schemas.microsoft.com/office/drawing/2014/main" id="{E8C38B41-EBDB-1003-553E-989C02C80671}"/>
+                <a16:creationId xmlns:a16="http://schemas.microsoft.com/office/drawing/2014/main" id="{BA43C8AD-23B4-8D9A-3244-2E7AE40417CC}"/>
               </a:ext>
             </a:extLst>
           </p:cNvPr>
@@ -3639,554 +3760,34 @@
             <p:ph idx="1"/>
           </p:nvPr>
         </p:nvSpPr>
-        <p:spPr>
-          <a:xfrm>
-            <a:off x="838200" y="1825625"/>
-            <a:ext cx="3945556" cy="4351338"/>
-          </a:xfrm>
-        </p:spPr>
-        <p:txBody>
-          <a:bodyPr>
-            <a:normAutofit fontScale="85000" lnSpcReduction="20000"/>
-          </a:bodyPr>
-          <a:lstStyle/>
-          <a:p>
-            <a:r>
-              <a:rPr lang="en-US" dirty="0"/>
-              <a:t>Origin</a:t>
-            </a:r>
-          </a:p>
-          <a:p>
-            <a:r>
-              <a:rPr lang="en-US" dirty="0"/>
-              <a:t>Upstream</a:t>
-            </a:r>
-          </a:p>
-          <a:p>
-            <a:r>
-              <a:rPr lang="en-US" dirty="0" err="1"/>
-              <a:t>stategy</a:t>
-            </a:r>
-            <a:r>
-              <a:rPr lang="en-US" dirty="0"/>
-              <a:t> option</a:t>
-            </a:r>
-          </a:p>
-          <a:p>
-            <a:pPr lvl="1"/>
-            <a:r>
-              <a:rPr lang="en-US" dirty="0"/>
-              <a:t>ours/theirs</a:t>
-            </a:r>
-          </a:p>
-          <a:p>
-            <a:r>
-              <a:rPr lang="en-US" dirty="0"/>
-              <a:t>Merge</a:t>
-            </a:r>
-          </a:p>
-          <a:p>
-            <a:r>
-              <a:rPr lang="en-US" dirty="0"/>
-              <a:t>Rebase</a:t>
-            </a:r>
-          </a:p>
-          <a:p>
-            <a:r>
-              <a:rPr lang="en-US" dirty="0"/>
-              <a:t>Bisect</a:t>
-            </a:r>
-          </a:p>
-          <a:p>
+        <p:spPr/>
+        <p:txBody>
+          <a:bodyPr/>
+          <a:lstStyle/>
+          <a:p>
+            <a:r>
+              <a:rPr lang="es-ES" dirty="0"/>
+              <a:t>Un cambio altera la lista enlazada, y cada cambio en la lista enlaza es un nuevo hash, explicar entonces porque hace un rebase el cambio y aparecen </a:t>
+            </a:r>
             <a:r>
               <a:rPr lang="es-ES" dirty="0" err="1"/>
-              <a:t>Checkout</a:t>
-            </a:r>
-            <a:endParaRPr lang="es-ES" dirty="0"/>
-          </a:p>
-          <a:p>
-            <a:r>
-              <a:rPr lang="es-ES" dirty="0" err="1"/>
-              <a:t>Branches</a:t>
-            </a:r>
-            <a:endParaRPr lang="es-ES" dirty="0"/>
-          </a:p>
-          <a:p>
-            <a:r>
-              <a:rPr lang="es-ES" dirty="0" err="1"/>
-              <a:t>branch</a:t>
+              <a:t>commits</a:t>
             </a:r>
             <a:r>
               <a:rPr lang="es-ES" dirty="0"/>
-              <a:t> </a:t>
-            </a:r>
-            <a:r>
-              <a:rPr lang="es-ES" dirty="0" err="1"/>
-              <a:t>rename</a:t>
-            </a:r>
-            <a:endParaRPr lang="es-ES" dirty="0"/>
+              <a:t> a descargar</a:t>
+            </a:r>
           </a:p>
           <a:p>
             <a:r>
               <a:rPr lang="es-ES" dirty="0"/>
-              <a:t>crear ramas con </a:t>
-            </a:r>
-            <a:r>
-              <a:rPr lang="es-ES" dirty="0" err="1"/>
-              <a:t>checkout</a:t>
-            </a:r>
-            <a:endParaRPr lang="es-ES" dirty="0"/>
-          </a:p>
-        </p:txBody>
-      </p:sp>
-      <p:sp>
-        <p:nvSpPr>
-          <p:cNvPr id="4" name="Marcador de contenido 2">
-            <a:extLst>
-              <a:ext uri="{FF2B5EF4-FFF2-40B4-BE49-F238E27FC236}">
-                <a16:creationId xmlns:a16="http://schemas.microsoft.com/office/drawing/2014/main" id="{ECB9B7F9-DF27-F213-DAB9-3A8A76107E82}"/>
-              </a:ext>
-            </a:extLst>
-          </p:cNvPr>
-          <p:cNvSpPr txBox="1">
-            <a:spLocks/>
-          </p:cNvSpPr>
-          <p:nvPr/>
-        </p:nvSpPr>
-        <p:spPr>
-          <a:xfrm>
-            <a:off x="4561439" y="1820846"/>
-            <a:ext cx="3945556" cy="4351338"/>
-          </a:xfrm>
-          <a:prstGeom prst="rect">
-            <a:avLst/>
-          </a:prstGeom>
-        </p:spPr>
-        <p:txBody>
-          <a:bodyPr vert="horz" lIns="91440" tIns="45720" rIns="91440" bIns="45720" rtlCol="0">
-            <a:normAutofit fontScale="92500" lnSpcReduction="10000"/>
-          </a:bodyPr>
-          <a:lstStyle>
-            <a:lvl1pPr marL="228600" indent="-228600" algn="l" defTabSz="914400" rtl="0" eaLnBrk="1" latinLnBrk="0" hangingPunct="1">
-              <a:lnSpc>
-                <a:spcPct val="90000"/>
-              </a:lnSpc>
-              <a:spcBef>
-                <a:spcPts val="1000"/>
-              </a:spcBef>
-              <a:buFont typeface="Arial" panose="020B0604020202020204" pitchFamily="34" charset="0"/>
-              <a:buChar char="•"/>
-              <a:defRPr sz="2800" kern="1200">
-                <a:solidFill>
-                  <a:schemeClr val="tx1"/>
-                </a:solidFill>
-                <a:latin typeface="+mn-lt"/>
-                <a:ea typeface="+mn-ea"/>
-                <a:cs typeface="+mn-cs"/>
-              </a:defRPr>
-            </a:lvl1pPr>
-            <a:lvl2pPr marL="685800" indent="-228600" algn="l" defTabSz="914400" rtl="0" eaLnBrk="1" latinLnBrk="0" hangingPunct="1">
-              <a:lnSpc>
-                <a:spcPct val="90000"/>
-              </a:lnSpc>
-              <a:spcBef>
-                <a:spcPts val="500"/>
-              </a:spcBef>
-              <a:buFont typeface="Arial" panose="020B0604020202020204" pitchFamily="34" charset="0"/>
-              <a:buChar char="•"/>
-              <a:defRPr sz="2400" kern="1200">
-                <a:solidFill>
-                  <a:schemeClr val="tx1"/>
-                </a:solidFill>
-                <a:latin typeface="+mn-lt"/>
-                <a:ea typeface="+mn-ea"/>
-                <a:cs typeface="+mn-cs"/>
-              </a:defRPr>
-            </a:lvl2pPr>
-            <a:lvl3pPr marL="1143000" indent="-228600" algn="l" defTabSz="914400" rtl="0" eaLnBrk="1" latinLnBrk="0" hangingPunct="1">
-              <a:lnSpc>
-                <a:spcPct val="90000"/>
-              </a:lnSpc>
-              <a:spcBef>
-                <a:spcPts val="500"/>
-              </a:spcBef>
-              <a:buFont typeface="Arial" panose="020B0604020202020204" pitchFamily="34" charset="0"/>
-              <a:buChar char="•"/>
-              <a:defRPr sz="2000" kern="1200">
-                <a:solidFill>
-                  <a:schemeClr val="tx1"/>
-                </a:solidFill>
-                <a:latin typeface="+mn-lt"/>
-                <a:ea typeface="+mn-ea"/>
-                <a:cs typeface="+mn-cs"/>
-              </a:defRPr>
-            </a:lvl3pPr>
-            <a:lvl4pPr marL="1600200" indent="-228600" algn="l" defTabSz="914400" rtl="0" eaLnBrk="1" latinLnBrk="0" hangingPunct="1">
-              <a:lnSpc>
-                <a:spcPct val="90000"/>
-              </a:lnSpc>
-              <a:spcBef>
-                <a:spcPts val="500"/>
-              </a:spcBef>
-              <a:buFont typeface="Arial" panose="020B0604020202020204" pitchFamily="34" charset="0"/>
-              <a:buChar char="•"/>
-              <a:defRPr sz="1800" kern="1200">
-                <a:solidFill>
-                  <a:schemeClr val="tx1"/>
-                </a:solidFill>
-                <a:latin typeface="+mn-lt"/>
-                <a:ea typeface="+mn-ea"/>
-                <a:cs typeface="+mn-cs"/>
-              </a:defRPr>
-            </a:lvl4pPr>
-            <a:lvl5pPr marL="2057400" indent="-228600" algn="l" defTabSz="914400" rtl="0" eaLnBrk="1" latinLnBrk="0" hangingPunct="1">
-              <a:lnSpc>
-                <a:spcPct val="90000"/>
-              </a:lnSpc>
-              <a:spcBef>
-                <a:spcPts val="500"/>
-              </a:spcBef>
-              <a:buFont typeface="Arial" panose="020B0604020202020204" pitchFamily="34" charset="0"/>
-              <a:buChar char="•"/>
-              <a:defRPr sz="1800" kern="1200">
-                <a:solidFill>
-                  <a:schemeClr val="tx1"/>
-                </a:solidFill>
-                <a:latin typeface="+mn-lt"/>
-                <a:ea typeface="+mn-ea"/>
-                <a:cs typeface="+mn-cs"/>
-              </a:defRPr>
-            </a:lvl5pPr>
-            <a:lvl6pPr marL="2514600" indent="-228600" algn="l" defTabSz="914400" rtl="0" eaLnBrk="1" latinLnBrk="0" hangingPunct="1">
-              <a:lnSpc>
-                <a:spcPct val="90000"/>
-              </a:lnSpc>
-              <a:spcBef>
-                <a:spcPts val="500"/>
-              </a:spcBef>
-              <a:buFont typeface="Arial" panose="020B0604020202020204" pitchFamily="34" charset="0"/>
-              <a:buChar char="•"/>
-              <a:defRPr sz="1800" kern="1200">
-                <a:solidFill>
-                  <a:schemeClr val="tx1"/>
-                </a:solidFill>
-                <a:latin typeface="+mn-lt"/>
-                <a:ea typeface="+mn-ea"/>
-                <a:cs typeface="+mn-cs"/>
-              </a:defRPr>
-            </a:lvl6pPr>
-            <a:lvl7pPr marL="2971800" indent="-228600" algn="l" defTabSz="914400" rtl="0" eaLnBrk="1" latinLnBrk="0" hangingPunct="1">
-              <a:lnSpc>
-                <a:spcPct val="90000"/>
-              </a:lnSpc>
-              <a:spcBef>
-                <a:spcPts val="500"/>
-              </a:spcBef>
-              <a:buFont typeface="Arial" panose="020B0604020202020204" pitchFamily="34" charset="0"/>
-              <a:buChar char="•"/>
-              <a:defRPr sz="1800" kern="1200">
-                <a:solidFill>
-                  <a:schemeClr val="tx1"/>
-                </a:solidFill>
-                <a:latin typeface="+mn-lt"/>
-                <a:ea typeface="+mn-ea"/>
-                <a:cs typeface="+mn-cs"/>
-              </a:defRPr>
-            </a:lvl7pPr>
-            <a:lvl8pPr marL="3429000" indent="-228600" algn="l" defTabSz="914400" rtl="0" eaLnBrk="1" latinLnBrk="0" hangingPunct="1">
-              <a:lnSpc>
-                <a:spcPct val="90000"/>
-              </a:lnSpc>
-              <a:spcBef>
-                <a:spcPts val="500"/>
-              </a:spcBef>
-              <a:buFont typeface="Arial" panose="020B0604020202020204" pitchFamily="34" charset="0"/>
-              <a:buChar char="•"/>
-              <a:defRPr sz="1800" kern="1200">
-                <a:solidFill>
-                  <a:schemeClr val="tx1"/>
-                </a:solidFill>
-                <a:latin typeface="+mn-lt"/>
-                <a:ea typeface="+mn-ea"/>
-                <a:cs typeface="+mn-cs"/>
-              </a:defRPr>
-            </a:lvl8pPr>
-            <a:lvl9pPr marL="3886200" indent="-228600" algn="l" defTabSz="914400" rtl="0" eaLnBrk="1" latinLnBrk="0" hangingPunct="1">
-              <a:lnSpc>
-                <a:spcPct val="90000"/>
-              </a:lnSpc>
-              <a:spcBef>
-                <a:spcPts val="500"/>
-              </a:spcBef>
-              <a:buFont typeface="Arial" panose="020B0604020202020204" pitchFamily="34" charset="0"/>
-              <a:buChar char="•"/>
-              <a:defRPr sz="1800" kern="1200">
-                <a:solidFill>
-                  <a:schemeClr val="tx1"/>
-                </a:solidFill>
-                <a:latin typeface="+mn-lt"/>
-                <a:ea typeface="+mn-ea"/>
-                <a:cs typeface="+mn-cs"/>
-              </a:defRPr>
-            </a:lvl9pPr>
-          </a:lstStyle>
-          <a:p>
-            <a:r>
-              <a:rPr lang="en-US" dirty="0"/>
-              <a:t>Origin</a:t>
-            </a:r>
-          </a:p>
-          <a:p>
-            <a:r>
-              <a:rPr lang="en-US" dirty="0"/>
-              <a:t>git stash</a:t>
-            </a:r>
-          </a:p>
-          <a:p>
-            <a:pPr lvl="1"/>
-            <a:r>
-              <a:rPr lang="en-US" dirty="0"/>
-              <a:t>keys y pop</a:t>
-            </a:r>
-          </a:p>
-          <a:p>
-            <a:r>
-              <a:rPr lang="sv-SE" dirty="0"/>
-              <a:t>git fetch vs git pull vs git push</a:t>
-            </a:r>
-          </a:p>
-          <a:p>
-            <a:pPr lvl="1"/>
-            <a:r>
-              <a:rPr lang="en-US" dirty="0"/>
-              <a:t>git fetch especial (git pull &amp;&amp; git push)</a:t>
-            </a:r>
-            <a:endParaRPr lang="sv-SE" dirty="0"/>
-          </a:p>
-          <a:p>
-            <a:r>
-              <a:rPr lang="en-US" dirty="0"/>
-              <a:t>git cherry pick</a:t>
-            </a:r>
-          </a:p>
-          <a:p>
-            <a:r>
-              <a:rPr lang="en-US" dirty="0" err="1"/>
-              <a:t>Entornos</a:t>
-            </a:r>
-            <a:endParaRPr lang="en-US" dirty="0"/>
-          </a:p>
-          <a:p>
-            <a:pPr lvl="1"/>
-            <a:r>
-              <a:rPr lang="en-US" dirty="0"/>
-              <a:t>stating, local, remote, origin</a:t>
-            </a:r>
-          </a:p>
-        </p:txBody>
-      </p:sp>
-      <p:sp>
-        <p:nvSpPr>
-          <p:cNvPr id="5" name="Marcador de contenido 2">
-            <a:extLst>
-              <a:ext uri="{FF2B5EF4-FFF2-40B4-BE49-F238E27FC236}">
-                <a16:creationId xmlns:a16="http://schemas.microsoft.com/office/drawing/2014/main" id="{8A825BB9-091A-676E-DE35-F3F9FFEDB812}"/>
-              </a:ext>
-            </a:extLst>
-          </p:cNvPr>
-          <p:cNvSpPr txBox="1">
-            <a:spLocks/>
-          </p:cNvSpPr>
-          <p:nvPr/>
-        </p:nvSpPr>
-        <p:spPr>
-          <a:xfrm>
-            <a:off x="8246444" y="1820846"/>
-            <a:ext cx="3945556" cy="4351338"/>
-          </a:xfrm>
-          <a:prstGeom prst="rect">
-            <a:avLst/>
-          </a:prstGeom>
-        </p:spPr>
-        <p:txBody>
-          <a:bodyPr vert="horz" lIns="91440" tIns="45720" rIns="91440" bIns="45720" rtlCol="0">
-            <a:normAutofit/>
-          </a:bodyPr>
-          <a:lstStyle>
-            <a:lvl1pPr marL="228600" indent="-228600" algn="l" defTabSz="914400" rtl="0" eaLnBrk="1" latinLnBrk="0" hangingPunct="1">
-              <a:lnSpc>
-                <a:spcPct val="90000"/>
-              </a:lnSpc>
-              <a:spcBef>
-                <a:spcPts val="1000"/>
-              </a:spcBef>
-              <a:buFont typeface="Arial" panose="020B0604020202020204" pitchFamily="34" charset="0"/>
-              <a:buChar char="•"/>
-              <a:defRPr sz="2800" kern="1200">
-                <a:solidFill>
-                  <a:schemeClr val="tx1"/>
-                </a:solidFill>
-                <a:latin typeface="+mn-lt"/>
-                <a:ea typeface="+mn-ea"/>
-                <a:cs typeface="+mn-cs"/>
-              </a:defRPr>
-            </a:lvl1pPr>
-            <a:lvl2pPr marL="685800" indent="-228600" algn="l" defTabSz="914400" rtl="0" eaLnBrk="1" latinLnBrk="0" hangingPunct="1">
-              <a:lnSpc>
-                <a:spcPct val="90000"/>
-              </a:lnSpc>
-              <a:spcBef>
-                <a:spcPts val="500"/>
-              </a:spcBef>
-              <a:buFont typeface="Arial" panose="020B0604020202020204" pitchFamily="34" charset="0"/>
-              <a:buChar char="•"/>
-              <a:defRPr sz="2400" kern="1200">
-                <a:solidFill>
-                  <a:schemeClr val="tx1"/>
-                </a:solidFill>
-                <a:latin typeface="+mn-lt"/>
-                <a:ea typeface="+mn-ea"/>
-                <a:cs typeface="+mn-cs"/>
-              </a:defRPr>
-            </a:lvl2pPr>
-            <a:lvl3pPr marL="1143000" indent="-228600" algn="l" defTabSz="914400" rtl="0" eaLnBrk="1" latinLnBrk="0" hangingPunct="1">
-              <a:lnSpc>
-                <a:spcPct val="90000"/>
-              </a:lnSpc>
-              <a:spcBef>
-                <a:spcPts val="500"/>
-              </a:spcBef>
-              <a:buFont typeface="Arial" panose="020B0604020202020204" pitchFamily="34" charset="0"/>
-              <a:buChar char="•"/>
-              <a:defRPr sz="2000" kern="1200">
-                <a:solidFill>
-                  <a:schemeClr val="tx1"/>
-                </a:solidFill>
-                <a:latin typeface="+mn-lt"/>
-                <a:ea typeface="+mn-ea"/>
-                <a:cs typeface="+mn-cs"/>
-              </a:defRPr>
-            </a:lvl3pPr>
-            <a:lvl4pPr marL="1600200" indent="-228600" algn="l" defTabSz="914400" rtl="0" eaLnBrk="1" latinLnBrk="0" hangingPunct="1">
-              <a:lnSpc>
-                <a:spcPct val="90000"/>
-              </a:lnSpc>
-              <a:spcBef>
-                <a:spcPts val="500"/>
-              </a:spcBef>
-              <a:buFont typeface="Arial" panose="020B0604020202020204" pitchFamily="34" charset="0"/>
-              <a:buChar char="•"/>
-              <a:defRPr sz="1800" kern="1200">
-                <a:solidFill>
-                  <a:schemeClr val="tx1"/>
-                </a:solidFill>
-                <a:latin typeface="+mn-lt"/>
-                <a:ea typeface="+mn-ea"/>
-                <a:cs typeface="+mn-cs"/>
-              </a:defRPr>
-            </a:lvl4pPr>
-            <a:lvl5pPr marL="2057400" indent="-228600" algn="l" defTabSz="914400" rtl="0" eaLnBrk="1" latinLnBrk="0" hangingPunct="1">
-              <a:lnSpc>
-                <a:spcPct val="90000"/>
-              </a:lnSpc>
-              <a:spcBef>
-                <a:spcPts val="500"/>
-              </a:spcBef>
-              <a:buFont typeface="Arial" panose="020B0604020202020204" pitchFamily="34" charset="0"/>
-              <a:buChar char="•"/>
-              <a:defRPr sz="1800" kern="1200">
-                <a:solidFill>
-                  <a:schemeClr val="tx1"/>
-                </a:solidFill>
-                <a:latin typeface="+mn-lt"/>
-                <a:ea typeface="+mn-ea"/>
-                <a:cs typeface="+mn-cs"/>
-              </a:defRPr>
-            </a:lvl5pPr>
-            <a:lvl6pPr marL="2514600" indent="-228600" algn="l" defTabSz="914400" rtl="0" eaLnBrk="1" latinLnBrk="0" hangingPunct="1">
-              <a:lnSpc>
-                <a:spcPct val="90000"/>
-              </a:lnSpc>
-              <a:spcBef>
-                <a:spcPts val="500"/>
-              </a:spcBef>
-              <a:buFont typeface="Arial" panose="020B0604020202020204" pitchFamily="34" charset="0"/>
-              <a:buChar char="•"/>
-              <a:defRPr sz="1800" kern="1200">
-                <a:solidFill>
-                  <a:schemeClr val="tx1"/>
-                </a:solidFill>
-                <a:latin typeface="+mn-lt"/>
-                <a:ea typeface="+mn-ea"/>
-                <a:cs typeface="+mn-cs"/>
-              </a:defRPr>
-            </a:lvl6pPr>
-            <a:lvl7pPr marL="2971800" indent="-228600" algn="l" defTabSz="914400" rtl="0" eaLnBrk="1" latinLnBrk="0" hangingPunct="1">
-              <a:lnSpc>
-                <a:spcPct val="90000"/>
-              </a:lnSpc>
-              <a:spcBef>
-                <a:spcPts val="500"/>
-              </a:spcBef>
-              <a:buFont typeface="Arial" panose="020B0604020202020204" pitchFamily="34" charset="0"/>
-              <a:buChar char="•"/>
-              <a:defRPr sz="1800" kern="1200">
-                <a:solidFill>
-                  <a:schemeClr val="tx1"/>
-                </a:solidFill>
-                <a:latin typeface="+mn-lt"/>
-                <a:ea typeface="+mn-ea"/>
-                <a:cs typeface="+mn-cs"/>
-              </a:defRPr>
-            </a:lvl7pPr>
-            <a:lvl8pPr marL="3429000" indent="-228600" algn="l" defTabSz="914400" rtl="0" eaLnBrk="1" latinLnBrk="0" hangingPunct="1">
-              <a:lnSpc>
-                <a:spcPct val="90000"/>
-              </a:lnSpc>
-              <a:spcBef>
-                <a:spcPts val="500"/>
-              </a:spcBef>
-              <a:buFont typeface="Arial" panose="020B0604020202020204" pitchFamily="34" charset="0"/>
-              <a:buChar char="•"/>
-              <a:defRPr sz="1800" kern="1200">
-                <a:solidFill>
-                  <a:schemeClr val="tx1"/>
-                </a:solidFill>
-                <a:latin typeface="+mn-lt"/>
-                <a:ea typeface="+mn-ea"/>
-                <a:cs typeface="+mn-cs"/>
-              </a:defRPr>
-            </a:lvl8pPr>
-            <a:lvl9pPr marL="3886200" indent="-228600" algn="l" defTabSz="914400" rtl="0" eaLnBrk="1" latinLnBrk="0" hangingPunct="1">
-              <a:lnSpc>
-                <a:spcPct val="90000"/>
-              </a:lnSpc>
-              <a:spcBef>
-                <a:spcPts val="500"/>
-              </a:spcBef>
-              <a:buFont typeface="Arial" panose="020B0604020202020204" pitchFamily="34" charset="0"/>
-              <a:buChar char="•"/>
-              <a:defRPr sz="1800" kern="1200">
-                <a:solidFill>
-                  <a:schemeClr val="tx1"/>
-                </a:solidFill>
-                <a:latin typeface="+mn-lt"/>
-                <a:ea typeface="+mn-ea"/>
-                <a:cs typeface="+mn-cs"/>
-              </a:defRPr>
-            </a:lvl9pPr>
-          </a:lstStyle>
-          <a:p>
-            <a:r>
-              <a:rPr lang="en-US" dirty="0"/>
-              <a:t>git config</a:t>
-            </a:r>
-          </a:p>
-          <a:p>
-            <a:pPr lvl="1"/>
-            <a:r>
-              <a:rPr lang="en-US" dirty="0"/>
-              <a:t>repo, system, global, user</a:t>
+              <a:t>Dibujo de una lista enlazada</a:t>
+            </a:r>
+          </a:p>
+          <a:p>
+            <a:r>
+              <a:rPr lang="es-ES" dirty="0"/>
+              <a:t>Dibujo simplificado de un hash</a:t>
             </a:r>
           </a:p>
         </p:txBody>
@@ -4194,7 +3795,7 @@
     </p:spTree>
     <p:extLst>
       <p:ext uri="{BB962C8B-B14F-4D97-AF65-F5344CB8AC3E}">
-        <p14:creationId xmlns:p14="http://schemas.microsoft.com/office/powerpoint/2010/main" val="3900068602"/>
+        <p14:creationId xmlns:p14="http://schemas.microsoft.com/office/powerpoint/2010/main" val="3976417454"/>
       </p:ext>
     </p:extLst>
   </p:cSld>
@@ -4315,6 +3916,1010 @@
 </file>
 
 <file path=ppt/slides/slide13.xml><?xml version="1.0" encoding="utf-8"?>
+<p:sld xmlns:a="http://schemas.openxmlformats.org/drawingml/2006/main" xmlns:r="http://schemas.openxmlformats.org/officeDocument/2006/relationships" xmlns:p="http://schemas.openxmlformats.org/presentationml/2006/main">
+  <p:cSld>
+    <p:spTree>
+      <p:nvGrpSpPr>
+        <p:cNvPr id="1" name=""/>
+        <p:cNvGrpSpPr/>
+        <p:nvPr/>
+      </p:nvGrpSpPr>
+      <p:grpSpPr>
+        <a:xfrm>
+          <a:off x="0" y="0"/>
+          <a:ext cx="0" cy="0"/>
+          <a:chOff x="0" y="0"/>
+          <a:chExt cx="0" cy="0"/>
+        </a:xfrm>
+      </p:grpSpPr>
+      <p:sp>
+        <p:nvSpPr>
+          <p:cNvPr id="2" name="Título 1">
+            <a:extLst>
+              <a:ext uri="{FF2B5EF4-FFF2-40B4-BE49-F238E27FC236}">
+                <a16:creationId xmlns:a16="http://schemas.microsoft.com/office/drawing/2014/main" id="{6B58F75F-A058-496D-E003-F6B080AC5D69}"/>
+              </a:ext>
+            </a:extLst>
+          </p:cNvPr>
+          <p:cNvSpPr>
+            <a:spLocks noGrp="1"/>
+          </p:cNvSpPr>
+          <p:nvPr>
+            <p:ph type="title"/>
+          </p:nvPr>
+        </p:nvSpPr>
+        <p:spPr/>
+        <p:txBody>
+          <a:bodyPr/>
+          <a:lstStyle/>
+          <a:p>
+            <a:r>
+              <a:rPr lang="es-ES" b="1" dirty="0">
+                <a:gradFill>
+                  <a:gsLst>
+                    <a:gs pos="0">
+                      <a:srgbClr val="141E30"/>
+                    </a:gs>
+                    <a:gs pos="100000">
+                      <a:srgbClr val="243B55"/>
+                    </a:gs>
+                  </a:gsLst>
+                  <a:lin ang="0" scaled="0"/>
+                </a:gradFill>
+                <a:latin typeface="Montserrat" panose="00000500000000000000" pitchFamily="50" charset="0"/>
+              </a:rPr>
+              <a:t>entornos</a:t>
+            </a:r>
+          </a:p>
+        </p:txBody>
+      </p:sp>
+      <p:sp>
+        <p:nvSpPr>
+          <p:cNvPr id="3" name="Marcador de contenido 2">
+            <a:extLst>
+              <a:ext uri="{FF2B5EF4-FFF2-40B4-BE49-F238E27FC236}">
+                <a16:creationId xmlns:a16="http://schemas.microsoft.com/office/drawing/2014/main" id="{AFB3488F-BCA5-A6AD-2BED-530D241DB6EE}"/>
+              </a:ext>
+            </a:extLst>
+          </p:cNvPr>
+          <p:cNvSpPr>
+            <a:spLocks noGrp="1"/>
+          </p:cNvSpPr>
+          <p:nvPr>
+            <p:ph idx="1"/>
+          </p:nvPr>
+        </p:nvSpPr>
+        <p:spPr/>
+        <p:txBody>
+          <a:bodyPr>
+            <a:normAutofit fontScale="92500" lnSpcReduction="20000"/>
+          </a:bodyPr>
+          <a:lstStyle/>
+          <a:p>
+            <a:r>
+              <a:rPr lang="es-ES" b="1" dirty="0" err="1">
+                <a:gradFill>
+                  <a:gsLst>
+                    <a:gs pos="0">
+                      <a:srgbClr val="FFE259"/>
+                    </a:gs>
+                    <a:gs pos="100000">
+                      <a:srgbClr val="FFA751"/>
+                    </a:gs>
+                  </a:gsLst>
+                  <a:lin ang="0" scaled="0"/>
+                </a:gradFill>
+              </a:rPr>
+              <a:t>untracked</a:t>
+            </a:r>
+            <a:endParaRPr lang="es-ES" b="1" dirty="0">
+              <a:gradFill>
+                <a:gsLst>
+                  <a:gs pos="0">
+                    <a:srgbClr val="FFE259"/>
+                  </a:gs>
+                  <a:gs pos="100000">
+                    <a:srgbClr val="FFA751"/>
+                  </a:gs>
+                </a:gsLst>
+                <a:lin ang="0" scaled="0"/>
+              </a:gradFill>
+            </a:endParaRPr>
+          </a:p>
+          <a:p>
+            <a:pPr lvl="1"/>
+            <a:r>
+              <a:rPr lang="es-ES" dirty="0" err="1"/>
+              <a:t>git</a:t>
+            </a:r>
+            <a:r>
+              <a:rPr lang="es-ES" dirty="0"/>
+              <a:t> no tiene constancia de la existencia de este archivo, es decir, se acaba de “crear”, al menos para </a:t>
+            </a:r>
+            <a:r>
+              <a:rPr lang="es-ES" dirty="0" err="1"/>
+              <a:t>git</a:t>
+            </a:r>
+            <a:endParaRPr lang="es-ES" dirty="0"/>
+          </a:p>
+          <a:p>
+            <a:r>
+              <a:rPr lang="es-ES" b="1" dirty="0" err="1">
+                <a:gradFill>
+                  <a:gsLst>
+                    <a:gs pos="100000">
+                      <a:srgbClr val="EEA849"/>
+                    </a:gs>
+                    <a:gs pos="0">
+                      <a:srgbClr val="F46B45"/>
+                    </a:gs>
+                  </a:gsLst>
+                  <a:lin ang="0" scaled="0"/>
+                </a:gradFill>
+              </a:rPr>
+              <a:t>unstaged</a:t>
+            </a:r>
+            <a:endParaRPr lang="es-ES" b="1" dirty="0">
+              <a:gradFill>
+                <a:gsLst>
+                  <a:gs pos="100000">
+                    <a:srgbClr val="EEA849"/>
+                  </a:gs>
+                  <a:gs pos="0">
+                    <a:srgbClr val="F46B45"/>
+                  </a:gs>
+                </a:gsLst>
+                <a:lin ang="0" scaled="0"/>
+              </a:gradFill>
+            </a:endParaRPr>
+          </a:p>
+          <a:p>
+            <a:pPr lvl="1"/>
+            <a:r>
+              <a:rPr lang="es-ES" dirty="0"/>
+              <a:t>se ha modificado (su contenido ha cambiado, o se ha eliminado), pero no está en </a:t>
+            </a:r>
+            <a:r>
+              <a:rPr lang="es-ES" b="1" dirty="0" err="1">
+                <a:gradFill>
+                  <a:gsLst>
+                    <a:gs pos="0">
+                      <a:srgbClr val="E53935"/>
+                    </a:gs>
+                    <a:gs pos="100000">
+                      <a:srgbClr val="E35D5B"/>
+                    </a:gs>
+                  </a:gsLst>
+                  <a:lin ang="0" scaled="0"/>
+                </a:gradFill>
+              </a:rPr>
+              <a:t>staging</a:t>
+            </a:r>
+            <a:endParaRPr lang="es-ES" dirty="0"/>
+          </a:p>
+          <a:p>
+            <a:r>
+              <a:rPr lang="es-ES" b="1" dirty="0" err="1">
+                <a:gradFill>
+                  <a:gsLst>
+                    <a:gs pos="0">
+                      <a:srgbClr val="E53935"/>
+                    </a:gs>
+                    <a:gs pos="100000">
+                      <a:srgbClr val="E35D5B"/>
+                    </a:gs>
+                  </a:gsLst>
+                  <a:lin ang="0" scaled="0"/>
+                </a:gradFill>
+              </a:rPr>
+              <a:t>staging</a:t>
+            </a:r>
+            <a:endParaRPr lang="es-ES" b="1" dirty="0">
+              <a:gradFill>
+                <a:gsLst>
+                  <a:gs pos="0">
+                    <a:srgbClr val="E53935"/>
+                  </a:gs>
+                  <a:gs pos="100000">
+                    <a:srgbClr val="E35D5B"/>
+                  </a:gs>
+                </a:gsLst>
+                <a:lin ang="0" scaled="0"/>
+              </a:gradFill>
+            </a:endParaRPr>
+          </a:p>
+          <a:p>
+            <a:pPr lvl="1"/>
+            <a:r>
+              <a:rPr lang="es-ES" dirty="0"/>
+              <a:t>hemos registrado cambios, y los subimos al área antes de un </a:t>
+            </a:r>
+            <a:r>
+              <a:rPr lang="es-ES" b="1" dirty="0" err="1">
+                <a:gradFill>
+                  <a:gsLst>
+                    <a:gs pos="0">
+                      <a:srgbClr val="11998E"/>
+                    </a:gs>
+                    <a:gs pos="100000">
+                      <a:srgbClr val="38EF7D"/>
+                    </a:gs>
+                  </a:gsLst>
+                  <a:lin ang="0" scaled="0"/>
+                </a:gradFill>
+              </a:rPr>
+              <a:t>commit</a:t>
+            </a:r>
+            <a:endParaRPr lang="es-ES" dirty="0"/>
+          </a:p>
+          <a:p>
+            <a:r>
+              <a:rPr lang="es-ES" b="1" dirty="0" err="1">
+                <a:gradFill>
+                  <a:gsLst>
+                    <a:gs pos="0">
+                      <a:srgbClr val="11998E"/>
+                    </a:gs>
+                    <a:gs pos="100000">
+                      <a:srgbClr val="38EF7D"/>
+                    </a:gs>
+                  </a:gsLst>
+                  <a:lin ang="0" scaled="0"/>
+                </a:gradFill>
+              </a:rPr>
+              <a:t>committed</a:t>
+            </a:r>
+            <a:endParaRPr lang="es-ES" b="1" dirty="0">
+              <a:gradFill>
+                <a:gsLst>
+                  <a:gs pos="0">
+                    <a:srgbClr val="11998E"/>
+                  </a:gs>
+                  <a:gs pos="100000">
+                    <a:srgbClr val="38EF7D"/>
+                  </a:gs>
+                </a:gsLst>
+                <a:lin ang="0" scaled="0"/>
+              </a:gradFill>
+            </a:endParaRPr>
+          </a:p>
+          <a:p>
+            <a:pPr lvl="1"/>
+            <a:r>
+              <a:rPr lang="es-ES" dirty="0"/>
+              <a:t>un conjunto de cambios en </a:t>
+            </a:r>
+            <a:r>
+              <a:rPr lang="es-ES" b="1" dirty="0" err="1">
+                <a:gradFill>
+                  <a:gsLst>
+                    <a:gs pos="0">
+                      <a:srgbClr val="E53935"/>
+                    </a:gs>
+                    <a:gs pos="100000">
+                      <a:srgbClr val="E35D5B"/>
+                    </a:gs>
+                  </a:gsLst>
+                  <a:lin ang="0" scaled="0"/>
+                </a:gradFill>
+              </a:rPr>
+              <a:t>staging</a:t>
+            </a:r>
+            <a:r>
+              <a:rPr lang="es-ES" dirty="0"/>
+              <a:t> a los que se les otorga un </a:t>
+            </a:r>
+            <a:r>
+              <a:rPr lang="es-ES" b="1" dirty="0" err="1">
+                <a:gradFill>
+                  <a:gsLst>
+                    <a:gs pos="0">
+                      <a:srgbClr val="11998E"/>
+                    </a:gs>
+                    <a:gs pos="100000">
+                      <a:srgbClr val="38EF7D"/>
+                    </a:gs>
+                  </a:gsLst>
+                  <a:lin ang="0" scaled="0"/>
+                </a:gradFill>
+              </a:rPr>
+              <a:t>commit</a:t>
+            </a:r>
+            <a:r>
+              <a:rPr lang="es-ES" dirty="0"/>
+              <a:t> al que pertenecer</a:t>
+            </a:r>
+          </a:p>
+          <a:p>
+            <a:r>
+              <a:rPr lang="es-ES" b="1" dirty="0">
+                <a:gradFill>
+                  <a:gsLst>
+                    <a:gs pos="0">
+                      <a:srgbClr val="00C9FF"/>
+                    </a:gs>
+                    <a:gs pos="100000">
+                      <a:srgbClr val="59FD69"/>
+                    </a:gs>
+                  </a:gsLst>
+                  <a:lin ang="0" scaled="0"/>
+                </a:gradFill>
+              </a:rPr>
+              <a:t>remote</a:t>
+            </a:r>
+          </a:p>
+          <a:p>
+            <a:pPr lvl="1"/>
+            <a:r>
+              <a:rPr lang="es-ES" dirty="0"/>
+              <a:t>un </a:t>
+            </a:r>
+            <a:r>
+              <a:rPr lang="es-ES" b="1" dirty="0" err="1">
+                <a:gradFill>
+                  <a:gsLst>
+                    <a:gs pos="0">
+                      <a:srgbClr val="11998E"/>
+                    </a:gs>
+                    <a:gs pos="100000">
+                      <a:srgbClr val="38EF7D"/>
+                    </a:gs>
+                  </a:gsLst>
+                  <a:lin ang="0" scaled="0"/>
+                </a:gradFill>
+              </a:rPr>
+              <a:t>commit</a:t>
+            </a:r>
+            <a:r>
+              <a:rPr lang="es-ES" dirty="0"/>
+              <a:t> que se encuentra en la fuente de verdad (</a:t>
+            </a:r>
+            <a:r>
+              <a:rPr lang="es-ES" b="1" dirty="0">
+                <a:gradFill>
+                  <a:gsLst>
+                    <a:gs pos="0">
+                      <a:srgbClr val="00C9FF"/>
+                    </a:gs>
+                    <a:gs pos="100000">
+                      <a:srgbClr val="59FD69"/>
+                    </a:gs>
+                  </a:gsLst>
+                  <a:lin ang="0" scaled="0"/>
+                </a:gradFill>
+              </a:rPr>
+              <a:t>remote</a:t>
+            </a:r>
+            <a:r>
+              <a:rPr lang="es-ES" dirty="0"/>
+              <a:t>) de la rama</a:t>
+            </a:r>
+          </a:p>
+        </p:txBody>
+      </p:sp>
+    </p:spTree>
+    <p:extLst>
+      <p:ext uri="{BB962C8B-B14F-4D97-AF65-F5344CB8AC3E}">
+        <p14:creationId xmlns:p14="http://schemas.microsoft.com/office/powerpoint/2010/main" val="3658062777"/>
+      </p:ext>
+    </p:extLst>
+  </p:cSld>
+  <p:clrMapOvr>
+    <a:masterClrMapping/>
+  </p:clrMapOvr>
+</p:sld>
+</file>
+
+<file path=ppt/slides/slide14.xml><?xml version="1.0" encoding="utf-8"?>
+<p:sld xmlns:a="http://schemas.openxmlformats.org/drawingml/2006/main" xmlns:r="http://schemas.openxmlformats.org/officeDocument/2006/relationships" xmlns:p="http://schemas.openxmlformats.org/presentationml/2006/main">
+  <p:cSld>
+    <p:spTree>
+      <p:nvGrpSpPr>
+        <p:cNvPr id="1" name=""/>
+        <p:cNvGrpSpPr/>
+        <p:nvPr/>
+      </p:nvGrpSpPr>
+      <p:grpSpPr>
+        <a:xfrm>
+          <a:off x="0" y="0"/>
+          <a:ext cx="0" cy="0"/>
+          <a:chOff x="0" y="0"/>
+          <a:chExt cx="0" cy="0"/>
+        </a:xfrm>
+      </p:grpSpPr>
+      <p:sp>
+        <p:nvSpPr>
+          <p:cNvPr id="2" name="Título 1">
+            <a:extLst>
+              <a:ext uri="{FF2B5EF4-FFF2-40B4-BE49-F238E27FC236}">
+                <a16:creationId xmlns:a16="http://schemas.microsoft.com/office/drawing/2014/main" id="{85A5CEBD-2E3F-2AB3-6338-410BFC845CAB}"/>
+              </a:ext>
+            </a:extLst>
+          </p:cNvPr>
+          <p:cNvSpPr>
+            <a:spLocks noGrp="1"/>
+          </p:cNvSpPr>
+          <p:nvPr>
+            <p:ph type="title"/>
+          </p:nvPr>
+        </p:nvSpPr>
+        <p:spPr/>
+        <p:txBody>
+          <a:bodyPr/>
+          <a:lstStyle/>
+          <a:p>
+            <a:r>
+              <a:rPr lang="es-ES" b="1" dirty="0" err="1">
+                <a:latin typeface="Montserrat" panose="00000500000000000000" pitchFamily="50" charset="0"/>
+              </a:rPr>
+              <a:t>add</a:t>
+            </a:r>
+            <a:r>
+              <a:rPr lang="es-ES" dirty="0"/>
+              <a:t>	</a:t>
+            </a:r>
+          </a:p>
+        </p:txBody>
+      </p:sp>
+      <p:sp>
+        <p:nvSpPr>
+          <p:cNvPr id="3" name="Marcador de contenido 2">
+            <a:extLst>
+              <a:ext uri="{FF2B5EF4-FFF2-40B4-BE49-F238E27FC236}">
+                <a16:creationId xmlns:a16="http://schemas.microsoft.com/office/drawing/2014/main" id="{C2D815C4-73B2-E407-B514-30C1E88F409C}"/>
+              </a:ext>
+            </a:extLst>
+          </p:cNvPr>
+          <p:cNvSpPr>
+            <a:spLocks noGrp="1"/>
+          </p:cNvSpPr>
+          <p:nvPr>
+            <p:ph idx="1"/>
+          </p:nvPr>
+        </p:nvSpPr>
+        <p:spPr/>
+        <p:txBody>
+          <a:bodyPr/>
+          <a:lstStyle/>
+          <a:p>
+            <a:pPr marL="0" indent="0">
+              <a:buNone/>
+            </a:pPr>
+            <a:r>
+              <a:rPr lang="es-ES" dirty="0"/>
+              <a:t>Nos permite habilitar el seguimiento y pasar a </a:t>
+            </a:r>
+            <a:r>
+              <a:rPr lang="es-ES" b="1" dirty="0" err="1">
+                <a:gradFill>
+                  <a:gsLst>
+                    <a:gs pos="0">
+                      <a:srgbClr val="E53935"/>
+                    </a:gs>
+                    <a:gs pos="100000">
+                      <a:srgbClr val="E35D5B"/>
+                    </a:gs>
+                  </a:gsLst>
+                  <a:lin ang="0" scaled="0"/>
+                </a:gradFill>
+              </a:rPr>
+              <a:t>staging</a:t>
+            </a:r>
+            <a:r>
+              <a:rPr lang="es-ES" dirty="0"/>
+              <a:t> los archivos o carpetas que queramos.</a:t>
+            </a:r>
+          </a:p>
+          <a:p>
+            <a:pPr marL="0" indent="0">
+              <a:buNone/>
+            </a:pPr>
+            <a:endParaRPr lang="es-ES" dirty="0"/>
+          </a:p>
+          <a:p>
+            <a:pPr marL="0" indent="0">
+              <a:buNone/>
+            </a:pPr>
+            <a:r>
+              <a:rPr lang="es-ES" dirty="0"/>
+              <a:t>Archivos o carpetas, porque podemos añadir elementos y subelementos de una.</a:t>
+            </a:r>
+          </a:p>
+          <a:p>
+            <a:pPr marL="0" indent="0">
+              <a:buNone/>
+            </a:pPr>
+            <a:r>
+              <a:rPr lang="es-ES" dirty="0"/>
+              <a:t>Git </a:t>
+            </a:r>
+            <a:r>
+              <a:rPr lang="es-ES" dirty="0" err="1"/>
+              <a:t>add</a:t>
+            </a:r>
+            <a:r>
+              <a:rPr lang="es-ES" dirty="0"/>
+              <a:t> . Añade todo el contenido </a:t>
+            </a:r>
+            <a:r>
+              <a:rPr lang="es-ES" dirty="0" err="1"/>
+              <a:t>apartir</a:t>
+            </a:r>
+            <a:r>
+              <a:rPr lang="es-ES" dirty="0"/>
+              <a:t> del punto de llamada.</a:t>
+            </a:r>
+          </a:p>
+          <a:p>
+            <a:pPr marL="0" indent="0">
+              <a:buNone/>
+            </a:pPr>
+            <a:endParaRPr lang="es-ES" dirty="0"/>
+          </a:p>
+          <a:p>
+            <a:pPr marL="0" indent="0">
+              <a:buNone/>
+            </a:pPr>
+            <a:r>
+              <a:rPr lang="es-ES" dirty="0"/>
+              <a:t>Git </a:t>
+            </a:r>
+            <a:r>
+              <a:rPr lang="es-ES" dirty="0" err="1"/>
+              <a:t>add</a:t>
+            </a:r>
+            <a:r>
+              <a:rPr lang="es-ES" dirty="0"/>
+              <a:t> se ve sujeto al </a:t>
+            </a:r>
+            <a:r>
+              <a:rPr lang="es-ES" b="1" dirty="0">
+                <a:gradFill>
+                  <a:gsLst>
+                    <a:gs pos="0">
+                      <a:srgbClr val="FDC830"/>
+                    </a:gs>
+                    <a:gs pos="100000">
+                      <a:srgbClr val="F37335"/>
+                    </a:gs>
+                  </a:gsLst>
+                  <a:lin ang="0" scaled="0"/>
+                </a:gradFill>
+              </a:rPr>
+              <a:t>.</a:t>
+            </a:r>
+            <a:r>
+              <a:rPr lang="es-ES" b="1" dirty="0" err="1">
+                <a:gradFill>
+                  <a:gsLst>
+                    <a:gs pos="0">
+                      <a:srgbClr val="FDC830"/>
+                    </a:gs>
+                    <a:gs pos="100000">
+                      <a:srgbClr val="F37335"/>
+                    </a:gs>
+                  </a:gsLst>
+                  <a:lin ang="0" scaled="0"/>
+                </a:gradFill>
+              </a:rPr>
+              <a:t>gitignore</a:t>
+            </a:r>
+            <a:r>
+              <a:rPr lang="es-ES" dirty="0"/>
+              <a:t>, solamente aquellos archivos que NO se encuentren excluidos por el </a:t>
+            </a:r>
+            <a:r>
+              <a:rPr lang="es-ES" b="1" dirty="0">
+                <a:gradFill>
+                  <a:gsLst>
+                    <a:gs pos="0">
+                      <a:srgbClr val="FDC830"/>
+                    </a:gs>
+                    <a:gs pos="100000">
+                      <a:srgbClr val="F37335"/>
+                    </a:gs>
+                  </a:gsLst>
+                  <a:lin ang="0" scaled="0"/>
+                </a:gradFill>
+              </a:rPr>
+              <a:t>.</a:t>
+            </a:r>
+            <a:r>
+              <a:rPr lang="es-ES" b="1" dirty="0" err="1">
+                <a:gradFill>
+                  <a:gsLst>
+                    <a:gs pos="0">
+                      <a:srgbClr val="FDC830"/>
+                    </a:gs>
+                    <a:gs pos="100000">
+                      <a:srgbClr val="F37335"/>
+                    </a:gs>
+                  </a:gsLst>
+                  <a:lin ang="0" scaled="0"/>
+                </a:gradFill>
+              </a:rPr>
+              <a:t>gitignore</a:t>
+            </a:r>
+            <a:r>
+              <a:rPr lang="es-ES" dirty="0"/>
+              <a:t> se subirán</a:t>
+            </a:r>
+          </a:p>
+        </p:txBody>
+      </p:sp>
+    </p:spTree>
+    <p:extLst>
+      <p:ext uri="{BB962C8B-B14F-4D97-AF65-F5344CB8AC3E}">
+        <p14:creationId xmlns:p14="http://schemas.microsoft.com/office/powerpoint/2010/main" val="17688819"/>
+      </p:ext>
+    </p:extLst>
+  </p:cSld>
+  <p:clrMapOvr>
+    <a:masterClrMapping/>
+  </p:clrMapOvr>
+</p:sld>
+</file>
+
+<file path=ppt/slides/slide15.xml><?xml version="1.0" encoding="utf-8"?>
+<p:sld xmlns:a="http://schemas.openxmlformats.org/drawingml/2006/main" xmlns:r="http://schemas.openxmlformats.org/officeDocument/2006/relationships" xmlns:p="http://schemas.openxmlformats.org/presentationml/2006/main">
+  <p:cSld>
+    <p:spTree>
+      <p:nvGrpSpPr>
+        <p:cNvPr id="1" name=""/>
+        <p:cNvGrpSpPr/>
+        <p:nvPr/>
+      </p:nvGrpSpPr>
+      <p:grpSpPr>
+        <a:xfrm>
+          <a:off x="0" y="0"/>
+          <a:ext cx="0" cy="0"/>
+          <a:chOff x="0" y="0"/>
+          <a:chExt cx="0" cy="0"/>
+        </a:xfrm>
+      </p:grpSpPr>
+      <p:sp>
+        <p:nvSpPr>
+          <p:cNvPr id="2" name="Título 1">
+            <a:extLst>
+              <a:ext uri="{FF2B5EF4-FFF2-40B4-BE49-F238E27FC236}">
+                <a16:creationId xmlns:a16="http://schemas.microsoft.com/office/drawing/2014/main" id="{C1A1E4CB-E34F-6B26-CCFD-88DE33D4B1C1}"/>
+              </a:ext>
+            </a:extLst>
+          </p:cNvPr>
+          <p:cNvSpPr>
+            <a:spLocks noGrp="1"/>
+          </p:cNvSpPr>
+          <p:nvPr>
+            <p:ph type="title"/>
+          </p:nvPr>
+        </p:nvSpPr>
+        <p:spPr/>
+        <p:txBody>
+          <a:bodyPr/>
+          <a:lstStyle/>
+          <a:p>
+            <a:r>
+              <a:rPr lang="es-ES" b="1" dirty="0" err="1">
+                <a:gradFill>
+                  <a:gsLst>
+                    <a:gs pos="0">
+                      <a:srgbClr val="FDC830"/>
+                    </a:gs>
+                    <a:gs pos="100000">
+                      <a:srgbClr val="F37335"/>
+                    </a:gs>
+                  </a:gsLst>
+                  <a:lin ang="0" scaled="0"/>
+                </a:gradFill>
+                <a:latin typeface="Montserrat" panose="00000500000000000000" pitchFamily="50" charset="0"/>
+              </a:rPr>
+              <a:t>gitignore</a:t>
+            </a:r>
+            <a:endParaRPr lang="es-ES" b="1" dirty="0">
+              <a:gradFill>
+                <a:gsLst>
+                  <a:gs pos="0">
+                    <a:srgbClr val="FDC830"/>
+                  </a:gs>
+                  <a:gs pos="100000">
+                    <a:srgbClr val="F37335"/>
+                  </a:gs>
+                </a:gsLst>
+                <a:lin ang="0" scaled="0"/>
+              </a:gradFill>
+              <a:latin typeface="Montserrat" panose="00000500000000000000" pitchFamily="50" charset="0"/>
+            </a:endParaRPr>
+          </a:p>
+        </p:txBody>
+      </p:sp>
+      <p:sp>
+        <p:nvSpPr>
+          <p:cNvPr id="3" name="Marcador de contenido 2">
+            <a:extLst>
+              <a:ext uri="{FF2B5EF4-FFF2-40B4-BE49-F238E27FC236}">
+                <a16:creationId xmlns:a16="http://schemas.microsoft.com/office/drawing/2014/main" id="{83139AFF-1E34-1238-EA57-C9EFF35A1DFA}"/>
+              </a:ext>
+            </a:extLst>
+          </p:cNvPr>
+          <p:cNvSpPr>
+            <a:spLocks noGrp="1"/>
+          </p:cNvSpPr>
+          <p:nvPr>
+            <p:ph idx="1"/>
+          </p:nvPr>
+        </p:nvSpPr>
+        <p:spPr/>
+        <p:txBody>
+          <a:bodyPr>
+            <a:normAutofit/>
+          </a:bodyPr>
+          <a:lstStyle/>
+          <a:p>
+            <a:pPr marL="0" indent="0">
+              <a:buNone/>
+            </a:pPr>
+            <a:r>
+              <a:rPr lang="es-ES" dirty="0"/>
+              <a:t>Permite ignorar archivos, o crear reglas para </a:t>
+            </a:r>
+            <a:r>
+              <a:rPr lang="es-ES" b="1" dirty="0">
+                <a:gradFill>
+                  <a:gsLst>
+                    <a:gs pos="0">
+                      <a:srgbClr val="FDC830"/>
+                    </a:gs>
+                    <a:gs pos="100000">
+                      <a:srgbClr val="F37335"/>
+                    </a:gs>
+                  </a:gsLst>
+                  <a:lin ang="0" scaled="0"/>
+                </a:gradFill>
+              </a:rPr>
+              <a:t>ignorar</a:t>
+            </a:r>
+            <a:r>
+              <a:rPr lang="es-ES" dirty="0"/>
+              <a:t>, estas reglas pueden ser </a:t>
+            </a:r>
+            <a:r>
+              <a:rPr lang="es-ES" b="1" dirty="0">
+                <a:gradFill>
+                  <a:gsLst>
+                    <a:gs pos="0">
+                      <a:srgbClr val="FDC830"/>
+                    </a:gs>
+                    <a:gs pos="100000">
+                      <a:srgbClr val="F37335"/>
+                    </a:gs>
+                  </a:gsLst>
+                  <a:lin ang="0" scaled="0"/>
+                </a:gradFill>
+              </a:rPr>
+              <a:t>exclusivas</a:t>
+            </a:r>
+            <a:r>
+              <a:rPr lang="es-ES" dirty="0"/>
+              <a:t> o </a:t>
+            </a:r>
+            <a:r>
+              <a:rPr lang="es-ES" b="1" dirty="0">
+                <a:gradFill>
+                  <a:gsLst>
+                    <a:gs pos="0">
+                      <a:srgbClr val="FDC830"/>
+                    </a:gs>
+                    <a:gs pos="100000">
+                      <a:srgbClr val="F37335"/>
+                    </a:gs>
+                  </a:gsLst>
+                  <a:lin ang="0" scaled="0"/>
+                </a:gradFill>
+              </a:rPr>
+              <a:t>inclusivas</a:t>
+            </a:r>
+            <a:r>
+              <a:rPr lang="es-ES" dirty="0"/>
+              <a:t>, ignora todo esto, no ignores nada salvo que tenga esto.</a:t>
+            </a:r>
+          </a:p>
+          <a:p>
+            <a:pPr marL="0" indent="0">
+              <a:buNone/>
+            </a:pPr>
+            <a:endParaRPr lang="es-ES" dirty="0"/>
+          </a:p>
+          <a:p>
+            <a:pPr marL="0" indent="0">
+              <a:buNone/>
+            </a:pPr>
+            <a:r>
+              <a:rPr lang="es-ES" dirty="0"/>
+              <a:t>Añadir ejemplos de exclusivo e inclusivo, y  de ficheros normales</a:t>
+            </a:r>
+          </a:p>
+          <a:p>
+            <a:pPr marL="0" indent="0">
+              <a:buNone/>
+            </a:pPr>
+            <a:endParaRPr lang="es-ES" dirty="0"/>
+          </a:p>
+          <a:p>
+            <a:pPr marL="0" indent="0">
+              <a:buNone/>
+            </a:pPr>
+            <a:r>
+              <a:rPr lang="es-ES" dirty="0"/>
+              <a:t>Es importante destacar que si </a:t>
+            </a:r>
+            <a:r>
+              <a:rPr lang="es-ES" dirty="0" err="1"/>
+              <a:t>git</a:t>
+            </a:r>
+            <a:r>
+              <a:rPr lang="es-ES" dirty="0"/>
+              <a:t> ya tiene constancia de un archivo, añadirlo a un </a:t>
+            </a:r>
+            <a:r>
+              <a:rPr lang="es-ES" b="1" dirty="0">
+                <a:gradFill>
+                  <a:gsLst>
+                    <a:gs pos="0">
+                      <a:srgbClr val="FDC830"/>
+                    </a:gs>
+                    <a:gs pos="100000">
+                      <a:srgbClr val="F37335"/>
+                    </a:gs>
+                  </a:gsLst>
+                  <a:lin ang="0" scaled="0"/>
+                </a:gradFill>
+              </a:rPr>
+              <a:t>.</a:t>
+            </a:r>
+            <a:r>
+              <a:rPr lang="es-ES" b="1" dirty="0" err="1">
+                <a:gradFill>
+                  <a:gsLst>
+                    <a:gs pos="0">
+                      <a:srgbClr val="FDC830"/>
+                    </a:gs>
+                    <a:gs pos="100000">
+                      <a:srgbClr val="F37335"/>
+                    </a:gs>
+                  </a:gsLst>
+                  <a:lin ang="0" scaled="0"/>
+                </a:gradFill>
+              </a:rPr>
+              <a:t>gitignore</a:t>
+            </a:r>
+            <a:r>
+              <a:rPr lang="es-ES" dirty="0"/>
+              <a:t> podrá no tener el funcionamiento que deseas.</a:t>
+            </a:r>
+          </a:p>
+          <a:p>
+            <a:r>
+              <a:rPr lang="es-ES" dirty="0"/>
+              <a:t>Para arreglarlo podemos usar </a:t>
+            </a:r>
+            <a:r>
+              <a:rPr lang="es-ES" b="1" dirty="0" err="1">
+                <a:gradFill>
+                  <a:gsLst>
+                    <a:gs pos="0">
+                      <a:srgbClr val="FDC830"/>
+                    </a:gs>
+                    <a:gs pos="100000">
+                      <a:srgbClr val="F37335"/>
+                    </a:gs>
+                  </a:gsLst>
+                  <a:lin ang="0" scaled="0"/>
+                </a:gradFill>
+              </a:rPr>
+              <a:t>git</a:t>
+            </a:r>
+            <a:r>
+              <a:rPr lang="es-ES" b="1" dirty="0">
+                <a:gradFill>
+                  <a:gsLst>
+                    <a:gs pos="0">
+                      <a:srgbClr val="FDC830"/>
+                    </a:gs>
+                    <a:gs pos="100000">
+                      <a:srgbClr val="F37335"/>
+                    </a:gs>
+                  </a:gsLst>
+                  <a:lin ang="0" scaled="0"/>
+                </a:gradFill>
+              </a:rPr>
+              <a:t> </a:t>
+            </a:r>
+            <a:r>
+              <a:rPr lang="es-ES" b="1" dirty="0" err="1">
+                <a:gradFill>
+                  <a:gsLst>
+                    <a:gs pos="0">
+                      <a:srgbClr val="FDC830"/>
+                    </a:gs>
+                    <a:gs pos="100000">
+                      <a:srgbClr val="F37335"/>
+                    </a:gs>
+                  </a:gsLst>
+                  <a:lin ang="0" scaled="0"/>
+                </a:gradFill>
+              </a:rPr>
+              <a:t>rm</a:t>
+            </a:r>
+            <a:r>
+              <a:rPr lang="es-ES" b="1" dirty="0">
+                <a:gradFill>
+                  <a:gsLst>
+                    <a:gs pos="0">
+                      <a:srgbClr val="FDC830"/>
+                    </a:gs>
+                    <a:gs pos="100000">
+                      <a:srgbClr val="F37335"/>
+                    </a:gs>
+                  </a:gsLst>
+                  <a:lin ang="0" scaled="0"/>
+                </a:gradFill>
+              </a:rPr>
+              <a:t> –</a:t>
+            </a:r>
+            <a:r>
+              <a:rPr lang="es-ES" b="1" dirty="0" err="1">
+                <a:gradFill>
+                  <a:gsLst>
+                    <a:gs pos="0">
+                      <a:srgbClr val="FDC830"/>
+                    </a:gs>
+                    <a:gs pos="100000">
+                      <a:srgbClr val="F37335"/>
+                    </a:gs>
+                  </a:gsLst>
+                  <a:lin ang="0" scaled="0"/>
+                </a:gradFill>
+              </a:rPr>
+              <a:t>cached</a:t>
+            </a:r>
+            <a:r>
+              <a:rPr lang="es-ES" b="1" dirty="0">
+                <a:gradFill>
+                  <a:gsLst>
+                    <a:gs pos="0">
+                      <a:srgbClr val="FDC830"/>
+                    </a:gs>
+                    <a:gs pos="100000">
+                      <a:srgbClr val="F37335"/>
+                    </a:gs>
+                  </a:gsLst>
+                  <a:lin ang="0" scaled="0"/>
+                </a:gradFill>
+              </a:rPr>
+              <a:t> […fichero(s)]</a:t>
+            </a:r>
+          </a:p>
+        </p:txBody>
+      </p:sp>
+    </p:spTree>
+    <p:extLst>
+      <p:ext uri="{BB962C8B-B14F-4D97-AF65-F5344CB8AC3E}">
+        <p14:creationId xmlns:p14="http://schemas.microsoft.com/office/powerpoint/2010/main" val="3098130187"/>
+      </p:ext>
+    </p:extLst>
+  </p:cSld>
+  <p:clrMapOvr>
+    <a:masterClrMapping/>
+  </p:clrMapOvr>
+  <p:extLst>
+    <p:ext uri="{6950BFC3-D8DA-4A85-94F7-54DA5524770B}">
+      <p188:commentRel xmlns:p188="http://schemas.microsoft.com/office/powerpoint/2018/8/main" r:id="rId2"/>
+    </p:ext>
+  </p:extLst>
+</p:sld>
+</file>
+
+<file path=ppt/slides/slide16.xml><?xml version="1.0" encoding="utf-8"?>
 <p:sld xmlns:a="http://schemas.openxmlformats.org/drawingml/2006/main" xmlns:r="http://schemas.openxmlformats.org/officeDocument/2006/relationships" xmlns:p="http://schemas.openxmlformats.org/presentationml/2006/main">
   <p:cSld>
     <p:bg>
@@ -4428,15 +5033,22 @@
           <a:lstStyle/>
           <a:p>
             <a:r>
-              <a:rPr lang="en-US" sz="3000" kern="1200" dirty="0">
+              <a:rPr lang="en-US" sz="3000" b="1" kern="1200" dirty="0" err="1">
                 <a:solidFill>
                   <a:schemeClr val="tx1"/>
                 </a:solidFill>
-                <a:latin typeface="+mj-lt"/>
-                <a:ea typeface="+mj-ea"/>
-                <a:cs typeface="+mj-cs"/>
+                <a:latin typeface="Montserrat" panose="00000500000000000000" pitchFamily="50" charset="0"/>
               </a:rPr>
-              <a:t>RECAPITULANDO…</a:t>
+              <a:t>recapitulando</a:t>
+            </a:r>
+            <a:r>
+              <a:rPr lang="en-US" sz="3000" b="1" kern="1200" dirty="0">
+                <a:solidFill>
+                  <a:schemeClr val="tx1"/>
+                </a:solidFill>
+                <a:latin typeface="Montserrat" panose="00000500000000000000" pitchFamily="50" charset="0"/>
+              </a:rPr>
+              <a:t>…</a:t>
             </a:r>
           </a:p>
         </p:txBody>
@@ -4951,7 +5563,7 @@
 </p:sld>
 </file>
 
-<file path=ppt/slides/slide14.xml><?xml version="1.0" encoding="utf-8"?>
+<file path=ppt/slides/slide17.xml><?xml version="1.0" encoding="utf-8"?>
 <p:sld xmlns:a="http://schemas.openxmlformats.org/drawingml/2006/main" xmlns:r="http://schemas.openxmlformats.org/officeDocument/2006/relationships" xmlns:p="http://schemas.openxmlformats.org/presentationml/2006/main">
   <p:cSld>
     <p:spTree>
@@ -4986,12 +5598,27 @@
         </p:nvSpPr>
         <p:spPr/>
         <p:txBody>
-          <a:bodyPr/>
-          <a:lstStyle/>
-          <a:p>
-            <a:r>
-              <a:rPr lang="es-ES" dirty="0"/>
-              <a:t>Manejo de armas</a:t>
+          <a:bodyPr>
+            <a:normAutofit/>
+          </a:bodyPr>
+          <a:lstStyle/>
+          <a:p>
+            <a:r>
+              <a:rPr lang="es-ES" sz="4000" b="1" dirty="0">
+                <a:gradFill>
+                  <a:gsLst>
+                    <a:gs pos="0">
+                      <a:srgbClr val="3A7BD5"/>
+                    </a:gs>
+                    <a:gs pos="100000">
+                      <a:srgbClr val="3FFFC4"/>
+                    </a:gs>
+                  </a:gsLst>
+                  <a:lin ang="0" scaled="0"/>
+                </a:gradFill>
+                <a:latin typeface="Montserrat" panose="00000500000000000000" pitchFamily="50" charset="0"/>
+              </a:rPr>
+              <a:t>ganando confianza con los comandos</a:t>
             </a:r>
           </a:p>
         </p:txBody>
@@ -5070,7 +5697,7 @@
 </p:sld>
 </file>
 
-<file path=ppt/slides/slide15.xml><?xml version="1.0" encoding="utf-8"?>
+<file path=ppt/slides/slide18.xml><?xml version="1.0" encoding="utf-8"?>
 <p:sld xmlns:a="http://schemas.openxmlformats.org/drawingml/2006/main" xmlns:r="http://schemas.openxmlformats.org/officeDocument/2006/relationships" xmlns:p="http://schemas.openxmlformats.org/presentationml/2006/main">
   <p:cSld>
     <p:spTree>
@@ -5092,6 +5719,145 @@
           <p:cNvPr id="2" name="Título 1">
             <a:extLst>
               <a:ext uri="{FF2B5EF4-FFF2-40B4-BE49-F238E27FC236}">
+                <a16:creationId xmlns:a16="http://schemas.microsoft.com/office/drawing/2014/main" id="{9E8FD968-A290-CCF9-408F-510A9B785624}"/>
+              </a:ext>
+            </a:extLst>
+          </p:cNvPr>
+          <p:cNvSpPr>
+            <a:spLocks noGrp="1"/>
+          </p:cNvSpPr>
+          <p:nvPr>
+            <p:ph type="title"/>
+          </p:nvPr>
+        </p:nvSpPr>
+        <p:spPr/>
+        <p:txBody>
+          <a:bodyPr/>
+          <a:lstStyle/>
+          <a:p>
+            <a:endParaRPr lang="es-ES"/>
+          </a:p>
+        </p:txBody>
+      </p:sp>
+      <p:sp>
+        <p:nvSpPr>
+          <p:cNvPr id="3" name="Marcador de contenido 2">
+            <a:extLst>
+              <a:ext uri="{FF2B5EF4-FFF2-40B4-BE49-F238E27FC236}">
+                <a16:creationId xmlns:a16="http://schemas.microsoft.com/office/drawing/2014/main" id="{59E52C9B-1714-AA2F-8036-552C0A97AC4A}"/>
+              </a:ext>
+            </a:extLst>
+          </p:cNvPr>
+          <p:cNvSpPr>
+            <a:spLocks noGrp="1"/>
+          </p:cNvSpPr>
+          <p:nvPr>
+            <p:ph idx="1"/>
+          </p:nvPr>
+        </p:nvSpPr>
+        <p:spPr/>
+        <p:txBody>
+          <a:bodyPr/>
+          <a:lstStyle/>
+          <a:p>
+            <a:r>
+              <a:rPr lang="es-ES" dirty="0"/>
+              <a:t>Git rebase interactive</a:t>
+            </a:r>
+          </a:p>
+          <a:p>
+            <a:pPr lvl="1"/>
+            <a:r>
+              <a:rPr lang="es-ES" dirty="0"/>
+              <a:t>Squash</a:t>
+            </a:r>
+          </a:p>
+          <a:p>
+            <a:pPr lvl="1"/>
+            <a:r>
+              <a:rPr lang="es-ES" dirty="0" err="1"/>
+              <a:t>Edit</a:t>
+            </a:r>
+            <a:endParaRPr lang="es-ES" dirty="0"/>
+          </a:p>
+          <a:p>
+            <a:pPr lvl="1"/>
+            <a:r>
+              <a:rPr lang="es-ES" dirty="0" err="1"/>
+              <a:t>Rename</a:t>
+            </a:r>
+            <a:endParaRPr lang="es-ES" dirty="0"/>
+          </a:p>
+          <a:p>
+            <a:pPr lvl="1"/>
+            <a:r>
+              <a:rPr lang="es-ES" dirty="0" err="1"/>
+              <a:t>Remove</a:t>
+            </a:r>
+            <a:endParaRPr lang="es-ES" dirty="0"/>
+          </a:p>
+          <a:p>
+            <a:pPr lvl="1"/>
+            <a:r>
+              <a:rPr lang="es-ES" dirty="0" err="1"/>
+              <a:t>Add</a:t>
+            </a:r>
+            <a:endParaRPr lang="es-ES" dirty="0"/>
+          </a:p>
+          <a:p>
+            <a:r>
+              <a:rPr lang="es-ES" dirty="0"/>
+              <a:t>Git log</a:t>
+            </a:r>
+          </a:p>
+          <a:p>
+            <a:r>
+              <a:rPr lang="es-ES" dirty="0"/>
+              <a:t>Git </a:t>
+            </a:r>
+            <a:r>
+              <a:rPr lang="es-ES" dirty="0" err="1"/>
+              <a:t>config</a:t>
+            </a:r>
+            <a:endParaRPr lang="es-ES" dirty="0"/>
+          </a:p>
+        </p:txBody>
+      </p:sp>
+    </p:spTree>
+    <p:extLst>
+      <p:ext uri="{BB962C8B-B14F-4D97-AF65-F5344CB8AC3E}">
+        <p14:creationId xmlns:p14="http://schemas.microsoft.com/office/powerpoint/2010/main" val="2657682226"/>
+      </p:ext>
+    </p:extLst>
+  </p:cSld>
+  <p:clrMapOvr>
+    <a:masterClrMapping/>
+  </p:clrMapOvr>
+</p:sld>
+</file>
+
+<file path=ppt/slides/slide19.xml><?xml version="1.0" encoding="utf-8"?>
+<p:sld xmlns:a="http://schemas.openxmlformats.org/drawingml/2006/main" xmlns:r="http://schemas.openxmlformats.org/officeDocument/2006/relationships" xmlns:p="http://schemas.openxmlformats.org/presentationml/2006/main">
+  <p:cSld>
+    <p:spTree>
+      <p:nvGrpSpPr>
+        <p:cNvPr id="1" name=""/>
+        <p:cNvGrpSpPr/>
+        <p:nvPr/>
+      </p:nvGrpSpPr>
+      <p:grpSpPr>
+        <a:xfrm>
+          <a:off x="0" y="0"/>
+          <a:ext cx="0" cy="0"/>
+          <a:chOff x="0" y="0"/>
+          <a:chExt cx="0" cy="0"/>
+        </a:xfrm>
+      </p:grpSpPr>
+      <p:sp>
+        <p:nvSpPr>
+          <p:cNvPr id="2" name="Título 1">
+            <a:extLst>
+              <a:ext uri="{FF2B5EF4-FFF2-40B4-BE49-F238E27FC236}">
                 <a16:creationId xmlns:a16="http://schemas.microsoft.com/office/drawing/2014/main" id="{C79C412B-6C43-31D1-2A70-01F7FB254A70}"/>
               </a:ext>
             </a:extLst>
@@ -5110,7 +5876,7 @@
           <a:p>
             <a:r>
               <a:rPr lang="es-ES" dirty="0"/>
-              <a:t>Los salvavidas</a:t>
+              <a:t>los salvavidas</a:t>
             </a:r>
           </a:p>
         </p:txBody>
@@ -5217,7 +5983,7 @@
                 </a:gradFill>
                 <a:latin typeface="Montserrat" panose="00000500000000000000" pitchFamily="50" charset="0"/>
               </a:rPr>
-              <a:t>DE ANTEMANO</a:t>
+              <a:t>de antemano</a:t>
             </a:r>
           </a:p>
         </p:txBody>
@@ -5266,6 +6032,478 @@
     <p:extLst>
       <p:ext uri="{BB962C8B-B14F-4D97-AF65-F5344CB8AC3E}">
         <p14:creationId xmlns:p14="http://schemas.microsoft.com/office/powerpoint/2010/main" val="2755319805"/>
+      </p:ext>
+    </p:extLst>
+  </p:cSld>
+  <p:clrMapOvr>
+    <a:masterClrMapping/>
+  </p:clrMapOvr>
+</p:sld>
+</file>
+
+<file path=ppt/slides/slide20.xml><?xml version="1.0" encoding="utf-8"?>
+<p:sld xmlns:a="http://schemas.openxmlformats.org/drawingml/2006/main" xmlns:r="http://schemas.openxmlformats.org/officeDocument/2006/relationships" xmlns:p="http://schemas.openxmlformats.org/presentationml/2006/main">
+  <p:cSld>
+    <p:spTree>
+      <p:nvGrpSpPr>
+        <p:cNvPr id="1" name=""/>
+        <p:cNvGrpSpPr/>
+        <p:nvPr/>
+      </p:nvGrpSpPr>
+      <p:grpSpPr>
+        <a:xfrm>
+          <a:off x="0" y="0"/>
+          <a:ext cx="0" cy="0"/>
+          <a:chOff x="0" y="0"/>
+          <a:chExt cx="0" cy="0"/>
+        </a:xfrm>
+      </p:grpSpPr>
+      <p:sp>
+        <p:nvSpPr>
+          <p:cNvPr id="2" name="Título 1">
+            <a:extLst>
+              <a:ext uri="{FF2B5EF4-FFF2-40B4-BE49-F238E27FC236}">
+                <a16:creationId xmlns:a16="http://schemas.microsoft.com/office/drawing/2014/main" id="{7DF5EDCF-1659-170C-794D-931C99F9C186}"/>
+              </a:ext>
+            </a:extLst>
+          </p:cNvPr>
+          <p:cNvSpPr>
+            <a:spLocks noGrp="1"/>
+          </p:cNvSpPr>
+          <p:nvPr>
+            <p:ph type="title"/>
+          </p:nvPr>
+        </p:nvSpPr>
+        <p:spPr/>
+        <p:txBody>
+          <a:bodyPr/>
+          <a:lstStyle/>
+          <a:p>
+            <a:endParaRPr lang="es-ES"/>
+          </a:p>
+        </p:txBody>
+      </p:sp>
+      <p:sp>
+        <p:nvSpPr>
+          <p:cNvPr id="3" name="Marcador de contenido 2">
+            <a:extLst>
+              <a:ext uri="{FF2B5EF4-FFF2-40B4-BE49-F238E27FC236}">
+                <a16:creationId xmlns:a16="http://schemas.microsoft.com/office/drawing/2014/main" id="{50475E1B-AC11-26FC-6C07-98D4C3747019}"/>
+              </a:ext>
+            </a:extLst>
+          </p:cNvPr>
+          <p:cNvSpPr>
+            <a:spLocks noGrp="1"/>
+          </p:cNvSpPr>
+          <p:nvPr>
+            <p:ph idx="1"/>
+          </p:nvPr>
+        </p:nvSpPr>
+        <p:spPr/>
+        <p:txBody>
+          <a:bodyPr/>
+          <a:lstStyle/>
+          <a:p>
+            <a:r>
+              <a:rPr lang="es-ES" dirty="0"/>
+              <a:t>--no-</a:t>
+            </a:r>
+            <a:r>
+              <a:rPr lang="es-ES" dirty="0" err="1"/>
+              <a:t>verify</a:t>
+            </a:r>
+            <a:endParaRPr lang="es-ES" dirty="0"/>
+          </a:p>
+          <a:p>
+            <a:pPr lvl="1"/>
+            <a:r>
+              <a:rPr lang="es-ES" dirty="0" err="1"/>
+              <a:t>Commit</a:t>
+            </a:r>
+            <a:r>
+              <a:rPr lang="es-ES" dirty="0"/>
+              <a:t> and </a:t>
+            </a:r>
+            <a:r>
+              <a:rPr lang="es-ES" dirty="0" err="1"/>
+              <a:t>push</a:t>
+            </a:r>
+            <a:endParaRPr lang="es-ES" dirty="0"/>
+          </a:p>
+          <a:p>
+            <a:r>
+              <a:rPr lang="es-ES" dirty="0"/>
+              <a:t>--</a:t>
+            </a:r>
+            <a:r>
+              <a:rPr lang="es-ES" dirty="0" err="1"/>
+              <a:t>amend</a:t>
+            </a:r>
+            <a:endParaRPr lang="es-ES" dirty="0"/>
+          </a:p>
+          <a:p>
+            <a:r>
+              <a:rPr lang="es-ES" dirty="0"/>
+              <a:t>--</a:t>
+            </a:r>
+            <a:r>
+              <a:rPr lang="es-ES" dirty="0" err="1"/>
+              <a:t>allow-empty</a:t>
+            </a:r>
+            <a:endParaRPr lang="es-ES" dirty="0"/>
+          </a:p>
+          <a:p>
+            <a:r>
+              <a:rPr lang="es-ES" dirty="0"/>
+              <a:t>Cherry-pick</a:t>
+            </a:r>
+          </a:p>
+          <a:p>
+            <a:r>
+              <a:rPr lang="es-ES" dirty="0"/>
+              <a:t>--</a:t>
+            </a:r>
+            <a:r>
+              <a:rPr lang="es-ES" dirty="0" err="1"/>
+              <a:t>strategy-options</a:t>
+            </a:r>
+            <a:endParaRPr lang="es-ES" dirty="0"/>
+          </a:p>
+          <a:p>
+            <a:r>
+              <a:rPr lang="es-ES" dirty="0"/>
+              <a:t>Git </a:t>
+            </a:r>
+            <a:r>
+              <a:rPr lang="es-ES" dirty="0" err="1"/>
+              <a:t>bisect</a:t>
+            </a:r>
+            <a:endParaRPr lang="es-ES" dirty="0"/>
+          </a:p>
+          <a:p>
+            <a:r>
+              <a:rPr lang="es-ES" dirty="0" err="1"/>
+              <a:t>Rm</a:t>
+            </a:r>
+            <a:r>
+              <a:rPr lang="es-ES" dirty="0"/>
+              <a:t> --</a:t>
+            </a:r>
+            <a:r>
+              <a:rPr lang="es-ES" dirty="0" err="1"/>
+              <a:t>cached</a:t>
+            </a:r>
+            <a:endParaRPr lang="es-ES" dirty="0"/>
+          </a:p>
+          <a:p>
+            <a:endParaRPr lang="es-ES" dirty="0"/>
+          </a:p>
+        </p:txBody>
+      </p:sp>
+    </p:spTree>
+    <p:extLst>
+      <p:ext uri="{BB962C8B-B14F-4D97-AF65-F5344CB8AC3E}">
+        <p14:creationId xmlns:p14="http://schemas.microsoft.com/office/powerpoint/2010/main" val="4251056883"/>
+      </p:ext>
+    </p:extLst>
+  </p:cSld>
+  <p:clrMapOvr>
+    <a:masterClrMapping/>
+  </p:clrMapOvr>
+</p:sld>
+</file>
+
+<file path=ppt/slides/slide21.xml><?xml version="1.0" encoding="utf-8"?>
+<p:sld xmlns:a="http://schemas.openxmlformats.org/drawingml/2006/main" xmlns:r="http://schemas.openxmlformats.org/officeDocument/2006/relationships" xmlns:p="http://schemas.openxmlformats.org/presentationml/2006/main">
+  <p:cSld>
+    <p:spTree>
+      <p:nvGrpSpPr>
+        <p:cNvPr id="1" name=""/>
+        <p:cNvGrpSpPr/>
+        <p:nvPr/>
+      </p:nvGrpSpPr>
+      <p:grpSpPr>
+        <a:xfrm>
+          <a:off x="0" y="0"/>
+          <a:ext cx="0" cy="0"/>
+          <a:chOff x="0" y="0"/>
+          <a:chExt cx="0" cy="0"/>
+        </a:xfrm>
+      </p:grpSpPr>
+      <p:sp>
+        <p:nvSpPr>
+          <p:cNvPr id="2" name="Título 1">
+            <a:extLst>
+              <a:ext uri="{FF2B5EF4-FFF2-40B4-BE49-F238E27FC236}">
+                <a16:creationId xmlns:a16="http://schemas.microsoft.com/office/drawing/2014/main" id="{4C787A6D-EDE6-4B93-C2BF-105DD84FFE97}"/>
+              </a:ext>
+            </a:extLst>
+          </p:cNvPr>
+          <p:cNvSpPr>
+            <a:spLocks noGrp="1"/>
+          </p:cNvSpPr>
+          <p:nvPr>
+            <p:ph type="title"/>
+          </p:nvPr>
+        </p:nvSpPr>
+        <p:spPr/>
+        <p:txBody>
+          <a:bodyPr/>
+          <a:lstStyle/>
+          <a:p>
+            <a:r>
+              <a:rPr lang="es-ES" b="1" dirty="0">
+                <a:gradFill>
+                  <a:gsLst>
+                    <a:gs pos="0">
+                      <a:srgbClr val="FC5C7D"/>
+                    </a:gs>
+                    <a:gs pos="100000">
+                      <a:srgbClr val="6A82FB"/>
+                    </a:gs>
+                  </a:gsLst>
+                  <a:lin ang="0" scaled="0"/>
+                </a:gradFill>
+                <a:latin typeface="Montserrat" panose="00000500000000000000" pitchFamily="50" charset="0"/>
+              </a:rPr>
+              <a:t>créditos</a:t>
+            </a:r>
+          </a:p>
+        </p:txBody>
+      </p:sp>
+      <p:sp>
+        <p:nvSpPr>
+          <p:cNvPr id="3" name="Marcador de contenido 2">
+            <a:extLst>
+              <a:ext uri="{FF2B5EF4-FFF2-40B4-BE49-F238E27FC236}">
+                <a16:creationId xmlns:a16="http://schemas.microsoft.com/office/drawing/2014/main" id="{8AC3C452-83A6-278D-2F22-BD0806FC337A}"/>
+              </a:ext>
+            </a:extLst>
+          </p:cNvPr>
+          <p:cNvSpPr>
+            <a:spLocks noGrp="1"/>
+          </p:cNvSpPr>
+          <p:nvPr>
+            <p:ph idx="1"/>
+          </p:nvPr>
+        </p:nvSpPr>
+        <p:spPr/>
+        <p:txBody>
+          <a:bodyPr/>
+          <a:lstStyle/>
+          <a:p>
+            <a:r>
+              <a:rPr lang="es-ES" b="1" dirty="0" err="1">
+                <a:gradFill>
+                  <a:gsLst>
+                    <a:gs pos="0">
+                      <a:srgbClr val="FF4E50"/>
+                    </a:gs>
+                    <a:gs pos="100000">
+                      <a:srgbClr val="F9D423"/>
+                    </a:gs>
+                  </a:gsLst>
+                  <a:lin ang="0" scaled="0"/>
+                </a:gradFill>
+                <a:latin typeface="Montserrat" panose="00000500000000000000" pitchFamily="50" charset="0"/>
+              </a:rPr>
+              <a:t>uiGradients</a:t>
+            </a:r>
+            <a:r>
+              <a:rPr lang="es-ES" dirty="0"/>
+              <a:t>, los degradados han sido en su mayoría de aquí</a:t>
+            </a:r>
+          </a:p>
+          <a:p>
+            <a:pPr lvl="1"/>
+            <a:r>
+              <a:rPr lang="es-ES" dirty="0">
+                <a:hlinkClick r:id="rId2"/>
+              </a:rPr>
+              <a:t>https://uigradients.com/</a:t>
+            </a:r>
+            <a:endParaRPr lang="es-ES" dirty="0"/>
+          </a:p>
+          <a:p>
+            <a:r>
+              <a:rPr lang="es-ES" b="1" dirty="0" err="1">
+                <a:gradFill>
+                  <a:gsLst>
+                    <a:gs pos="0">
+                      <a:srgbClr val="36D1DC"/>
+                    </a:gs>
+                    <a:gs pos="100000">
+                      <a:srgbClr val="5B86E5"/>
+                    </a:gs>
+                  </a:gsLst>
+                  <a:lin ang="0" scaled="0"/>
+                </a:gradFill>
+                <a:latin typeface="Montserrat" panose="00000500000000000000" pitchFamily="50" charset="0"/>
+              </a:rPr>
+              <a:t>excalidraw</a:t>
+            </a:r>
+            <a:r>
+              <a:rPr lang="es-ES" dirty="0"/>
+              <a:t>, diagramas y dibujitos</a:t>
+            </a:r>
+          </a:p>
+          <a:p>
+            <a:pPr lvl="1"/>
+            <a:r>
+              <a:rPr lang="es-ES" dirty="0">
+                <a:hlinkClick r:id="rId3"/>
+              </a:rPr>
+              <a:t>https://excalidraw.com/</a:t>
+            </a:r>
+            <a:endParaRPr lang="es-ES" dirty="0"/>
+          </a:p>
+          <a:p>
+            <a:endParaRPr lang="es-ES" dirty="0"/>
+          </a:p>
+          <a:p>
+            <a:pPr lvl="1"/>
+            <a:endParaRPr lang="es-ES" dirty="0"/>
+          </a:p>
+        </p:txBody>
+      </p:sp>
+    </p:spTree>
+    <p:extLst>
+      <p:ext uri="{BB962C8B-B14F-4D97-AF65-F5344CB8AC3E}">
+        <p14:creationId xmlns:p14="http://schemas.microsoft.com/office/powerpoint/2010/main" val="2238448786"/>
+      </p:ext>
+    </p:extLst>
+  </p:cSld>
+  <p:clrMapOvr>
+    <a:masterClrMapping/>
+  </p:clrMapOvr>
+</p:sld>
+</file>
+
+<file path=ppt/slides/slide22.xml><?xml version="1.0" encoding="utf-8"?>
+<p:sld xmlns:a="http://schemas.openxmlformats.org/drawingml/2006/main" xmlns:r="http://schemas.openxmlformats.org/officeDocument/2006/relationships" xmlns:p="http://schemas.openxmlformats.org/presentationml/2006/main">
+  <p:cSld>
+    <p:spTree>
+      <p:nvGrpSpPr>
+        <p:cNvPr id="1" name=""/>
+        <p:cNvGrpSpPr/>
+        <p:nvPr/>
+      </p:nvGrpSpPr>
+      <p:grpSpPr>
+        <a:xfrm>
+          <a:off x="0" y="0"/>
+          <a:ext cx="0" cy="0"/>
+          <a:chOff x="0" y="0"/>
+          <a:chExt cx="0" cy="0"/>
+        </a:xfrm>
+      </p:grpSpPr>
+      <p:sp>
+        <p:nvSpPr>
+          <p:cNvPr id="2" name="Título 1">
+            <a:extLst>
+              <a:ext uri="{FF2B5EF4-FFF2-40B4-BE49-F238E27FC236}">
+                <a16:creationId xmlns:a16="http://schemas.microsoft.com/office/drawing/2014/main" id="{F9CFD3D0-94F1-5A49-94D9-AA28560521BB}"/>
+              </a:ext>
+            </a:extLst>
+          </p:cNvPr>
+          <p:cNvSpPr>
+            <a:spLocks noGrp="1"/>
+          </p:cNvSpPr>
+          <p:nvPr>
+            <p:ph type="title"/>
+          </p:nvPr>
+        </p:nvSpPr>
+        <p:spPr/>
+        <p:txBody>
+          <a:bodyPr/>
+          <a:lstStyle/>
+          <a:p>
+            <a:r>
+              <a:rPr lang="es-ES" b="1">
+                <a:gradFill>
+                  <a:gsLst>
+                    <a:gs pos="0">
+                      <a:srgbClr val="E43A15"/>
+                    </a:gs>
+                    <a:gs pos="100000">
+                      <a:srgbClr val="E65245"/>
+                    </a:gs>
+                  </a:gsLst>
+                  <a:lin ang="0" scaled="0"/>
+                </a:gradFill>
+                <a:latin typeface="Montserrat" panose="00000500000000000000" pitchFamily="50" charset="0"/>
+              </a:rPr>
+              <a:t>expandiendo el conocimiento</a:t>
+            </a:r>
+            <a:endParaRPr lang="es-ES" b="1" dirty="0">
+              <a:gradFill>
+                <a:gsLst>
+                  <a:gs pos="0">
+                    <a:srgbClr val="E43A15"/>
+                  </a:gs>
+                  <a:gs pos="100000">
+                    <a:srgbClr val="E65245"/>
+                  </a:gs>
+                </a:gsLst>
+                <a:lin ang="0" scaled="0"/>
+              </a:gradFill>
+              <a:latin typeface="Montserrat" panose="00000500000000000000" pitchFamily="50" charset="0"/>
+            </a:endParaRPr>
+          </a:p>
+        </p:txBody>
+      </p:sp>
+      <p:sp>
+        <p:nvSpPr>
+          <p:cNvPr id="3" name="Marcador de contenido 2">
+            <a:extLst>
+              <a:ext uri="{FF2B5EF4-FFF2-40B4-BE49-F238E27FC236}">
+                <a16:creationId xmlns:a16="http://schemas.microsoft.com/office/drawing/2014/main" id="{AE6CDA83-8718-09E1-D88C-202D3D887269}"/>
+              </a:ext>
+            </a:extLst>
+          </p:cNvPr>
+          <p:cNvSpPr>
+            <a:spLocks noGrp="1"/>
+          </p:cNvSpPr>
+          <p:nvPr>
+            <p:ph idx="1"/>
+          </p:nvPr>
+        </p:nvSpPr>
+        <p:spPr/>
+        <p:txBody>
+          <a:bodyPr/>
+          <a:lstStyle/>
+          <a:p>
+            <a:r>
+              <a:rPr lang="es-ES" dirty="0"/>
+              <a:t>Aprendiendo Git – Miguel </a:t>
+            </a:r>
+            <a:r>
+              <a:rPr lang="es-ES" dirty="0" err="1"/>
+              <a:t>Angel</a:t>
+            </a:r>
+            <a:r>
+              <a:rPr lang="es-ES" dirty="0"/>
+              <a:t> Durán</a:t>
+            </a:r>
+          </a:p>
+          <a:p>
+            <a:pPr lvl="1"/>
+            <a:r>
+              <a:rPr lang="es-ES" dirty="0">
+                <a:hlinkClick r:id="rId2"/>
+              </a:rPr>
+              <a:t>https://leanpub.com/aprendiendo-git</a:t>
+            </a:r>
+            <a:endParaRPr lang="es-ES" dirty="0"/>
+          </a:p>
+          <a:p>
+            <a:endParaRPr lang="es-ES" dirty="0"/>
+          </a:p>
+        </p:txBody>
+      </p:sp>
+    </p:spTree>
+    <p:extLst>
+      <p:ext uri="{BB962C8B-B14F-4D97-AF65-F5344CB8AC3E}">
+        <p14:creationId xmlns:p14="http://schemas.microsoft.com/office/powerpoint/2010/main" val="3403357200"/>
       </p:ext>
     </p:extLst>
   </p:cSld>
@@ -5334,7 +6572,7 @@
                 </a:gradFill>
                 <a:latin typeface="Montserrat" panose="00000500000000000000" pitchFamily="50" charset="0"/>
               </a:rPr>
-              <a:t>¿PARA QUIÉN ESTÁ PENSADA LA CHARLA?</a:t>
+              <a:t>¿para quién está pensada la charla?</a:t>
             </a:r>
           </a:p>
         </p:txBody>
@@ -5482,7 +6720,7 @@
                 </a:gradFill>
                 <a:latin typeface="Montserrat" panose="00000500000000000000" pitchFamily="50" charset="0"/>
               </a:rPr>
-              <a:t>ESTRUCTURA DE LAS CHARLAS</a:t>
+              <a:t>estructura de las charlas</a:t>
             </a:r>
           </a:p>
         </p:txBody>
@@ -5620,7 +6858,7 @@
                 </a:gradFill>
                 <a:latin typeface="Montserrat" panose="00000500000000000000" pitchFamily="50" charset="0"/>
               </a:rPr>
-              <a:t>PRESENTACIONES</a:t>
+              <a:t>presentaciones</a:t>
             </a:r>
           </a:p>
         </p:txBody>
@@ -5651,7 +6889,27 @@
             </a:pPr>
             <a:r>
               <a:rPr lang="es-ES" dirty="0"/>
-              <a:t>Soy Pepe, aunque </a:t>
+              <a:t>Soy </a:t>
+            </a:r>
+            <a:r>
+              <a:rPr lang="es-ES" b="1" dirty="0">
+                <a:gradFill>
+                  <a:gsLst>
+                    <a:gs pos="0">
+                      <a:srgbClr val="FDC830"/>
+                    </a:gs>
+                    <a:gs pos="100000">
+                      <a:srgbClr val="F37335"/>
+                    </a:gs>
+                  </a:gsLst>
+                  <a:lin ang="0" scaled="0"/>
+                </a:gradFill>
+              </a:rPr>
+              <a:t>Pepe</a:t>
+            </a:r>
+            <a:r>
+              <a:rPr lang="es-ES" dirty="0"/>
+              <a:t>, aunque </a:t>
             </a:r>
             <a:r>
               <a:rPr lang="es-ES" dirty="0" err="1"/>
@@ -5667,7 +6925,7 @@
             </a:r>
             <a:r>
               <a:rPr lang="es-ES" dirty="0"/>
-              <a:t>, experto en tirar producción, años de experiencia constatada rompiendo ramas en conflictos de </a:t>
+              <a:t>, experto en tirar abajo producción, años de experiencia constatada rompiendo ramas en conflictos de </a:t>
             </a:r>
             <a:r>
               <a:rPr lang="es-ES" dirty="0" err="1"/>
@@ -5766,8 +7024,45 @@
                 </a:gradFill>
                 <a:latin typeface="Montserrat" panose="00000500000000000000" pitchFamily="50" charset="0"/>
               </a:rPr>
-              <a:t>INTRODUCCIÓN A GIT</a:t>
-            </a:r>
+              <a:t>introducción a </a:t>
+            </a:r>
+            <a:r>
+              <a:rPr lang="es-ES" b="1" dirty="0" err="1">
+                <a:gradFill>
+                  <a:gsLst>
+                    <a:gs pos="50500">
+                      <a:srgbClr val="E94057"/>
+                    </a:gs>
+                    <a:gs pos="0">
+                      <a:srgbClr val="8A2387"/>
+                    </a:gs>
+                    <a:gs pos="100000">
+                      <a:srgbClr val="F7797D"/>
+                    </a:gs>
+                  </a:gsLst>
+                  <a:lin ang="0" scaled="0"/>
+                </a:gradFill>
+                <a:latin typeface="Montserrat" panose="00000500000000000000" pitchFamily="50" charset="0"/>
+              </a:rPr>
+              <a:t>git</a:t>
+            </a:r>
+            <a:endParaRPr lang="es-ES" b="1" dirty="0">
+              <a:gradFill>
+                <a:gsLst>
+                  <a:gs pos="50500">
+                    <a:srgbClr val="E94057"/>
+                  </a:gs>
+                  <a:gs pos="0">
+                    <a:srgbClr val="8A2387"/>
+                  </a:gs>
+                  <a:gs pos="100000">
+                    <a:srgbClr val="F7797D"/>
+                  </a:gs>
+                </a:gsLst>
+                <a:lin ang="0" scaled="0"/>
+              </a:gradFill>
+              <a:latin typeface="Montserrat" panose="00000500000000000000" pitchFamily="50" charset="0"/>
+            </a:endParaRPr>
           </a:p>
         </p:txBody>
       </p:sp>
@@ -6006,7 +7301,7 @@
           <p:cNvPr id="2" name="Título 1">
             <a:extLst>
               <a:ext uri="{FF2B5EF4-FFF2-40B4-BE49-F238E27FC236}">
-                <a16:creationId xmlns:a16="http://schemas.microsoft.com/office/drawing/2014/main" id="{28003F0D-C37E-4138-11E6-B9D959FADB60}"/>
+                <a16:creationId xmlns:a16="http://schemas.microsoft.com/office/drawing/2014/main" id="{7B5B4AE4-9A9F-AE16-4B94-F901F6CED438}"/>
               </a:ext>
             </a:extLst>
           </p:cNvPr>
@@ -6017,117 +7312,638 @@
             <p:ph type="title"/>
           </p:nvPr>
         </p:nvSpPr>
-        <p:spPr>
-          <a:xfrm>
-            <a:off x="838200" y="673134"/>
-            <a:ext cx="10515600" cy="1325563"/>
-          </a:xfrm>
-        </p:spPr>
+        <p:spPr/>
         <p:txBody>
           <a:bodyPr/>
           <a:lstStyle/>
           <a:p>
             <a:r>
               <a:rPr lang="es-ES" b="1" dirty="0">
-                <a:gradFill flip="none" rotWithShape="1">
+                <a:gradFill>
                   <a:gsLst>
                     <a:gs pos="0">
-                      <a:schemeClr val="accent6">
-                        <a:lumMod val="67000"/>
-                      </a:schemeClr>
-                    </a:gs>
-                    <a:gs pos="48000">
-                      <a:schemeClr val="accent6">
-                        <a:lumMod val="97000"/>
-                        <a:lumOff val="3000"/>
-                      </a:schemeClr>
+                      <a:srgbClr val="EF32D9"/>
                     </a:gs>
                     <a:gs pos="100000">
-                      <a:schemeClr val="accent6">
-                        <a:lumMod val="60000"/>
-                        <a:lumOff val="40000"/>
-                      </a:schemeClr>
+                      <a:srgbClr val="43FFFB"/>
                     </a:gs>
                   </a:gsLst>
-                  <a:path path="shape">
-                    <a:fillToRect l="50000" t="50000" r="50000" b="50000"/>
-                  </a:path>
-                  <a:tileRect/>
+                  <a:lin ang="0" scaled="0"/>
                 </a:gradFill>
                 <a:latin typeface="Montserrat" panose="00000500000000000000" pitchFamily="50" charset="0"/>
               </a:rPr>
-              <a:t>MODELO MENTAL</a:t>
-            </a:r>
-          </a:p>
-        </p:txBody>
-      </p:sp>
-      <p:sp>
-        <p:nvSpPr>
-          <p:cNvPr id="9" name="CuadroTexto 8">
-            <a:extLst>
-              <a:ext uri="{FF2B5EF4-FFF2-40B4-BE49-F238E27FC236}">
-                <a16:creationId xmlns:a16="http://schemas.microsoft.com/office/drawing/2014/main" id="{6B630C59-AC81-194F-09C1-C357D45AE648}"/>
-              </a:ext>
-            </a:extLst>
-          </p:cNvPr>
-          <p:cNvSpPr txBox="1"/>
-          <p:nvPr/>
+              <a:t>temas a tratar</a:t>
+            </a:r>
+          </a:p>
+        </p:txBody>
+      </p:sp>
+      <p:sp>
+        <p:nvSpPr>
+          <p:cNvPr id="3" name="Marcador de contenido 2">
+            <a:extLst>
+              <a:ext uri="{FF2B5EF4-FFF2-40B4-BE49-F238E27FC236}">
+                <a16:creationId xmlns:a16="http://schemas.microsoft.com/office/drawing/2014/main" id="{E8C38B41-EBDB-1003-553E-989C02C80671}"/>
+              </a:ext>
+            </a:extLst>
+          </p:cNvPr>
+          <p:cNvSpPr>
+            <a:spLocks noGrp="1"/>
+          </p:cNvSpPr>
+          <p:nvPr>
+            <p:ph idx="1"/>
+          </p:nvPr>
         </p:nvSpPr>
         <p:spPr>
           <a:xfrm>
-            <a:off x="838200" y="1998697"/>
-            <a:ext cx="10263996" cy="1384995"/>
+            <a:off x="838200" y="1825625"/>
+            <a:ext cx="3945556" cy="4351338"/>
+          </a:xfrm>
+        </p:spPr>
+        <p:txBody>
+          <a:bodyPr>
+            <a:normAutofit fontScale="85000" lnSpcReduction="20000"/>
+          </a:bodyPr>
+          <a:lstStyle/>
+          <a:p>
+            <a:r>
+              <a:rPr lang="en-US" dirty="0"/>
+              <a:t>Origin</a:t>
+            </a:r>
+          </a:p>
+          <a:p>
+            <a:r>
+              <a:rPr lang="en-US" dirty="0"/>
+              <a:t>Upstream</a:t>
+            </a:r>
+          </a:p>
+          <a:p>
+            <a:r>
+              <a:rPr lang="en-US" dirty="0" err="1"/>
+              <a:t>stategy</a:t>
+            </a:r>
+            <a:r>
+              <a:rPr lang="en-US" dirty="0"/>
+              <a:t> option</a:t>
+            </a:r>
+          </a:p>
+          <a:p>
+            <a:pPr lvl="1"/>
+            <a:r>
+              <a:rPr lang="en-US" dirty="0"/>
+              <a:t>ours/theirs</a:t>
+            </a:r>
+          </a:p>
+          <a:p>
+            <a:r>
+              <a:rPr lang="en-US" dirty="0"/>
+              <a:t>Merge</a:t>
+            </a:r>
+          </a:p>
+          <a:p>
+            <a:r>
+              <a:rPr lang="en-US" dirty="0"/>
+              <a:t>Rebase</a:t>
+            </a:r>
+          </a:p>
+          <a:p>
+            <a:r>
+              <a:rPr lang="en-US" dirty="0"/>
+              <a:t>Bisect</a:t>
+            </a:r>
+          </a:p>
+          <a:p>
+            <a:r>
+              <a:rPr lang="es-ES" dirty="0" err="1"/>
+              <a:t>Checkout</a:t>
+            </a:r>
+            <a:endParaRPr lang="es-ES" dirty="0"/>
+          </a:p>
+          <a:p>
+            <a:r>
+              <a:rPr lang="es-ES" dirty="0" err="1"/>
+              <a:t>Branches</a:t>
+            </a:r>
+            <a:endParaRPr lang="es-ES" dirty="0"/>
+          </a:p>
+          <a:p>
+            <a:r>
+              <a:rPr lang="es-ES" dirty="0" err="1"/>
+              <a:t>branch</a:t>
+            </a:r>
+            <a:r>
+              <a:rPr lang="es-ES" dirty="0"/>
+              <a:t> </a:t>
+            </a:r>
+            <a:r>
+              <a:rPr lang="es-ES" dirty="0" err="1"/>
+              <a:t>rename</a:t>
+            </a:r>
+            <a:endParaRPr lang="es-ES" dirty="0"/>
+          </a:p>
+          <a:p>
+            <a:r>
+              <a:rPr lang="es-ES" dirty="0"/>
+              <a:t>crear ramas con </a:t>
+            </a:r>
+            <a:r>
+              <a:rPr lang="es-ES" dirty="0" err="1"/>
+              <a:t>checkout</a:t>
+            </a:r>
+            <a:endParaRPr lang="es-ES" dirty="0"/>
+          </a:p>
+        </p:txBody>
+      </p:sp>
+      <p:sp>
+        <p:nvSpPr>
+          <p:cNvPr id="4" name="Marcador de contenido 2">
+            <a:extLst>
+              <a:ext uri="{FF2B5EF4-FFF2-40B4-BE49-F238E27FC236}">
+                <a16:creationId xmlns:a16="http://schemas.microsoft.com/office/drawing/2014/main" id="{ECB9B7F9-DF27-F213-DAB9-3A8A76107E82}"/>
+              </a:ext>
+            </a:extLst>
+          </p:cNvPr>
+          <p:cNvSpPr txBox="1">
+            <a:spLocks/>
+          </p:cNvSpPr>
+          <p:nvPr/>
+        </p:nvSpPr>
+        <p:spPr>
+          <a:xfrm>
+            <a:off x="4561439" y="1820846"/>
+            <a:ext cx="3945556" cy="4351338"/>
           </a:xfrm>
           <a:prstGeom prst="rect">
             <a:avLst/>
           </a:prstGeom>
-          <a:noFill/>
         </p:spPr>
         <p:txBody>
-          <a:bodyPr wrap="square" rtlCol="0">
-            <a:spAutoFit/>
+          <a:bodyPr vert="horz" lIns="91440" tIns="45720" rIns="91440" bIns="45720" rtlCol="0">
+            <a:normAutofit fontScale="92500" lnSpcReduction="20000"/>
           </a:bodyPr>
-          <a:lstStyle/>
-          <a:p>
-            <a:r>
-              <a:rPr lang="es-ES" sz="2800" dirty="0"/>
-              <a:t>Antes de empezar explicaremos dos conceptos, por encima:</a:t>
-            </a:r>
-          </a:p>
-          <a:p>
-            <a:pPr marL="285750" indent="-285750">
+          <a:lstStyle>
+            <a:lvl1pPr marL="228600" indent="-228600" algn="l" defTabSz="914400" rtl="0" eaLnBrk="1" latinLnBrk="0" hangingPunct="1">
+              <a:lnSpc>
+                <a:spcPct val="90000"/>
+              </a:lnSpc>
+              <a:spcBef>
+                <a:spcPts val="1000"/>
+              </a:spcBef>
               <a:buFont typeface="Arial" panose="020B0604020202020204" pitchFamily="34" charset="0"/>
               <a:buChar char="•"/>
-            </a:pPr>
-            <a:r>
-              <a:rPr lang="es-ES" sz="2800" dirty="0"/>
-              <a:t>Hashes</a:t>
-            </a:r>
-          </a:p>
-          <a:p>
-            <a:pPr marL="285750" indent="-285750">
+              <a:defRPr sz="2800" kern="1200">
+                <a:solidFill>
+                  <a:schemeClr val="tx1"/>
+                </a:solidFill>
+                <a:latin typeface="+mn-lt"/>
+                <a:ea typeface="+mn-ea"/>
+                <a:cs typeface="+mn-cs"/>
+              </a:defRPr>
+            </a:lvl1pPr>
+            <a:lvl2pPr marL="685800" indent="-228600" algn="l" defTabSz="914400" rtl="0" eaLnBrk="1" latinLnBrk="0" hangingPunct="1">
+              <a:lnSpc>
+                <a:spcPct val="90000"/>
+              </a:lnSpc>
+              <a:spcBef>
+                <a:spcPts val="500"/>
+              </a:spcBef>
               <a:buFont typeface="Arial" panose="020B0604020202020204" pitchFamily="34" charset="0"/>
               <a:buChar char="•"/>
-            </a:pPr>
-            <a:r>
-              <a:rPr lang="es-ES" sz="2800" dirty="0"/>
-              <a:t>Listas enlazadas (</a:t>
-            </a:r>
-            <a:r>
-              <a:rPr lang="es-ES" sz="2800" dirty="0" err="1"/>
-              <a:t>Linked</a:t>
-            </a:r>
-            <a:r>
-              <a:rPr lang="es-ES" sz="2800" dirty="0"/>
-              <a:t> </a:t>
-            </a:r>
-            <a:r>
-              <a:rPr lang="es-ES" sz="2800" dirty="0" err="1"/>
-              <a:t>Lists</a:t>
-            </a:r>
-            <a:r>
-              <a:rPr lang="es-ES" sz="2800" dirty="0"/>
-              <a:t>)</a:t>
+              <a:defRPr sz="2400" kern="1200">
+                <a:solidFill>
+                  <a:schemeClr val="tx1"/>
+                </a:solidFill>
+                <a:latin typeface="+mn-lt"/>
+                <a:ea typeface="+mn-ea"/>
+                <a:cs typeface="+mn-cs"/>
+              </a:defRPr>
+            </a:lvl2pPr>
+            <a:lvl3pPr marL="1143000" indent="-228600" algn="l" defTabSz="914400" rtl="0" eaLnBrk="1" latinLnBrk="0" hangingPunct="1">
+              <a:lnSpc>
+                <a:spcPct val="90000"/>
+              </a:lnSpc>
+              <a:spcBef>
+                <a:spcPts val="500"/>
+              </a:spcBef>
+              <a:buFont typeface="Arial" panose="020B0604020202020204" pitchFamily="34" charset="0"/>
+              <a:buChar char="•"/>
+              <a:defRPr sz="2000" kern="1200">
+                <a:solidFill>
+                  <a:schemeClr val="tx1"/>
+                </a:solidFill>
+                <a:latin typeface="+mn-lt"/>
+                <a:ea typeface="+mn-ea"/>
+                <a:cs typeface="+mn-cs"/>
+              </a:defRPr>
+            </a:lvl3pPr>
+            <a:lvl4pPr marL="1600200" indent="-228600" algn="l" defTabSz="914400" rtl="0" eaLnBrk="1" latinLnBrk="0" hangingPunct="1">
+              <a:lnSpc>
+                <a:spcPct val="90000"/>
+              </a:lnSpc>
+              <a:spcBef>
+                <a:spcPts val="500"/>
+              </a:spcBef>
+              <a:buFont typeface="Arial" panose="020B0604020202020204" pitchFamily="34" charset="0"/>
+              <a:buChar char="•"/>
+              <a:defRPr sz="1800" kern="1200">
+                <a:solidFill>
+                  <a:schemeClr val="tx1"/>
+                </a:solidFill>
+                <a:latin typeface="+mn-lt"/>
+                <a:ea typeface="+mn-ea"/>
+                <a:cs typeface="+mn-cs"/>
+              </a:defRPr>
+            </a:lvl4pPr>
+            <a:lvl5pPr marL="2057400" indent="-228600" algn="l" defTabSz="914400" rtl="0" eaLnBrk="1" latinLnBrk="0" hangingPunct="1">
+              <a:lnSpc>
+                <a:spcPct val="90000"/>
+              </a:lnSpc>
+              <a:spcBef>
+                <a:spcPts val="500"/>
+              </a:spcBef>
+              <a:buFont typeface="Arial" panose="020B0604020202020204" pitchFamily="34" charset="0"/>
+              <a:buChar char="•"/>
+              <a:defRPr sz="1800" kern="1200">
+                <a:solidFill>
+                  <a:schemeClr val="tx1"/>
+                </a:solidFill>
+                <a:latin typeface="+mn-lt"/>
+                <a:ea typeface="+mn-ea"/>
+                <a:cs typeface="+mn-cs"/>
+              </a:defRPr>
+            </a:lvl5pPr>
+            <a:lvl6pPr marL="2514600" indent="-228600" algn="l" defTabSz="914400" rtl="0" eaLnBrk="1" latinLnBrk="0" hangingPunct="1">
+              <a:lnSpc>
+                <a:spcPct val="90000"/>
+              </a:lnSpc>
+              <a:spcBef>
+                <a:spcPts val="500"/>
+              </a:spcBef>
+              <a:buFont typeface="Arial" panose="020B0604020202020204" pitchFamily="34" charset="0"/>
+              <a:buChar char="•"/>
+              <a:defRPr sz="1800" kern="1200">
+                <a:solidFill>
+                  <a:schemeClr val="tx1"/>
+                </a:solidFill>
+                <a:latin typeface="+mn-lt"/>
+                <a:ea typeface="+mn-ea"/>
+                <a:cs typeface="+mn-cs"/>
+              </a:defRPr>
+            </a:lvl6pPr>
+            <a:lvl7pPr marL="2971800" indent="-228600" algn="l" defTabSz="914400" rtl="0" eaLnBrk="1" latinLnBrk="0" hangingPunct="1">
+              <a:lnSpc>
+                <a:spcPct val="90000"/>
+              </a:lnSpc>
+              <a:spcBef>
+                <a:spcPts val="500"/>
+              </a:spcBef>
+              <a:buFont typeface="Arial" panose="020B0604020202020204" pitchFamily="34" charset="0"/>
+              <a:buChar char="•"/>
+              <a:defRPr sz="1800" kern="1200">
+                <a:solidFill>
+                  <a:schemeClr val="tx1"/>
+                </a:solidFill>
+                <a:latin typeface="+mn-lt"/>
+                <a:ea typeface="+mn-ea"/>
+                <a:cs typeface="+mn-cs"/>
+              </a:defRPr>
+            </a:lvl7pPr>
+            <a:lvl8pPr marL="3429000" indent="-228600" algn="l" defTabSz="914400" rtl="0" eaLnBrk="1" latinLnBrk="0" hangingPunct="1">
+              <a:lnSpc>
+                <a:spcPct val="90000"/>
+              </a:lnSpc>
+              <a:spcBef>
+                <a:spcPts val="500"/>
+              </a:spcBef>
+              <a:buFont typeface="Arial" panose="020B0604020202020204" pitchFamily="34" charset="0"/>
+              <a:buChar char="•"/>
+              <a:defRPr sz="1800" kern="1200">
+                <a:solidFill>
+                  <a:schemeClr val="tx1"/>
+                </a:solidFill>
+                <a:latin typeface="+mn-lt"/>
+                <a:ea typeface="+mn-ea"/>
+                <a:cs typeface="+mn-cs"/>
+              </a:defRPr>
+            </a:lvl8pPr>
+            <a:lvl9pPr marL="3886200" indent="-228600" algn="l" defTabSz="914400" rtl="0" eaLnBrk="1" latinLnBrk="0" hangingPunct="1">
+              <a:lnSpc>
+                <a:spcPct val="90000"/>
+              </a:lnSpc>
+              <a:spcBef>
+                <a:spcPts val="500"/>
+              </a:spcBef>
+              <a:buFont typeface="Arial" panose="020B0604020202020204" pitchFamily="34" charset="0"/>
+              <a:buChar char="•"/>
+              <a:defRPr sz="1800" kern="1200">
+                <a:solidFill>
+                  <a:schemeClr val="tx1"/>
+                </a:solidFill>
+                <a:latin typeface="+mn-lt"/>
+                <a:ea typeface="+mn-ea"/>
+                <a:cs typeface="+mn-cs"/>
+              </a:defRPr>
+            </a:lvl9pPr>
+          </a:lstStyle>
+          <a:p>
+            <a:r>
+              <a:rPr lang="en-US" dirty="0"/>
+              <a:t>Remote</a:t>
+            </a:r>
+          </a:p>
+          <a:p>
+            <a:r>
+              <a:rPr lang="en-US" dirty="0"/>
+              <a:t>git stash</a:t>
+            </a:r>
+          </a:p>
+          <a:p>
+            <a:pPr lvl="1"/>
+            <a:r>
+              <a:rPr lang="en-US" dirty="0"/>
+              <a:t>keys y pop</a:t>
+            </a:r>
+          </a:p>
+          <a:p>
+            <a:r>
+              <a:rPr lang="sv-SE" dirty="0"/>
+              <a:t>git fetch vs git pull vs git push</a:t>
+            </a:r>
+          </a:p>
+          <a:p>
+            <a:pPr lvl="1"/>
+            <a:r>
+              <a:rPr lang="en-US" dirty="0"/>
+              <a:t>git fetch especial (git pull &amp;&amp; git push)</a:t>
+            </a:r>
+            <a:endParaRPr lang="sv-SE" dirty="0"/>
+          </a:p>
+          <a:p>
+            <a:r>
+              <a:rPr lang="en-US" dirty="0"/>
+              <a:t>git cherry pick</a:t>
+            </a:r>
+          </a:p>
+          <a:p>
+            <a:r>
+              <a:rPr lang="en-US" dirty="0" err="1"/>
+              <a:t>Entornos</a:t>
+            </a:r>
+            <a:endParaRPr lang="en-US" dirty="0"/>
+          </a:p>
+          <a:p>
+            <a:pPr lvl="1"/>
+            <a:r>
+              <a:rPr lang="en-US" dirty="0"/>
+              <a:t>stating, local, remote, origin</a:t>
+            </a:r>
+          </a:p>
+          <a:p>
+            <a:r>
+              <a:rPr lang="en-US" dirty="0"/>
+              <a:t>Add, commit, reset</a:t>
+            </a:r>
+          </a:p>
+        </p:txBody>
+      </p:sp>
+      <p:sp>
+        <p:nvSpPr>
+          <p:cNvPr id="5" name="Marcador de contenido 2">
+            <a:extLst>
+              <a:ext uri="{FF2B5EF4-FFF2-40B4-BE49-F238E27FC236}">
+                <a16:creationId xmlns:a16="http://schemas.microsoft.com/office/drawing/2014/main" id="{8A825BB9-091A-676E-DE35-F3F9FFEDB812}"/>
+              </a:ext>
+            </a:extLst>
+          </p:cNvPr>
+          <p:cNvSpPr txBox="1">
+            <a:spLocks/>
+          </p:cNvSpPr>
+          <p:nvPr/>
+        </p:nvSpPr>
+        <p:spPr>
+          <a:xfrm>
+            <a:off x="8246444" y="1820846"/>
+            <a:ext cx="3945556" cy="4351338"/>
+          </a:xfrm>
+          <a:prstGeom prst="rect">
+            <a:avLst/>
+          </a:prstGeom>
+        </p:spPr>
+        <p:txBody>
+          <a:bodyPr vert="horz" lIns="91440" tIns="45720" rIns="91440" bIns="45720" rtlCol="0">
+            <a:normAutofit lnSpcReduction="10000"/>
+          </a:bodyPr>
+          <a:lstStyle>
+            <a:lvl1pPr marL="228600" indent="-228600" algn="l" defTabSz="914400" rtl="0" eaLnBrk="1" latinLnBrk="0" hangingPunct="1">
+              <a:lnSpc>
+                <a:spcPct val="90000"/>
+              </a:lnSpc>
+              <a:spcBef>
+                <a:spcPts val="1000"/>
+              </a:spcBef>
+              <a:buFont typeface="Arial" panose="020B0604020202020204" pitchFamily="34" charset="0"/>
+              <a:buChar char="•"/>
+              <a:defRPr sz="2800" kern="1200">
+                <a:solidFill>
+                  <a:schemeClr val="tx1"/>
+                </a:solidFill>
+                <a:latin typeface="+mn-lt"/>
+                <a:ea typeface="+mn-ea"/>
+                <a:cs typeface="+mn-cs"/>
+              </a:defRPr>
+            </a:lvl1pPr>
+            <a:lvl2pPr marL="685800" indent="-228600" algn="l" defTabSz="914400" rtl="0" eaLnBrk="1" latinLnBrk="0" hangingPunct="1">
+              <a:lnSpc>
+                <a:spcPct val="90000"/>
+              </a:lnSpc>
+              <a:spcBef>
+                <a:spcPts val="500"/>
+              </a:spcBef>
+              <a:buFont typeface="Arial" panose="020B0604020202020204" pitchFamily="34" charset="0"/>
+              <a:buChar char="•"/>
+              <a:defRPr sz="2400" kern="1200">
+                <a:solidFill>
+                  <a:schemeClr val="tx1"/>
+                </a:solidFill>
+                <a:latin typeface="+mn-lt"/>
+                <a:ea typeface="+mn-ea"/>
+                <a:cs typeface="+mn-cs"/>
+              </a:defRPr>
+            </a:lvl2pPr>
+            <a:lvl3pPr marL="1143000" indent="-228600" algn="l" defTabSz="914400" rtl="0" eaLnBrk="1" latinLnBrk="0" hangingPunct="1">
+              <a:lnSpc>
+                <a:spcPct val="90000"/>
+              </a:lnSpc>
+              <a:spcBef>
+                <a:spcPts val="500"/>
+              </a:spcBef>
+              <a:buFont typeface="Arial" panose="020B0604020202020204" pitchFamily="34" charset="0"/>
+              <a:buChar char="•"/>
+              <a:defRPr sz="2000" kern="1200">
+                <a:solidFill>
+                  <a:schemeClr val="tx1"/>
+                </a:solidFill>
+                <a:latin typeface="+mn-lt"/>
+                <a:ea typeface="+mn-ea"/>
+                <a:cs typeface="+mn-cs"/>
+              </a:defRPr>
+            </a:lvl3pPr>
+            <a:lvl4pPr marL="1600200" indent="-228600" algn="l" defTabSz="914400" rtl="0" eaLnBrk="1" latinLnBrk="0" hangingPunct="1">
+              <a:lnSpc>
+                <a:spcPct val="90000"/>
+              </a:lnSpc>
+              <a:spcBef>
+                <a:spcPts val="500"/>
+              </a:spcBef>
+              <a:buFont typeface="Arial" panose="020B0604020202020204" pitchFamily="34" charset="0"/>
+              <a:buChar char="•"/>
+              <a:defRPr sz="1800" kern="1200">
+                <a:solidFill>
+                  <a:schemeClr val="tx1"/>
+                </a:solidFill>
+                <a:latin typeface="+mn-lt"/>
+                <a:ea typeface="+mn-ea"/>
+                <a:cs typeface="+mn-cs"/>
+              </a:defRPr>
+            </a:lvl4pPr>
+            <a:lvl5pPr marL="2057400" indent="-228600" algn="l" defTabSz="914400" rtl="0" eaLnBrk="1" latinLnBrk="0" hangingPunct="1">
+              <a:lnSpc>
+                <a:spcPct val="90000"/>
+              </a:lnSpc>
+              <a:spcBef>
+                <a:spcPts val="500"/>
+              </a:spcBef>
+              <a:buFont typeface="Arial" panose="020B0604020202020204" pitchFamily="34" charset="0"/>
+              <a:buChar char="•"/>
+              <a:defRPr sz="1800" kern="1200">
+                <a:solidFill>
+                  <a:schemeClr val="tx1"/>
+                </a:solidFill>
+                <a:latin typeface="+mn-lt"/>
+                <a:ea typeface="+mn-ea"/>
+                <a:cs typeface="+mn-cs"/>
+              </a:defRPr>
+            </a:lvl5pPr>
+            <a:lvl6pPr marL="2514600" indent="-228600" algn="l" defTabSz="914400" rtl="0" eaLnBrk="1" latinLnBrk="0" hangingPunct="1">
+              <a:lnSpc>
+                <a:spcPct val="90000"/>
+              </a:lnSpc>
+              <a:spcBef>
+                <a:spcPts val="500"/>
+              </a:spcBef>
+              <a:buFont typeface="Arial" panose="020B0604020202020204" pitchFamily="34" charset="0"/>
+              <a:buChar char="•"/>
+              <a:defRPr sz="1800" kern="1200">
+                <a:solidFill>
+                  <a:schemeClr val="tx1"/>
+                </a:solidFill>
+                <a:latin typeface="+mn-lt"/>
+                <a:ea typeface="+mn-ea"/>
+                <a:cs typeface="+mn-cs"/>
+              </a:defRPr>
+            </a:lvl6pPr>
+            <a:lvl7pPr marL="2971800" indent="-228600" algn="l" defTabSz="914400" rtl="0" eaLnBrk="1" latinLnBrk="0" hangingPunct="1">
+              <a:lnSpc>
+                <a:spcPct val="90000"/>
+              </a:lnSpc>
+              <a:spcBef>
+                <a:spcPts val="500"/>
+              </a:spcBef>
+              <a:buFont typeface="Arial" panose="020B0604020202020204" pitchFamily="34" charset="0"/>
+              <a:buChar char="•"/>
+              <a:defRPr sz="1800" kern="1200">
+                <a:solidFill>
+                  <a:schemeClr val="tx1"/>
+                </a:solidFill>
+                <a:latin typeface="+mn-lt"/>
+                <a:ea typeface="+mn-ea"/>
+                <a:cs typeface="+mn-cs"/>
+              </a:defRPr>
+            </a:lvl7pPr>
+            <a:lvl8pPr marL="3429000" indent="-228600" algn="l" defTabSz="914400" rtl="0" eaLnBrk="1" latinLnBrk="0" hangingPunct="1">
+              <a:lnSpc>
+                <a:spcPct val="90000"/>
+              </a:lnSpc>
+              <a:spcBef>
+                <a:spcPts val="500"/>
+              </a:spcBef>
+              <a:buFont typeface="Arial" panose="020B0604020202020204" pitchFamily="34" charset="0"/>
+              <a:buChar char="•"/>
+              <a:defRPr sz="1800" kern="1200">
+                <a:solidFill>
+                  <a:schemeClr val="tx1"/>
+                </a:solidFill>
+                <a:latin typeface="+mn-lt"/>
+                <a:ea typeface="+mn-ea"/>
+                <a:cs typeface="+mn-cs"/>
+              </a:defRPr>
+            </a:lvl8pPr>
+            <a:lvl9pPr marL="3886200" indent="-228600" algn="l" defTabSz="914400" rtl="0" eaLnBrk="1" latinLnBrk="0" hangingPunct="1">
+              <a:lnSpc>
+                <a:spcPct val="90000"/>
+              </a:lnSpc>
+              <a:spcBef>
+                <a:spcPts val="500"/>
+              </a:spcBef>
+              <a:buFont typeface="Arial" panose="020B0604020202020204" pitchFamily="34" charset="0"/>
+              <a:buChar char="•"/>
+              <a:defRPr sz="1800" kern="1200">
+                <a:solidFill>
+                  <a:schemeClr val="tx1"/>
+                </a:solidFill>
+                <a:latin typeface="+mn-lt"/>
+                <a:ea typeface="+mn-ea"/>
+                <a:cs typeface="+mn-cs"/>
+              </a:defRPr>
+            </a:lvl9pPr>
+          </a:lstStyle>
+          <a:p>
+            <a:r>
+              <a:rPr lang="en-US" dirty="0"/>
+              <a:t>git config</a:t>
+            </a:r>
+          </a:p>
+          <a:p>
+            <a:pPr lvl="1"/>
+            <a:r>
+              <a:rPr lang="en-US" dirty="0"/>
+              <a:t>repo, system, global, user</a:t>
+            </a:r>
+          </a:p>
+          <a:p>
+            <a:r>
+              <a:rPr lang="en-US" dirty="0"/>
+              <a:t>Git patch</a:t>
+            </a:r>
+          </a:p>
+          <a:p>
+            <a:r>
+              <a:rPr lang="en-US" dirty="0"/>
+              <a:t>Git submodules and subtrees</a:t>
+            </a:r>
+          </a:p>
+          <a:p>
+            <a:r>
+              <a:rPr lang="en-US" dirty="0"/>
+              <a:t>Git log</a:t>
+            </a:r>
+          </a:p>
+          <a:p>
+            <a:r>
+              <a:rPr lang="en-US" dirty="0"/>
+              <a:t>Git rebase interactive</a:t>
+            </a:r>
+          </a:p>
+          <a:p>
+            <a:r>
+              <a:rPr lang="en-US" dirty="0" err="1"/>
+              <a:t>Reflog</a:t>
+            </a:r>
+            <a:endParaRPr lang="en-US" dirty="0"/>
+          </a:p>
+          <a:p>
+            <a:r>
+              <a:rPr lang="en-US" dirty="0"/>
+              <a:t>deltas</a:t>
             </a:r>
           </a:p>
         </p:txBody>
@@ -6135,7 +7951,7 @@
     </p:spTree>
     <p:extLst>
       <p:ext uri="{BB962C8B-B14F-4D97-AF65-F5344CB8AC3E}">
-        <p14:creationId xmlns:p14="http://schemas.microsoft.com/office/powerpoint/2010/main" val="455664938"/>
+        <p14:creationId xmlns:p14="http://schemas.microsoft.com/office/powerpoint/2010/main" val="3900068602"/>
       </p:ext>
     </p:extLst>
   </p:cSld>
@@ -6167,7 +7983,7 @@
           <p:cNvPr id="2" name="Título 1">
             <a:extLst>
               <a:ext uri="{FF2B5EF4-FFF2-40B4-BE49-F238E27FC236}">
-                <a16:creationId xmlns:a16="http://schemas.microsoft.com/office/drawing/2014/main" id="{87617B76-1775-B480-36B1-555978DC7EC9}"/>
+                <a16:creationId xmlns:a16="http://schemas.microsoft.com/office/drawing/2014/main" id="{28003F0D-C37E-4138-11E6-B9D959FADB60}"/>
               </a:ext>
             </a:extLst>
           </p:cNvPr>
@@ -6179,7 +7995,10 @@
           </p:nvPr>
         </p:nvSpPr>
         <p:spPr>
-          <a:noFill/>
+          <a:xfrm>
+            <a:off x="838200" y="673134"/>
+            <a:ext cx="10515600" cy="1325563"/>
+          </a:xfrm>
         </p:spPr>
         <p:txBody>
           <a:bodyPr/>
@@ -6190,36 +8009,41 @@
                 <a:gradFill flip="none" rotWithShape="1">
                   <a:gsLst>
                     <a:gs pos="0">
-                      <a:srgbClr val="00B0F0"/>
+                      <a:schemeClr val="accent6">
+                        <a:lumMod val="67000"/>
+                      </a:schemeClr>
                     </a:gs>
                     <a:gs pos="48000">
-                      <a:schemeClr val="accent1">
+                      <a:schemeClr val="accent6">
+                        <a:lumMod val="97000"/>
+                        <a:lumOff val="3000"/>
+                      </a:schemeClr>
+                    </a:gs>
+                    <a:gs pos="100000">
+                      <a:schemeClr val="accent6">
                         <a:lumMod val="60000"/>
                         <a:lumOff val="40000"/>
                       </a:schemeClr>
                     </a:gs>
-                    <a:gs pos="100000">
-                      <a:srgbClr val="B684D2"/>
-                    </a:gs>
                   </a:gsLst>
-                  <a:path path="circle">
-                    <a:fillToRect l="100000" t="100000"/>
+                  <a:path path="shape">
+                    <a:fillToRect l="50000" t="50000" r="50000" b="50000"/>
                   </a:path>
-                  <a:tileRect r="-100000" b="-100000"/>
+                  <a:tileRect/>
                 </a:gradFill>
                 <a:latin typeface="Montserrat" panose="00000500000000000000" pitchFamily="50" charset="0"/>
               </a:rPr>
-              <a:t>HASHES</a:t>
-            </a:r>
-          </a:p>
-        </p:txBody>
-      </p:sp>
-      <p:sp>
-        <p:nvSpPr>
-          <p:cNvPr id="4" name="CuadroTexto 3">
-            <a:extLst>
-              <a:ext uri="{FF2B5EF4-FFF2-40B4-BE49-F238E27FC236}">
-                <a16:creationId xmlns:a16="http://schemas.microsoft.com/office/drawing/2014/main" id="{F0895123-4D3A-17A7-08F2-29A6DFD8A0CC}"/>
+              <a:t>modelo mental</a:t>
+            </a:r>
+          </a:p>
+        </p:txBody>
+      </p:sp>
+      <p:sp>
+        <p:nvSpPr>
+          <p:cNvPr id="9" name="CuadroTexto 8">
+            <a:extLst>
+              <a:ext uri="{FF2B5EF4-FFF2-40B4-BE49-F238E27FC236}">
+                <a16:creationId xmlns:a16="http://schemas.microsoft.com/office/drawing/2014/main" id="{6B630C59-AC81-194F-09C1-C357D45AE648}"/>
               </a:ext>
             </a:extLst>
           </p:cNvPr>
@@ -6228,8 +8052,8 @@
         </p:nvSpPr>
         <p:spPr>
           <a:xfrm>
-            <a:off x="838200" y="1690688"/>
-            <a:ext cx="7257051" cy="1384995"/>
+            <a:off x="838200" y="1998697"/>
+            <a:ext cx="10263996" cy="2677656"/>
           </a:xfrm>
           <a:prstGeom prst="rect">
             <a:avLst/>
@@ -6237,42 +8061,80 @@
           <a:noFill/>
         </p:spPr>
         <p:txBody>
-          <a:bodyPr wrap="none" rtlCol="0">
+          <a:bodyPr wrap="square" rtlCol="0">
             <a:spAutoFit/>
           </a:bodyPr>
           <a:lstStyle/>
           <a:p>
             <a:r>
               <a:rPr lang="es-ES" sz="2800" dirty="0"/>
-              <a:t>Funciones matemáticas</a:t>
-            </a:r>
-          </a:p>
-          <a:p>
+              <a:t>Antes de empezar explicaremos dos conceptos, por encima:</a:t>
+            </a:r>
+          </a:p>
+          <a:p>
+            <a:pPr marL="285750" indent="-285750">
+              <a:buFont typeface="Arial" panose="020B0604020202020204" pitchFamily="34" charset="0"/>
+              <a:buChar char="•"/>
+            </a:pPr>
             <a:r>
               <a:rPr lang="es-ES" sz="2800" dirty="0"/>
-              <a:t>Únicas, </a:t>
+              <a:t>Hashes</a:t>
+            </a:r>
+          </a:p>
+          <a:p>
+            <a:pPr marL="285750" indent="-285750">
+              <a:buFont typeface="Arial" panose="020B0604020202020204" pitchFamily="34" charset="0"/>
+              <a:buChar char="•"/>
+            </a:pPr>
+            <a:r>
+              <a:rPr lang="es-ES" sz="2800" dirty="0"/>
+              <a:t>Listas enlazadas (</a:t>
             </a:r>
             <a:r>
               <a:rPr lang="es-ES" sz="2800" dirty="0" err="1"/>
-              <a:t>uid</a:t>
+              <a:t>Linked</a:t>
             </a:r>
             <a:r>
               <a:rPr lang="es-ES" sz="2800" dirty="0"/>
-              <a:t>, un hash no da dos veces el mismo id</a:t>
-            </a:r>
-          </a:p>
-          <a:p>
+              <a:t> </a:t>
+            </a:r>
+            <a:r>
+              <a:rPr lang="es-ES" sz="2800" dirty="0" err="1"/>
+              <a:t>Lists</a:t>
+            </a:r>
             <a:r>
               <a:rPr lang="es-ES" sz="2800" dirty="0"/>
-              <a:t>Inmutabilidad, un cambio, nuevo hash</a:t>
-            </a:r>
+              <a:t>)</a:t>
+            </a:r>
+          </a:p>
+          <a:p>
+            <a:endParaRPr lang="es-ES" sz="2800" dirty="0"/>
+          </a:p>
+          <a:p>
+            <a:r>
+              <a:rPr lang="es-ES" sz="2800" dirty="0"/>
+              <a:t>La idea de este “modelo mental” es tener ejemplos cercanos para poder entender la </a:t>
+            </a:r>
+            <a:r>
+              <a:rPr lang="es-ES" sz="2800" i="1" dirty="0"/>
+              <a:t>magia</a:t>
+            </a:r>
+            <a:r>
+              <a:rPr lang="es-ES" sz="2800" dirty="0"/>
+              <a:t> de </a:t>
+            </a:r>
+            <a:r>
+              <a:rPr lang="es-ES" sz="2800" dirty="0" err="1"/>
+              <a:t>git</a:t>
+            </a:r>
+            <a:endParaRPr lang="es-ES" sz="2800" dirty="0"/>
           </a:p>
         </p:txBody>
       </p:sp>
     </p:spTree>
     <p:extLst>
       <p:ext uri="{BB962C8B-B14F-4D97-AF65-F5344CB8AC3E}">
-        <p14:creationId xmlns:p14="http://schemas.microsoft.com/office/powerpoint/2010/main" val="3128726693"/>
+        <p14:creationId xmlns:p14="http://schemas.microsoft.com/office/powerpoint/2010/main" val="455664938"/>
       </p:ext>
     </p:extLst>
   </p:cSld>
@@ -6304,7 +8166,7 @@
           <p:cNvPr id="2" name="Título 1">
             <a:extLst>
               <a:ext uri="{FF2B5EF4-FFF2-40B4-BE49-F238E27FC236}">
-                <a16:creationId xmlns:a16="http://schemas.microsoft.com/office/drawing/2014/main" id="{B92FEAEF-8D67-D80D-C9A5-27E66DCAA4C7}"/>
+                <a16:creationId xmlns:a16="http://schemas.microsoft.com/office/drawing/2014/main" id="{87617B76-1775-B480-36B1-555978DC7EC9}"/>
               </a:ext>
             </a:extLst>
           </p:cNvPr>
@@ -6315,7 +8177,9 @@
             <p:ph type="title"/>
           </p:nvPr>
         </p:nvSpPr>
-        <p:spPr/>
+        <p:spPr>
+          <a:noFill/>
+        </p:spPr>
         <p:txBody>
           <a:bodyPr/>
           <a:lstStyle/>
@@ -6337,14 +8201,14 @@
                       <a:srgbClr val="B684D2"/>
                     </a:gs>
                   </a:gsLst>
-                  <a:path path="rect">
+                  <a:path path="circle">
                     <a:fillToRect l="100000" t="100000"/>
                   </a:path>
                   <a:tileRect r="-100000" b="-100000"/>
                 </a:gradFill>
                 <a:latin typeface="Montserrat" panose="00000500000000000000" pitchFamily="50" charset="0"/>
               </a:rPr>
-              <a:t>LISTAS ENLAZADAS</a:t>
+              <a:t>hashes</a:t>
             </a:r>
           </a:p>
         </p:txBody>
@@ -6354,7 +8218,7 @@
           <p:cNvPr id="4" name="CuadroTexto 3">
             <a:extLst>
               <a:ext uri="{FF2B5EF4-FFF2-40B4-BE49-F238E27FC236}">
-                <a16:creationId xmlns:a16="http://schemas.microsoft.com/office/drawing/2014/main" id="{B7B463BB-39A5-59C0-CEDB-21B6F79FBDCF}"/>
+                <a16:creationId xmlns:a16="http://schemas.microsoft.com/office/drawing/2014/main" id="{F0895123-4D3A-17A7-08F2-29A6DFD8A0CC}"/>
               </a:ext>
             </a:extLst>
           </p:cNvPr>
@@ -6364,7 +8228,7 @@
         <p:spPr>
           <a:xfrm>
             <a:off x="838200" y="1690688"/>
-            <a:ext cx="4664547" cy="954107"/>
+            <a:ext cx="7257051" cy="1384995"/>
           </a:xfrm>
           <a:prstGeom prst="rect">
             <a:avLst/>
@@ -6379,13 +8243,27 @@
           <a:p>
             <a:r>
               <a:rPr lang="es-ES" sz="2800" dirty="0"/>
-              <a:t>Estructuras de datos</a:t>
+              <a:t>Funciones matemáticas</a:t>
             </a:r>
           </a:p>
           <a:p>
             <a:r>
               <a:rPr lang="es-ES" sz="2800" dirty="0"/>
-              <a:t>Nodos anteriores y posteriores</a:t>
+              <a:t>Únicas, </a:t>
+            </a:r>
+            <a:r>
+              <a:rPr lang="es-ES" sz="2800" dirty="0" err="1"/>
+              <a:t>uid</a:t>
+            </a:r>
+            <a:r>
+              <a:rPr lang="es-ES" sz="2800" dirty="0"/>
+              <a:t>, un hash no da dos veces el mismo id</a:t>
+            </a:r>
+          </a:p>
+          <a:p>
+            <a:r>
+              <a:rPr lang="es-ES" sz="2800" dirty="0"/>
+              <a:t>Inmutabilidad, un cambio, nuevo hash</a:t>
             </a:r>
           </a:p>
         </p:txBody>
@@ -6393,7 +8271,7 @@
     </p:spTree>
     <p:extLst>
       <p:ext uri="{BB962C8B-B14F-4D97-AF65-F5344CB8AC3E}">
-        <p14:creationId xmlns:p14="http://schemas.microsoft.com/office/powerpoint/2010/main" val="2504731986"/>
+        <p14:creationId xmlns:p14="http://schemas.microsoft.com/office/powerpoint/2010/main" val="3128726693"/>
       </p:ext>
     </p:extLst>
   </p:cSld>

</xml_diff>